<commit_message>
RUMO A FINALIZACAO 14
</commit_message>
<xml_diff>
--- a/Stud+/modelos/ANIMACAO.pptx
+++ b/Stud+/modelos/ANIMACAO.pptx
@@ -133,7 +133,7 @@
           <p:cNvPr id="2" name="Título 1">
             <a:extLst>
               <a:ext uri="{FF2B5EF4-FFF2-40B4-BE49-F238E27FC236}">
-                <a16:creationId xmlns:a16="http://schemas.microsoft.com/office/drawing/2014/main" id="{689F77C3-EEB5-4D0B-89A7-58C0C3AD0A60}"/>
+                <a16:creationId xmlns:a16="http://schemas.microsoft.com/office/drawing/2014/main" xmlns="" id="{689F77C3-EEB5-4D0B-89A7-58C0C3AD0A60}"/>
               </a:ext>
             </a:extLst>
           </p:cNvPr>
@@ -170,7 +170,7 @@
           <p:cNvPr id="3" name="Subtítulo 2">
             <a:extLst>
               <a:ext uri="{FF2B5EF4-FFF2-40B4-BE49-F238E27FC236}">
-                <a16:creationId xmlns:a16="http://schemas.microsoft.com/office/drawing/2014/main" id="{AD93613C-AD8F-4042-B865-E635F10DFEF4}"/>
+                <a16:creationId xmlns:a16="http://schemas.microsoft.com/office/drawing/2014/main" xmlns="" id="{AD93613C-AD8F-4042-B865-E635F10DFEF4}"/>
               </a:ext>
             </a:extLst>
           </p:cNvPr>
@@ -240,7 +240,7 @@
           <p:cNvPr id="4" name="Espaço Reservado para Data 3">
             <a:extLst>
               <a:ext uri="{FF2B5EF4-FFF2-40B4-BE49-F238E27FC236}">
-                <a16:creationId xmlns:a16="http://schemas.microsoft.com/office/drawing/2014/main" id="{4AB2C324-6DBE-4260-A15D-14BE139D70EF}"/>
+                <a16:creationId xmlns:a16="http://schemas.microsoft.com/office/drawing/2014/main" xmlns="" id="{4AB2C324-6DBE-4260-A15D-14BE139D70EF}"/>
               </a:ext>
             </a:extLst>
           </p:cNvPr>
@@ -258,7 +258,7 @@
           <a:p>
             <a:fld id="{352B9E66-58E7-4A59-8F02-0CC2C04D4CAE}" type="datetimeFigureOut">
               <a:rPr lang="pt-BR" smtClean="0"/>
-              <a:t>29/10/2018</a:t>
+              <a:t>30/10/2018</a:t>
             </a:fld>
             <a:endParaRPr lang="pt-BR"/>
           </a:p>
@@ -269,7 +269,7 @@
           <p:cNvPr id="5" name="Espaço Reservado para Rodapé 4">
             <a:extLst>
               <a:ext uri="{FF2B5EF4-FFF2-40B4-BE49-F238E27FC236}">
-                <a16:creationId xmlns:a16="http://schemas.microsoft.com/office/drawing/2014/main" id="{2A6109F0-985E-40FF-9299-1494C7A17B63}"/>
+                <a16:creationId xmlns:a16="http://schemas.microsoft.com/office/drawing/2014/main" xmlns="" id="{2A6109F0-985E-40FF-9299-1494C7A17B63}"/>
               </a:ext>
             </a:extLst>
           </p:cNvPr>
@@ -294,7 +294,7 @@
           <p:cNvPr id="6" name="Espaço Reservado para Número de Slide 5">
             <a:extLst>
               <a:ext uri="{FF2B5EF4-FFF2-40B4-BE49-F238E27FC236}">
-                <a16:creationId xmlns:a16="http://schemas.microsoft.com/office/drawing/2014/main" id="{290D3894-0700-4EBF-9362-D4C733667DED}"/>
+                <a16:creationId xmlns:a16="http://schemas.microsoft.com/office/drawing/2014/main" xmlns="" id="{290D3894-0700-4EBF-9362-D4C733667DED}"/>
               </a:ext>
             </a:extLst>
           </p:cNvPr>
@@ -328,11 +328,11 @@
   <p:clrMapOvr>
     <a:masterClrMapping/>
   </p:clrMapOvr>
-  <mc:AlternateContent xmlns:mc="http://schemas.openxmlformats.org/markup-compatibility/2006">
-    <mc:Choice xmlns:p14="http://schemas.microsoft.com/office/powerpoint/2010/main" Requires="p14">
+  <mc:AlternateContent xmlns:mc="http://schemas.openxmlformats.org/markup-compatibility/2006" xmlns:p14="http://schemas.microsoft.com/office/powerpoint/2010/main">
+    <mc:Choice Requires="p14">
       <p:transition spd="slow" p14:dur="2000" advClick="0" advTm="4000"/>
     </mc:Choice>
-    <mc:Fallback>
+    <mc:Fallback xmlns="">
       <p:transition spd="slow" advClick="0" advTm="4000"/>
     </mc:Fallback>
   </mc:AlternateContent>
@@ -361,7 +361,7 @@
           <p:cNvPr id="2" name="Título 1">
             <a:extLst>
               <a:ext uri="{FF2B5EF4-FFF2-40B4-BE49-F238E27FC236}">
-                <a16:creationId xmlns:a16="http://schemas.microsoft.com/office/drawing/2014/main" id="{E5025D8A-249B-488C-8D60-0E5E076333B7}"/>
+                <a16:creationId xmlns:a16="http://schemas.microsoft.com/office/drawing/2014/main" xmlns="" id="{E5025D8A-249B-488C-8D60-0E5E076333B7}"/>
               </a:ext>
             </a:extLst>
           </p:cNvPr>
@@ -389,7 +389,7 @@
           <p:cNvPr id="3" name="Espaço Reservado para Texto Vertical 2">
             <a:extLst>
               <a:ext uri="{FF2B5EF4-FFF2-40B4-BE49-F238E27FC236}">
-                <a16:creationId xmlns:a16="http://schemas.microsoft.com/office/drawing/2014/main" id="{8DB3F8D8-752C-4F5D-A366-5A3317425D2C}"/>
+                <a16:creationId xmlns:a16="http://schemas.microsoft.com/office/drawing/2014/main" xmlns="" id="{8DB3F8D8-752C-4F5D-A366-5A3317425D2C}"/>
               </a:ext>
             </a:extLst>
           </p:cNvPr>
@@ -446,7 +446,7 @@
           <p:cNvPr id="4" name="Espaço Reservado para Data 3">
             <a:extLst>
               <a:ext uri="{FF2B5EF4-FFF2-40B4-BE49-F238E27FC236}">
-                <a16:creationId xmlns:a16="http://schemas.microsoft.com/office/drawing/2014/main" id="{EFC66C0B-1A9A-4B88-85F3-A17E018919EE}"/>
+                <a16:creationId xmlns:a16="http://schemas.microsoft.com/office/drawing/2014/main" xmlns="" id="{EFC66C0B-1A9A-4B88-85F3-A17E018919EE}"/>
               </a:ext>
             </a:extLst>
           </p:cNvPr>
@@ -464,7 +464,7 @@
           <a:p>
             <a:fld id="{352B9E66-58E7-4A59-8F02-0CC2C04D4CAE}" type="datetimeFigureOut">
               <a:rPr lang="pt-BR" smtClean="0"/>
-              <a:t>29/10/2018</a:t>
+              <a:t>30/10/2018</a:t>
             </a:fld>
             <a:endParaRPr lang="pt-BR"/>
           </a:p>
@@ -475,7 +475,7 @@
           <p:cNvPr id="5" name="Espaço Reservado para Rodapé 4">
             <a:extLst>
               <a:ext uri="{FF2B5EF4-FFF2-40B4-BE49-F238E27FC236}">
-                <a16:creationId xmlns:a16="http://schemas.microsoft.com/office/drawing/2014/main" id="{98936B81-FE88-4C52-8FD3-FAF972C565E9}"/>
+                <a16:creationId xmlns:a16="http://schemas.microsoft.com/office/drawing/2014/main" xmlns="" id="{98936B81-FE88-4C52-8FD3-FAF972C565E9}"/>
               </a:ext>
             </a:extLst>
           </p:cNvPr>
@@ -500,7 +500,7 @@
           <p:cNvPr id="6" name="Espaço Reservado para Número de Slide 5">
             <a:extLst>
               <a:ext uri="{FF2B5EF4-FFF2-40B4-BE49-F238E27FC236}">
-                <a16:creationId xmlns:a16="http://schemas.microsoft.com/office/drawing/2014/main" id="{F312FB7D-4DD6-4F85-80A7-B4FC5930F58F}"/>
+                <a16:creationId xmlns:a16="http://schemas.microsoft.com/office/drawing/2014/main" xmlns="" id="{F312FB7D-4DD6-4F85-80A7-B4FC5930F58F}"/>
               </a:ext>
             </a:extLst>
           </p:cNvPr>
@@ -534,11 +534,11 @@
   <p:clrMapOvr>
     <a:masterClrMapping/>
   </p:clrMapOvr>
-  <mc:AlternateContent xmlns:mc="http://schemas.openxmlformats.org/markup-compatibility/2006">
-    <mc:Choice xmlns:p14="http://schemas.microsoft.com/office/powerpoint/2010/main" Requires="p14">
+  <mc:AlternateContent xmlns:mc="http://schemas.openxmlformats.org/markup-compatibility/2006" xmlns:p14="http://schemas.microsoft.com/office/powerpoint/2010/main">
+    <mc:Choice Requires="p14">
       <p:transition spd="slow" p14:dur="2000" advClick="0" advTm="4000"/>
     </mc:Choice>
-    <mc:Fallback>
+    <mc:Fallback xmlns="">
       <p:transition spd="slow" advClick="0" advTm="4000"/>
     </mc:Fallback>
   </mc:AlternateContent>
@@ -567,7 +567,7 @@
           <p:cNvPr id="2" name="Título Vertical 1">
             <a:extLst>
               <a:ext uri="{FF2B5EF4-FFF2-40B4-BE49-F238E27FC236}">
-                <a16:creationId xmlns:a16="http://schemas.microsoft.com/office/drawing/2014/main" id="{EA10CD7E-DBA4-48B3-9AA4-A114464532B6}"/>
+                <a16:creationId xmlns:a16="http://schemas.microsoft.com/office/drawing/2014/main" xmlns="" id="{EA10CD7E-DBA4-48B3-9AA4-A114464532B6}"/>
               </a:ext>
             </a:extLst>
           </p:cNvPr>
@@ -600,7 +600,7 @@
           <p:cNvPr id="3" name="Espaço Reservado para Texto Vertical 2">
             <a:extLst>
               <a:ext uri="{FF2B5EF4-FFF2-40B4-BE49-F238E27FC236}">
-                <a16:creationId xmlns:a16="http://schemas.microsoft.com/office/drawing/2014/main" id="{2B43BF95-600D-4C88-A8ED-FC5FC6F213B5}"/>
+                <a16:creationId xmlns:a16="http://schemas.microsoft.com/office/drawing/2014/main" xmlns="" id="{2B43BF95-600D-4C88-A8ED-FC5FC6F213B5}"/>
               </a:ext>
             </a:extLst>
           </p:cNvPr>
@@ -662,7 +662,7 @@
           <p:cNvPr id="4" name="Espaço Reservado para Data 3">
             <a:extLst>
               <a:ext uri="{FF2B5EF4-FFF2-40B4-BE49-F238E27FC236}">
-                <a16:creationId xmlns:a16="http://schemas.microsoft.com/office/drawing/2014/main" id="{D83443BF-7252-43E0-8908-E6009F4FD81F}"/>
+                <a16:creationId xmlns:a16="http://schemas.microsoft.com/office/drawing/2014/main" xmlns="" id="{D83443BF-7252-43E0-8908-E6009F4FD81F}"/>
               </a:ext>
             </a:extLst>
           </p:cNvPr>
@@ -680,7 +680,7 @@
           <a:p>
             <a:fld id="{352B9E66-58E7-4A59-8F02-0CC2C04D4CAE}" type="datetimeFigureOut">
               <a:rPr lang="pt-BR" smtClean="0"/>
-              <a:t>29/10/2018</a:t>
+              <a:t>30/10/2018</a:t>
             </a:fld>
             <a:endParaRPr lang="pt-BR"/>
           </a:p>
@@ -691,7 +691,7 @@
           <p:cNvPr id="5" name="Espaço Reservado para Rodapé 4">
             <a:extLst>
               <a:ext uri="{FF2B5EF4-FFF2-40B4-BE49-F238E27FC236}">
-                <a16:creationId xmlns:a16="http://schemas.microsoft.com/office/drawing/2014/main" id="{8FB4540E-6A7C-4284-920C-5536060BC312}"/>
+                <a16:creationId xmlns:a16="http://schemas.microsoft.com/office/drawing/2014/main" xmlns="" id="{8FB4540E-6A7C-4284-920C-5536060BC312}"/>
               </a:ext>
             </a:extLst>
           </p:cNvPr>
@@ -716,7 +716,7 @@
           <p:cNvPr id="6" name="Espaço Reservado para Número de Slide 5">
             <a:extLst>
               <a:ext uri="{FF2B5EF4-FFF2-40B4-BE49-F238E27FC236}">
-                <a16:creationId xmlns:a16="http://schemas.microsoft.com/office/drawing/2014/main" id="{27F388D4-63EA-45DC-8DD9-C648E83CD446}"/>
+                <a16:creationId xmlns:a16="http://schemas.microsoft.com/office/drawing/2014/main" xmlns="" id="{27F388D4-63EA-45DC-8DD9-C648E83CD446}"/>
               </a:ext>
             </a:extLst>
           </p:cNvPr>
@@ -750,11 +750,11 @@
   <p:clrMapOvr>
     <a:masterClrMapping/>
   </p:clrMapOvr>
-  <mc:AlternateContent xmlns:mc="http://schemas.openxmlformats.org/markup-compatibility/2006">
-    <mc:Choice xmlns:p14="http://schemas.microsoft.com/office/powerpoint/2010/main" Requires="p14">
+  <mc:AlternateContent xmlns:mc="http://schemas.openxmlformats.org/markup-compatibility/2006" xmlns:p14="http://schemas.microsoft.com/office/powerpoint/2010/main">
+    <mc:Choice Requires="p14">
       <p:transition spd="slow" p14:dur="2000" advClick="0" advTm="4000"/>
     </mc:Choice>
-    <mc:Fallback>
+    <mc:Fallback xmlns="">
       <p:transition spd="slow" advClick="0" advTm="4000"/>
     </mc:Fallback>
   </mc:AlternateContent>
@@ -783,7 +783,7 @@
           <p:cNvPr id="2" name="Título 1">
             <a:extLst>
               <a:ext uri="{FF2B5EF4-FFF2-40B4-BE49-F238E27FC236}">
-                <a16:creationId xmlns:a16="http://schemas.microsoft.com/office/drawing/2014/main" id="{D3F14AFD-1817-4693-9DBA-283ADABF0059}"/>
+                <a16:creationId xmlns:a16="http://schemas.microsoft.com/office/drawing/2014/main" xmlns="" id="{D3F14AFD-1817-4693-9DBA-283ADABF0059}"/>
               </a:ext>
             </a:extLst>
           </p:cNvPr>
@@ -811,7 +811,7 @@
           <p:cNvPr id="3" name="Espaço Reservado para Conteúdo 2">
             <a:extLst>
               <a:ext uri="{FF2B5EF4-FFF2-40B4-BE49-F238E27FC236}">
-                <a16:creationId xmlns:a16="http://schemas.microsoft.com/office/drawing/2014/main" id="{BA8ED499-15EF-42B0-BC5A-19181D7AFE25}"/>
+                <a16:creationId xmlns:a16="http://schemas.microsoft.com/office/drawing/2014/main" xmlns="" id="{BA8ED499-15EF-42B0-BC5A-19181D7AFE25}"/>
               </a:ext>
             </a:extLst>
           </p:cNvPr>
@@ -868,7 +868,7 @@
           <p:cNvPr id="4" name="Espaço Reservado para Data 3">
             <a:extLst>
               <a:ext uri="{FF2B5EF4-FFF2-40B4-BE49-F238E27FC236}">
-                <a16:creationId xmlns:a16="http://schemas.microsoft.com/office/drawing/2014/main" id="{8199F347-18DE-4282-9DEE-700FDB9585BC}"/>
+                <a16:creationId xmlns:a16="http://schemas.microsoft.com/office/drawing/2014/main" xmlns="" id="{8199F347-18DE-4282-9DEE-700FDB9585BC}"/>
               </a:ext>
             </a:extLst>
           </p:cNvPr>
@@ -886,7 +886,7 @@
           <a:p>
             <a:fld id="{352B9E66-58E7-4A59-8F02-0CC2C04D4CAE}" type="datetimeFigureOut">
               <a:rPr lang="pt-BR" smtClean="0"/>
-              <a:t>29/10/2018</a:t>
+              <a:t>30/10/2018</a:t>
             </a:fld>
             <a:endParaRPr lang="pt-BR"/>
           </a:p>
@@ -897,7 +897,7 @@
           <p:cNvPr id="5" name="Espaço Reservado para Rodapé 4">
             <a:extLst>
               <a:ext uri="{FF2B5EF4-FFF2-40B4-BE49-F238E27FC236}">
-                <a16:creationId xmlns:a16="http://schemas.microsoft.com/office/drawing/2014/main" id="{2688D019-31F4-4CF6-B3AF-50127DCB6998}"/>
+                <a16:creationId xmlns:a16="http://schemas.microsoft.com/office/drawing/2014/main" xmlns="" id="{2688D019-31F4-4CF6-B3AF-50127DCB6998}"/>
               </a:ext>
             </a:extLst>
           </p:cNvPr>
@@ -922,7 +922,7 @@
           <p:cNvPr id="6" name="Espaço Reservado para Número de Slide 5">
             <a:extLst>
               <a:ext uri="{FF2B5EF4-FFF2-40B4-BE49-F238E27FC236}">
-                <a16:creationId xmlns:a16="http://schemas.microsoft.com/office/drawing/2014/main" id="{763B616D-10C4-411A-800F-606AEECAD88C}"/>
+                <a16:creationId xmlns:a16="http://schemas.microsoft.com/office/drawing/2014/main" xmlns="" id="{763B616D-10C4-411A-800F-606AEECAD88C}"/>
               </a:ext>
             </a:extLst>
           </p:cNvPr>
@@ -956,11 +956,11 @@
   <p:clrMapOvr>
     <a:masterClrMapping/>
   </p:clrMapOvr>
-  <mc:AlternateContent xmlns:mc="http://schemas.openxmlformats.org/markup-compatibility/2006">
-    <mc:Choice xmlns:p14="http://schemas.microsoft.com/office/powerpoint/2010/main" Requires="p14">
+  <mc:AlternateContent xmlns:mc="http://schemas.openxmlformats.org/markup-compatibility/2006" xmlns:p14="http://schemas.microsoft.com/office/powerpoint/2010/main">
+    <mc:Choice Requires="p14">
       <p:transition spd="slow" p14:dur="2000" advClick="0" advTm="4000"/>
     </mc:Choice>
-    <mc:Fallback>
+    <mc:Fallback xmlns="">
       <p:transition spd="slow" advClick="0" advTm="4000"/>
     </mc:Fallback>
   </mc:AlternateContent>
@@ -989,7 +989,7 @@
           <p:cNvPr id="2" name="Título 1">
             <a:extLst>
               <a:ext uri="{FF2B5EF4-FFF2-40B4-BE49-F238E27FC236}">
-                <a16:creationId xmlns:a16="http://schemas.microsoft.com/office/drawing/2014/main" id="{EDE30747-FF68-4580-8552-E32030480B40}"/>
+                <a16:creationId xmlns:a16="http://schemas.microsoft.com/office/drawing/2014/main" xmlns="" id="{EDE30747-FF68-4580-8552-E32030480B40}"/>
               </a:ext>
             </a:extLst>
           </p:cNvPr>
@@ -1026,7 +1026,7 @@
           <p:cNvPr id="3" name="Espaço Reservado para Texto 2">
             <a:extLst>
               <a:ext uri="{FF2B5EF4-FFF2-40B4-BE49-F238E27FC236}">
-                <a16:creationId xmlns:a16="http://schemas.microsoft.com/office/drawing/2014/main" id="{A0BD4BDF-E1E4-483D-A47E-1BFF38163435}"/>
+                <a16:creationId xmlns:a16="http://schemas.microsoft.com/office/drawing/2014/main" xmlns="" id="{A0BD4BDF-E1E4-483D-A47E-1BFF38163435}"/>
               </a:ext>
             </a:extLst>
           </p:cNvPr>
@@ -1151,7 +1151,7 @@
           <p:cNvPr id="4" name="Espaço Reservado para Data 3">
             <a:extLst>
               <a:ext uri="{FF2B5EF4-FFF2-40B4-BE49-F238E27FC236}">
-                <a16:creationId xmlns:a16="http://schemas.microsoft.com/office/drawing/2014/main" id="{F8CDE0F2-E487-400C-9701-E6377EFDA1D2}"/>
+                <a16:creationId xmlns:a16="http://schemas.microsoft.com/office/drawing/2014/main" xmlns="" id="{F8CDE0F2-E487-400C-9701-E6377EFDA1D2}"/>
               </a:ext>
             </a:extLst>
           </p:cNvPr>
@@ -1169,7 +1169,7 @@
           <a:p>
             <a:fld id="{352B9E66-58E7-4A59-8F02-0CC2C04D4CAE}" type="datetimeFigureOut">
               <a:rPr lang="pt-BR" smtClean="0"/>
-              <a:t>29/10/2018</a:t>
+              <a:t>30/10/2018</a:t>
             </a:fld>
             <a:endParaRPr lang="pt-BR"/>
           </a:p>
@@ -1180,7 +1180,7 @@
           <p:cNvPr id="5" name="Espaço Reservado para Rodapé 4">
             <a:extLst>
               <a:ext uri="{FF2B5EF4-FFF2-40B4-BE49-F238E27FC236}">
-                <a16:creationId xmlns:a16="http://schemas.microsoft.com/office/drawing/2014/main" id="{663CB8FE-E14C-4452-859C-148F9D820DC3}"/>
+                <a16:creationId xmlns:a16="http://schemas.microsoft.com/office/drawing/2014/main" xmlns="" id="{663CB8FE-E14C-4452-859C-148F9D820DC3}"/>
               </a:ext>
             </a:extLst>
           </p:cNvPr>
@@ -1205,7 +1205,7 @@
           <p:cNvPr id="6" name="Espaço Reservado para Número de Slide 5">
             <a:extLst>
               <a:ext uri="{FF2B5EF4-FFF2-40B4-BE49-F238E27FC236}">
-                <a16:creationId xmlns:a16="http://schemas.microsoft.com/office/drawing/2014/main" id="{AE595EE1-EC47-4558-9580-381C45742B10}"/>
+                <a16:creationId xmlns:a16="http://schemas.microsoft.com/office/drawing/2014/main" xmlns="" id="{AE595EE1-EC47-4558-9580-381C45742B10}"/>
               </a:ext>
             </a:extLst>
           </p:cNvPr>
@@ -1239,11 +1239,11 @@
   <p:clrMapOvr>
     <a:masterClrMapping/>
   </p:clrMapOvr>
-  <mc:AlternateContent xmlns:mc="http://schemas.openxmlformats.org/markup-compatibility/2006">
-    <mc:Choice xmlns:p14="http://schemas.microsoft.com/office/powerpoint/2010/main" Requires="p14">
+  <mc:AlternateContent xmlns:mc="http://schemas.openxmlformats.org/markup-compatibility/2006" xmlns:p14="http://schemas.microsoft.com/office/powerpoint/2010/main">
+    <mc:Choice Requires="p14">
       <p:transition spd="slow" p14:dur="2000" advClick="0" advTm="4000"/>
     </mc:Choice>
-    <mc:Fallback>
+    <mc:Fallback xmlns="">
       <p:transition spd="slow" advClick="0" advTm="4000"/>
     </mc:Fallback>
   </mc:AlternateContent>
@@ -1272,7 +1272,7 @@
           <p:cNvPr id="2" name="Título 1">
             <a:extLst>
               <a:ext uri="{FF2B5EF4-FFF2-40B4-BE49-F238E27FC236}">
-                <a16:creationId xmlns:a16="http://schemas.microsoft.com/office/drawing/2014/main" id="{22F64A4C-9762-40BE-AD2D-6CB49C6D5126}"/>
+                <a16:creationId xmlns:a16="http://schemas.microsoft.com/office/drawing/2014/main" xmlns="" id="{22F64A4C-9762-40BE-AD2D-6CB49C6D5126}"/>
               </a:ext>
             </a:extLst>
           </p:cNvPr>
@@ -1300,7 +1300,7 @@
           <p:cNvPr id="3" name="Espaço Reservado para Conteúdo 2">
             <a:extLst>
               <a:ext uri="{FF2B5EF4-FFF2-40B4-BE49-F238E27FC236}">
-                <a16:creationId xmlns:a16="http://schemas.microsoft.com/office/drawing/2014/main" id="{57A403DB-8BAD-4F6C-A193-AD7C4FD6B405}"/>
+                <a16:creationId xmlns:a16="http://schemas.microsoft.com/office/drawing/2014/main" xmlns="" id="{57A403DB-8BAD-4F6C-A193-AD7C4FD6B405}"/>
               </a:ext>
             </a:extLst>
           </p:cNvPr>
@@ -1362,7 +1362,7 @@
           <p:cNvPr id="4" name="Espaço Reservado para Conteúdo 3">
             <a:extLst>
               <a:ext uri="{FF2B5EF4-FFF2-40B4-BE49-F238E27FC236}">
-                <a16:creationId xmlns:a16="http://schemas.microsoft.com/office/drawing/2014/main" id="{69B6AB88-1143-4BF3-9481-03D1A0E2CB6D}"/>
+                <a16:creationId xmlns:a16="http://schemas.microsoft.com/office/drawing/2014/main" xmlns="" id="{69B6AB88-1143-4BF3-9481-03D1A0E2CB6D}"/>
               </a:ext>
             </a:extLst>
           </p:cNvPr>
@@ -1424,7 +1424,7 @@
           <p:cNvPr id="5" name="Espaço Reservado para Data 4">
             <a:extLst>
               <a:ext uri="{FF2B5EF4-FFF2-40B4-BE49-F238E27FC236}">
-                <a16:creationId xmlns:a16="http://schemas.microsoft.com/office/drawing/2014/main" id="{0A89C9FB-D3AC-48A9-B53D-C74A92717628}"/>
+                <a16:creationId xmlns:a16="http://schemas.microsoft.com/office/drawing/2014/main" xmlns="" id="{0A89C9FB-D3AC-48A9-B53D-C74A92717628}"/>
               </a:ext>
             </a:extLst>
           </p:cNvPr>
@@ -1442,7 +1442,7 @@
           <a:p>
             <a:fld id="{352B9E66-58E7-4A59-8F02-0CC2C04D4CAE}" type="datetimeFigureOut">
               <a:rPr lang="pt-BR" smtClean="0"/>
-              <a:t>29/10/2018</a:t>
+              <a:t>30/10/2018</a:t>
             </a:fld>
             <a:endParaRPr lang="pt-BR"/>
           </a:p>
@@ -1453,7 +1453,7 @@
           <p:cNvPr id="6" name="Espaço Reservado para Rodapé 5">
             <a:extLst>
               <a:ext uri="{FF2B5EF4-FFF2-40B4-BE49-F238E27FC236}">
-                <a16:creationId xmlns:a16="http://schemas.microsoft.com/office/drawing/2014/main" id="{BA01A437-894D-490E-B61B-A47228651FCB}"/>
+                <a16:creationId xmlns:a16="http://schemas.microsoft.com/office/drawing/2014/main" xmlns="" id="{BA01A437-894D-490E-B61B-A47228651FCB}"/>
               </a:ext>
             </a:extLst>
           </p:cNvPr>
@@ -1478,7 +1478,7 @@
           <p:cNvPr id="7" name="Espaço Reservado para Número de Slide 6">
             <a:extLst>
               <a:ext uri="{FF2B5EF4-FFF2-40B4-BE49-F238E27FC236}">
-                <a16:creationId xmlns:a16="http://schemas.microsoft.com/office/drawing/2014/main" id="{1D2EA690-8F56-45D3-AE17-6FAB4BF52905}"/>
+                <a16:creationId xmlns:a16="http://schemas.microsoft.com/office/drawing/2014/main" xmlns="" id="{1D2EA690-8F56-45D3-AE17-6FAB4BF52905}"/>
               </a:ext>
             </a:extLst>
           </p:cNvPr>
@@ -1512,11 +1512,11 @@
   <p:clrMapOvr>
     <a:masterClrMapping/>
   </p:clrMapOvr>
-  <mc:AlternateContent xmlns:mc="http://schemas.openxmlformats.org/markup-compatibility/2006">
-    <mc:Choice xmlns:p14="http://schemas.microsoft.com/office/powerpoint/2010/main" Requires="p14">
+  <mc:AlternateContent xmlns:mc="http://schemas.openxmlformats.org/markup-compatibility/2006" xmlns:p14="http://schemas.microsoft.com/office/powerpoint/2010/main">
+    <mc:Choice Requires="p14">
       <p:transition spd="slow" p14:dur="2000" advClick="0" advTm="4000"/>
     </mc:Choice>
-    <mc:Fallback>
+    <mc:Fallback xmlns="">
       <p:transition spd="slow" advClick="0" advTm="4000"/>
     </mc:Fallback>
   </mc:AlternateContent>
@@ -1545,7 +1545,7 @@
           <p:cNvPr id="2" name="Título 1">
             <a:extLst>
               <a:ext uri="{FF2B5EF4-FFF2-40B4-BE49-F238E27FC236}">
-                <a16:creationId xmlns:a16="http://schemas.microsoft.com/office/drawing/2014/main" id="{02F0D345-80A4-4871-8245-3FBCD62E2953}"/>
+                <a16:creationId xmlns:a16="http://schemas.microsoft.com/office/drawing/2014/main" xmlns="" id="{02F0D345-80A4-4871-8245-3FBCD62E2953}"/>
               </a:ext>
             </a:extLst>
           </p:cNvPr>
@@ -1578,7 +1578,7 @@
           <p:cNvPr id="3" name="Espaço Reservado para Texto 2">
             <a:extLst>
               <a:ext uri="{FF2B5EF4-FFF2-40B4-BE49-F238E27FC236}">
-                <a16:creationId xmlns:a16="http://schemas.microsoft.com/office/drawing/2014/main" id="{0CE55658-11AC-473B-A001-2AB262B4251B}"/>
+                <a16:creationId xmlns:a16="http://schemas.microsoft.com/office/drawing/2014/main" xmlns="" id="{0CE55658-11AC-473B-A001-2AB262B4251B}"/>
               </a:ext>
             </a:extLst>
           </p:cNvPr>
@@ -1649,7 +1649,7 @@
           <p:cNvPr id="4" name="Espaço Reservado para Conteúdo 3">
             <a:extLst>
               <a:ext uri="{FF2B5EF4-FFF2-40B4-BE49-F238E27FC236}">
-                <a16:creationId xmlns:a16="http://schemas.microsoft.com/office/drawing/2014/main" id="{10CF26FE-C274-463B-B9E2-063C4C14D148}"/>
+                <a16:creationId xmlns:a16="http://schemas.microsoft.com/office/drawing/2014/main" xmlns="" id="{10CF26FE-C274-463B-B9E2-063C4C14D148}"/>
               </a:ext>
             </a:extLst>
           </p:cNvPr>
@@ -1711,7 +1711,7 @@
           <p:cNvPr id="5" name="Espaço Reservado para Texto 4">
             <a:extLst>
               <a:ext uri="{FF2B5EF4-FFF2-40B4-BE49-F238E27FC236}">
-                <a16:creationId xmlns:a16="http://schemas.microsoft.com/office/drawing/2014/main" id="{4B7B6F3E-CDFF-49E5-AFCF-23E4B6D60C98}"/>
+                <a16:creationId xmlns:a16="http://schemas.microsoft.com/office/drawing/2014/main" xmlns="" id="{4B7B6F3E-CDFF-49E5-AFCF-23E4B6D60C98}"/>
               </a:ext>
             </a:extLst>
           </p:cNvPr>
@@ -1782,7 +1782,7 @@
           <p:cNvPr id="6" name="Espaço Reservado para Conteúdo 5">
             <a:extLst>
               <a:ext uri="{FF2B5EF4-FFF2-40B4-BE49-F238E27FC236}">
-                <a16:creationId xmlns:a16="http://schemas.microsoft.com/office/drawing/2014/main" id="{3A1E5D22-0BF2-4B65-812A-6632E766E802}"/>
+                <a16:creationId xmlns:a16="http://schemas.microsoft.com/office/drawing/2014/main" xmlns="" id="{3A1E5D22-0BF2-4B65-812A-6632E766E802}"/>
               </a:ext>
             </a:extLst>
           </p:cNvPr>
@@ -1844,7 +1844,7 @@
           <p:cNvPr id="7" name="Espaço Reservado para Data 6">
             <a:extLst>
               <a:ext uri="{FF2B5EF4-FFF2-40B4-BE49-F238E27FC236}">
-                <a16:creationId xmlns:a16="http://schemas.microsoft.com/office/drawing/2014/main" id="{1AC5ED40-96A8-40FA-B8CE-E88FE2672463}"/>
+                <a16:creationId xmlns:a16="http://schemas.microsoft.com/office/drawing/2014/main" xmlns="" id="{1AC5ED40-96A8-40FA-B8CE-E88FE2672463}"/>
               </a:ext>
             </a:extLst>
           </p:cNvPr>
@@ -1862,7 +1862,7 @@
           <a:p>
             <a:fld id="{352B9E66-58E7-4A59-8F02-0CC2C04D4CAE}" type="datetimeFigureOut">
               <a:rPr lang="pt-BR" smtClean="0"/>
-              <a:t>29/10/2018</a:t>
+              <a:t>30/10/2018</a:t>
             </a:fld>
             <a:endParaRPr lang="pt-BR"/>
           </a:p>
@@ -1873,7 +1873,7 @@
           <p:cNvPr id="8" name="Espaço Reservado para Rodapé 7">
             <a:extLst>
               <a:ext uri="{FF2B5EF4-FFF2-40B4-BE49-F238E27FC236}">
-                <a16:creationId xmlns:a16="http://schemas.microsoft.com/office/drawing/2014/main" id="{3F2CCE11-A63A-4BB1-8486-CE22B19D7652}"/>
+                <a16:creationId xmlns:a16="http://schemas.microsoft.com/office/drawing/2014/main" xmlns="" id="{3F2CCE11-A63A-4BB1-8486-CE22B19D7652}"/>
               </a:ext>
             </a:extLst>
           </p:cNvPr>
@@ -1898,7 +1898,7 @@
           <p:cNvPr id="9" name="Espaço Reservado para Número de Slide 8">
             <a:extLst>
               <a:ext uri="{FF2B5EF4-FFF2-40B4-BE49-F238E27FC236}">
-                <a16:creationId xmlns:a16="http://schemas.microsoft.com/office/drawing/2014/main" id="{BB310A4A-E303-4DED-B6A4-6EAAF580A666}"/>
+                <a16:creationId xmlns:a16="http://schemas.microsoft.com/office/drawing/2014/main" xmlns="" id="{BB310A4A-E303-4DED-B6A4-6EAAF580A666}"/>
               </a:ext>
             </a:extLst>
           </p:cNvPr>
@@ -1932,11 +1932,11 @@
   <p:clrMapOvr>
     <a:masterClrMapping/>
   </p:clrMapOvr>
-  <mc:AlternateContent xmlns:mc="http://schemas.openxmlformats.org/markup-compatibility/2006">
-    <mc:Choice xmlns:p14="http://schemas.microsoft.com/office/powerpoint/2010/main" Requires="p14">
+  <mc:AlternateContent xmlns:mc="http://schemas.openxmlformats.org/markup-compatibility/2006" xmlns:p14="http://schemas.microsoft.com/office/powerpoint/2010/main">
+    <mc:Choice Requires="p14">
       <p:transition spd="slow" p14:dur="2000" advClick="0" advTm="4000"/>
     </mc:Choice>
-    <mc:Fallback>
+    <mc:Fallback xmlns="">
       <p:transition spd="slow" advClick="0" advTm="4000"/>
     </mc:Fallback>
   </mc:AlternateContent>
@@ -1965,7 +1965,7 @@
           <p:cNvPr id="2" name="Título 1">
             <a:extLst>
               <a:ext uri="{FF2B5EF4-FFF2-40B4-BE49-F238E27FC236}">
-                <a16:creationId xmlns:a16="http://schemas.microsoft.com/office/drawing/2014/main" id="{4321A209-416D-4584-B559-47AF81AFE896}"/>
+                <a16:creationId xmlns:a16="http://schemas.microsoft.com/office/drawing/2014/main" xmlns="" id="{4321A209-416D-4584-B559-47AF81AFE896}"/>
               </a:ext>
             </a:extLst>
           </p:cNvPr>
@@ -1993,7 +1993,7 @@
           <p:cNvPr id="3" name="Espaço Reservado para Data 2">
             <a:extLst>
               <a:ext uri="{FF2B5EF4-FFF2-40B4-BE49-F238E27FC236}">
-                <a16:creationId xmlns:a16="http://schemas.microsoft.com/office/drawing/2014/main" id="{18835C8A-EF4F-4A65-ABE8-B79368387CC0}"/>
+                <a16:creationId xmlns:a16="http://schemas.microsoft.com/office/drawing/2014/main" xmlns="" id="{18835C8A-EF4F-4A65-ABE8-B79368387CC0}"/>
               </a:ext>
             </a:extLst>
           </p:cNvPr>
@@ -2011,7 +2011,7 @@
           <a:p>
             <a:fld id="{352B9E66-58E7-4A59-8F02-0CC2C04D4CAE}" type="datetimeFigureOut">
               <a:rPr lang="pt-BR" smtClean="0"/>
-              <a:t>29/10/2018</a:t>
+              <a:t>30/10/2018</a:t>
             </a:fld>
             <a:endParaRPr lang="pt-BR"/>
           </a:p>
@@ -2022,7 +2022,7 @@
           <p:cNvPr id="4" name="Espaço Reservado para Rodapé 3">
             <a:extLst>
               <a:ext uri="{FF2B5EF4-FFF2-40B4-BE49-F238E27FC236}">
-                <a16:creationId xmlns:a16="http://schemas.microsoft.com/office/drawing/2014/main" id="{C3C19DB2-C61B-4178-8E06-14870579E3A0}"/>
+                <a16:creationId xmlns:a16="http://schemas.microsoft.com/office/drawing/2014/main" xmlns="" id="{C3C19DB2-C61B-4178-8E06-14870579E3A0}"/>
               </a:ext>
             </a:extLst>
           </p:cNvPr>
@@ -2047,7 +2047,7 @@
           <p:cNvPr id="5" name="Espaço Reservado para Número de Slide 4">
             <a:extLst>
               <a:ext uri="{FF2B5EF4-FFF2-40B4-BE49-F238E27FC236}">
-                <a16:creationId xmlns:a16="http://schemas.microsoft.com/office/drawing/2014/main" id="{E126F8A3-E0BC-4775-B70D-A49DB47EC84C}"/>
+                <a16:creationId xmlns:a16="http://schemas.microsoft.com/office/drawing/2014/main" xmlns="" id="{E126F8A3-E0BC-4775-B70D-A49DB47EC84C}"/>
               </a:ext>
             </a:extLst>
           </p:cNvPr>
@@ -2081,11 +2081,11 @@
   <p:clrMapOvr>
     <a:masterClrMapping/>
   </p:clrMapOvr>
-  <mc:AlternateContent xmlns:mc="http://schemas.openxmlformats.org/markup-compatibility/2006">
-    <mc:Choice xmlns:p14="http://schemas.microsoft.com/office/powerpoint/2010/main" Requires="p14">
+  <mc:AlternateContent xmlns:mc="http://schemas.openxmlformats.org/markup-compatibility/2006" xmlns:p14="http://schemas.microsoft.com/office/powerpoint/2010/main">
+    <mc:Choice Requires="p14">
       <p:transition spd="slow" p14:dur="2000" advClick="0" advTm="4000"/>
     </mc:Choice>
-    <mc:Fallback>
+    <mc:Fallback xmlns="">
       <p:transition spd="slow" advClick="0" advTm="4000"/>
     </mc:Fallback>
   </mc:AlternateContent>
@@ -2114,7 +2114,7 @@
           <p:cNvPr id="2" name="Espaço Reservado para Data 1">
             <a:extLst>
               <a:ext uri="{FF2B5EF4-FFF2-40B4-BE49-F238E27FC236}">
-                <a16:creationId xmlns:a16="http://schemas.microsoft.com/office/drawing/2014/main" id="{D398B22B-D299-4FBD-9152-309F2BF4504B}"/>
+                <a16:creationId xmlns:a16="http://schemas.microsoft.com/office/drawing/2014/main" xmlns="" id="{D398B22B-D299-4FBD-9152-309F2BF4504B}"/>
               </a:ext>
             </a:extLst>
           </p:cNvPr>
@@ -2132,7 +2132,7 @@
           <a:p>
             <a:fld id="{352B9E66-58E7-4A59-8F02-0CC2C04D4CAE}" type="datetimeFigureOut">
               <a:rPr lang="pt-BR" smtClean="0"/>
-              <a:t>29/10/2018</a:t>
+              <a:t>30/10/2018</a:t>
             </a:fld>
             <a:endParaRPr lang="pt-BR"/>
           </a:p>
@@ -2143,7 +2143,7 @@
           <p:cNvPr id="3" name="Espaço Reservado para Rodapé 2">
             <a:extLst>
               <a:ext uri="{FF2B5EF4-FFF2-40B4-BE49-F238E27FC236}">
-                <a16:creationId xmlns:a16="http://schemas.microsoft.com/office/drawing/2014/main" id="{60A92E44-4D85-49C8-801E-ACE8655ECB75}"/>
+                <a16:creationId xmlns:a16="http://schemas.microsoft.com/office/drawing/2014/main" xmlns="" id="{60A92E44-4D85-49C8-801E-ACE8655ECB75}"/>
               </a:ext>
             </a:extLst>
           </p:cNvPr>
@@ -2168,7 +2168,7 @@
           <p:cNvPr id="4" name="Espaço Reservado para Número de Slide 3">
             <a:extLst>
               <a:ext uri="{FF2B5EF4-FFF2-40B4-BE49-F238E27FC236}">
-                <a16:creationId xmlns:a16="http://schemas.microsoft.com/office/drawing/2014/main" id="{4C4170AC-39C8-436B-9F44-4162946ACF90}"/>
+                <a16:creationId xmlns:a16="http://schemas.microsoft.com/office/drawing/2014/main" xmlns="" id="{4C4170AC-39C8-436B-9F44-4162946ACF90}"/>
               </a:ext>
             </a:extLst>
           </p:cNvPr>
@@ -2202,11 +2202,11 @@
   <p:clrMapOvr>
     <a:masterClrMapping/>
   </p:clrMapOvr>
-  <mc:AlternateContent xmlns:mc="http://schemas.openxmlformats.org/markup-compatibility/2006">
-    <mc:Choice xmlns:p14="http://schemas.microsoft.com/office/powerpoint/2010/main" Requires="p14">
+  <mc:AlternateContent xmlns:mc="http://schemas.openxmlformats.org/markup-compatibility/2006" xmlns:p14="http://schemas.microsoft.com/office/powerpoint/2010/main">
+    <mc:Choice Requires="p14">
       <p:transition spd="slow" p14:dur="2000" advClick="0" advTm="4000"/>
     </mc:Choice>
-    <mc:Fallback>
+    <mc:Fallback xmlns="">
       <p:transition spd="slow" advClick="0" advTm="4000"/>
     </mc:Fallback>
   </mc:AlternateContent>
@@ -2235,7 +2235,7 @@
           <p:cNvPr id="2" name="Título 1">
             <a:extLst>
               <a:ext uri="{FF2B5EF4-FFF2-40B4-BE49-F238E27FC236}">
-                <a16:creationId xmlns:a16="http://schemas.microsoft.com/office/drawing/2014/main" id="{76785EC8-9827-4F4B-8B4B-BC37D48C9B95}"/>
+                <a16:creationId xmlns:a16="http://schemas.microsoft.com/office/drawing/2014/main" xmlns="" id="{76785EC8-9827-4F4B-8B4B-BC37D48C9B95}"/>
               </a:ext>
             </a:extLst>
           </p:cNvPr>
@@ -2272,7 +2272,7 @@
           <p:cNvPr id="3" name="Espaço Reservado para Conteúdo 2">
             <a:extLst>
               <a:ext uri="{FF2B5EF4-FFF2-40B4-BE49-F238E27FC236}">
-                <a16:creationId xmlns:a16="http://schemas.microsoft.com/office/drawing/2014/main" id="{5718EA30-24A6-46C9-9565-869A4963EDCA}"/>
+                <a16:creationId xmlns:a16="http://schemas.microsoft.com/office/drawing/2014/main" xmlns="" id="{5718EA30-24A6-46C9-9565-869A4963EDCA}"/>
               </a:ext>
             </a:extLst>
           </p:cNvPr>
@@ -2362,7 +2362,7 @@
           <p:cNvPr id="4" name="Espaço Reservado para Texto 3">
             <a:extLst>
               <a:ext uri="{FF2B5EF4-FFF2-40B4-BE49-F238E27FC236}">
-                <a16:creationId xmlns:a16="http://schemas.microsoft.com/office/drawing/2014/main" id="{6EAEA4F0-BDAA-4869-B563-580C9351DD21}"/>
+                <a16:creationId xmlns:a16="http://schemas.microsoft.com/office/drawing/2014/main" xmlns="" id="{6EAEA4F0-BDAA-4869-B563-580C9351DD21}"/>
               </a:ext>
             </a:extLst>
           </p:cNvPr>
@@ -2433,7 +2433,7 @@
           <p:cNvPr id="5" name="Espaço Reservado para Data 4">
             <a:extLst>
               <a:ext uri="{FF2B5EF4-FFF2-40B4-BE49-F238E27FC236}">
-                <a16:creationId xmlns:a16="http://schemas.microsoft.com/office/drawing/2014/main" id="{D9A52A90-BBCA-4196-BC06-DC1A1F0386B7}"/>
+                <a16:creationId xmlns:a16="http://schemas.microsoft.com/office/drawing/2014/main" xmlns="" id="{D9A52A90-BBCA-4196-BC06-DC1A1F0386B7}"/>
               </a:ext>
             </a:extLst>
           </p:cNvPr>
@@ -2451,7 +2451,7 @@
           <a:p>
             <a:fld id="{352B9E66-58E7-4A59-8F02-0CC2C04D4CAE}" type="datetimeFigureOut">
               <a:rPr lang="pt-BR" smtClean="0"/>
-              <a:t>29/10/2018</a:t>
+              <a:t>30/10/2018</a:t>
             </a:fld>
             <a:endParaRPr lang="pt-BR"/>
           </a:p>
@@ -2462,7 +2462,7 @@
           <p:cNvPr id="6" name="Espaço Reservado para Rodapé 5">
             <a:extLst>
               <a:ext uri="{FF2B5EF4-FFF2-40B4-BE49-F238E27FC236}">
-                <a16:creationId xmlns:a16="http://schemas.microsoft.com/office/drawing/2014/main" id="{C8345E68-F3E9-448A-AFD1-3C239D9C16C5}"/>
+                <a16:creationId xmlns:a16="http://schemas.microsoft.com/office/drawing/2014/main" xmlns="" id="{C8345E68-F3E9-448A-AFD1-3C239D9C16C5}"/>
               </a:ext>
             </a:extLst>
           </p:cNvPr>
@@ -2487,7 +2487,7 @@
           <p:cNvPr id="7" name="Espaço Reservado para Número de Slide 6">
             <a:extLst>
               <a:ext uri="{FF2B5EF4-FFF2-40B4-BE49-F238E27FC236}">
-                <a16:creationId xmlns:a16="http://schemas.microsoft.com/office/drawing/2014/main" id="{3C8F7DE6-F280-46ED-8EBC-72E7DC6C09BF}"/>
+                <a16:creationId xmlns:a16="http://schemas.microsoft.com/office/drawing/2014/main" xmlns="" id="{3C8F7DE6-F280-46ED-8EBC-72E7DC6C09BF}"/>
               </a:ext>
             </a:extLst>
           </p:cNvPr>
@@ -2521,11 +2521,11 @@
   <p:clrMapOvr>
     <a:masterClrMapping/>
   </p:clrMapOvr>
-  <mc:AlternateContent xmlns:mc="http://schemas.openxmlformats.org/markup-compatibility/2006">
-    <mc:Choice xmlns:p14="http://schemas.microsoft.com/office/powerpoint/2010/main" Requires="p14">
+  <mc:AlternateContent xmlns:mc="http://schemas.openxmlformats.org/markup-compatibility/2006" xmlns:p14="http://schemas.microsoft.com/office/powerpoint/2010/main">
+    <mc:Choice Requires="p14">
       <p:transition spd="slow" p14:dur="2000" advClick="0" advTm="4000"/>
     </mc:Choice>
-    <mc:Fallback>
+    <mc:Fallback xmlns="">
       <p:transition spd="slow" advClick="0" advTm="4000"/>
     </mc:Fallback>
   </mc:AlternateContent>
@@ -2554,7 +2554,7 @@
           <p:cNvPr id="2" name="Título 1">
             <a:extLst>
               <a:ext uri="{FF2B5EF4-FFF2-40B4-BE49-F238E27FC236}">
-                <a16:creationId xmlns:a16="http://schemas.microsoft.com/office/drawing/2014/main" id="{CA490AD7-1E1F-42CF-AEAD-B0D04ECC5BDA}"/>
+                <a16:creationId xmlns:a16="http://schemas.microsoft.com/office/drawing/2014/main" xmlns="" id="{CA490AD7-1E1F-42CF-AEAD-B0D04ECC5BDA}"/>
               </a:ext>
             </a:extLst>
           </p:cNvPr>
@@ -2591,7 +2591,7 @@
           <p:cNvPr id="3" name="Espaço Reservado para Imagem 2">
             <a:extLst>
               <a:ext uri="{FF2B5EF4-FFF2-40B4-BE49-F238E27FC236}">
-                <a16:creationId xmlns:a16="http://schemas.microsoft.com/office/drawing/2014/main" id="{73B2DB25-5D9F-42CD-983F-C03A86EFDE4D}"/>
+                <a16:creationId xmlns:a16="http://schemas.microsoft.com/office/drawing/2014/main" xmlns="" id="{73B2DB25-5D9F-42CD-983F-C03A86EFDE4D}"/>
               </a:ext>
             </a:extLst>
           </p:cNvPr>
@@ -2658,7 +2658,7 @@
           <p:cNvPr id="4" name="Espaço Reservado para Texto 3">
             <a:extLst>
               <a:ext uri="{FF2B5EF4-FFF2-40B4-BE49-F238E27FC236}">
-                <a16:creationId xmlns:a16="http://schemas.microsoft.com/office/drawing/2014/main" id="{7A079A99-0E23-405C-8CC9-76E2F7D71188}"/>
+                <a16:creationId xmlns:a16="http://schemas.microsoft.com/office/drawing/2014/main" xmlns="" id="{7A079A99-0E23-405C-8CC9-76E2F7D71188}"/>
               </a:ext>
             </a:extLst>
           </p:cNvPr>
@@ -2729,7 +2729,7 @@
           <p:cNvPr id="5" name="Espaço Reservado para Data 4">
             <a:extLst>
               <a:ext uri="{FF2B5EF4-FFF2-40B4-BE49-F238E27FC236}">
-                <a16:creationId xmlns:a16="http://schemas.microsoft.com/office/drawing/2014/main" id="{2DD83E0C-8D71-4690-A9AE-D0343F903B2D}"/>
+                <a16:creationId xmlns:a16="http://schemas.microsoft.com/office/drawing/2014/main" xmlns="" id="{2DD83E0C-8D71-4690-A9AE-D0343F903B2D}"/>
               </a:ext>
             </a:extLst>
           </p:cNvPr>
@@ -2747,7 +2747,7 @@
           <a:p>
             <a:fld id="{352B9E66-58E7-4A59-8F02-0CC2C04D4CAE}" type="datetimeFigureOut">
               <a:rPr lang="pt-BR" smtClean="0"/>
-              <a:t>29/10/2018</a:t>
+              <a:t>30/10/2018</a:t>
             </a:fld>
             <a:endParaRPr lang="pt-BR"/>
           </a:p>
@@ -2758,7 +2758,7 @@
           <p:cNvPr id="6" name="Espaço Reservado para Rodapé 5">
             <a:extLst>
               <a:ext uri="{FF2B5EF4-FFF2-40B4-BE49-F238E27FC236}">
-                <a16:creationId xmlns:a16="http://schemas.microsoft.com/office/drawing/2014/main" id="{A40300FD-203D-4AC2-B475-B607A11BBFA8}"/>
+                <a16:creationId xmlns:a16="http://schemas.microsoft.com/office/drawing/2014/main" xmlns="" id="{A40300FD-203D-4AC2-B475-B607A11BBFA8}"/>
               </a:ext>
             </a:extLst>
           </p:cNvPr>
@@ -2783,7 +2783,7 @@
           <p:cNvPr id="7" name="Espaço Reservado para Número de Slide 6">
             <a:extLst>
               <a:ext uri="{FF2B5EF4-FFF2-40B4-BE49-F238E27FC236}">
-                <a16:creationId xmlns:a16="http://schemas.microsoft.com/office/drawing/2014/main" id="{96341428-ABC5-4516-919F-C35793781D19}"/>
+                <a16:creationId xmlns:a16="http://schemas.microsoft.com/office/drawing/2014/main" xmlns="" id="{96341428-ABC5-4516-919F-C35793781D19}"/>
               </a:ext>
             </a:extLst>
           </p:cNvPr>
@@ -2817,11 +2817,11 @@
   <p:clrMapOvr>
     <a:masterClrMapping/>
   </p:clrMapOvr>
-  <mc:AlternateContent xmlns:mc="http://schemas.openxmlformats.org/markup-compatibility/2006">
-    <mc:Choice xmlns:p14="http://schemas.microsoft.com/office/powerpoint/2010/main" Requires="p14">
+  <mc:AlternateContent xmlns:mc="http://schemas.openxmlformats.org/markup-compatibility/2006" xmlns:p14="http://schemas.microsoft.com/office/powerpoint/2010/main">
+    <mc:Choice Requires="p14">
       <p:transition spd="slow" p14:dur="2000" advClick="0" advTm="4000"/>
     </mc:Choice>
-    <mc:Fallback>
+    <mc:Fallback xmlns="">
       <p:transition spd="slow" advClick="0" advTm="4000"/>
     </mc:Fallback>
   </mc:AlternateContent>
@@ -2855,7 +2855,7 @@
           <p:cNvPr id="2" name="Espaço Reservado para Título 1">
             <a:extLst>
               <a:ext uri="{FF2B5EF4-FFF2-40B4-BE49-F238E27FC236}">
-                <a16:creationId xmlns:a16="http://schemas.microsoft.com/office/drawing/2014/main" id="{F5A9CA73-275E-402B-A781-BED8E26E62D9}"/>
+                <a16:creationId xmlns:a16="http://schemas.microsoft.com/office/drawing/2014/main" xmlns="" id="{F5A9CA73-275E-402B-A781-BED8E26E62D9}"/>
               </a:ext>
             </a:extLst>
           </p:cNvPr>
@@ -2893,7 +2893,7 @@
           <p:cNvPr id="3" name="Espaço Reservado para Texto 2">
             <a:extLst>
               <a:ext uri="{FF2B5EF4-FFF2-40B4-BE49-F238E27FC236}">
-                <a16:creationId xmlns:a16="http://schemas.microsoft.com/office/drawing/2014/main" id="{0B030618-953C-4611-B07B-0A80B4F4A8F5}"/>
+                <a16:creationId xmlns:a16="http://schemas.microsoft.com/office/drawing/2014/main" xmlns="" id="{0B030618-953C-4611-B07B-0A80B4F4A8F5}"/>
               </a:ext>
             </a:extLst>
           </p:cNvPr>
@@ -2960,7 +2960,7 @@
           <p:cNvPr id="4" name="Espaço Reservado para Data 3">
             <a:extLst>
               <a:ext uri="{FF2B5EF4-FFF2-40B4-BE49-F238E27FC236}">
-                <a16:creationId xmlns:a16="http://schemas.microsoft.com/office/drawing/2014/main" id="{8C44F495-037C-48B2-B675-4FDF5D6C9ED2}"/>
+                <a16:creationId xmlns:a16="http://schemas.microsoft.com/office/drawing/2014/main" xmlns="" id="{8C44F495-037C-48B2-B675-4FDF5D6C9ED2}"/>
               </a:ext>
             </a:extLst>
           </p:cNvPr>
@@ -2996,7 +2996,7 @@
           <a:p>
             <a:fld id="{352B9E66-58E7-4A59-8F02-0CC2C04D4CAE}" type="datetimeFigureOut">
               <a:rPr lang="pt-BR" smtClean="0"/>
-              <a:t>29/10/2018</a:t>
+              <a:t>30/10/2018</a:t>
             </a:fld>
             <a:endParaRPr lang="pt-BR"/>
           </a:p>
@@ -3007,7 +3007,7 @@
           <p:cNvPr id="5" name="Espaço Reservado para Rodapé 4">
             <a:extLst>
               <a:ext uri="{FF2B5EF4-FFF2-40B4-BE49-F238E27FC236}">
-                <a16:creationId xmlns:a16="http://schemas.microsoft.com/office/drawing/2014/main" id="{B7A1636C-ED97-4205-A64D-164F36D94AE6}"/>
+                <a16:creationId xmlns:a16="http://schemas.microsoft.com/office/drawing/2014/main" xmlns="" id="{B7A1636C-ED97-4205-A64D-164F36D94AE6}"/>
               </a:ext>
             </a:extLst>
           </p:cNvPr>
@@ -3050,7 +3050,7 @@
           <p:cNvPr id="6" name="Espaço Reservado para Número de Slide 5">
             <a:extLst>
               <a:ext uri="{FF2B5EF4-FFF2-40B4-BE49-F238E27FC236}">
-                <a16:creationId xmlns:a16="http://schemas.microsoft.com/office/drawing/2014/main" id="{B92CBF66-768E-4968-9C61-1D97A9AFA011}"/>
+                <a16:creationId xmlns:a16="http://schemas.microsoft.com/office/drawing/2014/main" xmlns="" id="{B92CBF66-768E-4968-9C61-1D97A9AFA011}"/>
               </a:ext>
             </a:extLst>
           </p:cNvPr>
@@ -3113,11 +3113,11 @@
     <p:sldLayoutId id="2147483658" r:id="rId10"/>
     <p:sldLayoutId id="2147483659" r:id="rId11"/>
   </p:sldLayoutIdLst>
-  <mc:AlternateContent xmlns:mc="http://schemas.openxmlformats.org/markup-compatibility/2006">
-    <mc:Choice xmlns:p14="http://schemas.microsoft.com/office/powerpoint/2010/main" Requires="p14">
+  <mc:AlternateContent xmlns:mc="http://schemas.openxmlformats.org/markup-compatibility/2006" xmlns:p14="http://schemas.microsoft.com/office/powerpoint/2010/main">
+    <mc:Choice Requires="p14">
       <p:transition spd="slow" p14:dur="2000" advClick="0" advTm="4000"/>
     </mc:Choice>
-    <mc:Fallback>
+    <mc:Fallback xmlns="">
       <p:transition spd="slow" advClick="0" advTm="4000"/>
     </mc:Fallback>
   </mc:AlternateContent>
@@ -3426,7 +3426,7 @@
           <p:cNvPr id="4" name="Elipse 3">
             <a:extLst>
               <a:ext uri="{FF2B5EF4-FFF2-40B4-BE49-F238E27FC236}">
-                <a16:creationId xmlns:a16="http://schemas.microsoft.com/office/drawing/2014/main" id="{ADA0A1DC-E048-4D14-9DC1-81D4046E50D4}"/>
+                <a16:creationId xmlns:a16="http://schemas.microsoft.com/office/drawing/2014/main" xmlns="" id="{ADA0A1DC-E048-4D14-9DC1-81D4046E50D4}"/>
               </a:ext>
             </a:extLst>
           </p:cNvPr>
@@ -3478,7 +3478,7 @@
           <p:cNvPr id="5" name="Elipse 4">
             <a:extLst>
               <a:ext uri="{FF2B5EF4-FFF2-40B4-BE49-F238E27FC236}">
-                <a16:creationId xmlns:a16="http://schemas.microsoft.com/office/drawing/2014/main" id="{41DBB942-8ED0-484A-B5DE-6AAE905CC02C}"/>
+                <a16:creationId xmlns:a16="http://schemas.microsoft.com/office/drawing/2014/main" xmlns="" id="{41DBB942-8ED0-484A-B5DE-6AAE905CC02C}"/>
               </a:ext>
             </a:extLst>
           </p:cNvPr>
@@ -3530,7 +3530,7 @@
           <p:cNvPr id="6" name="Elipse 5">
             <a:extLst>
               <a:ext uri="{FF2B5EF4-FFF2-40B4-BE49-F238E27FC236}">
-                <a16:creationId xmlns:a16="http://schemas.microsoft.com/office/drawing/2014/main" id="{20B9A64F-8AB8-4B49-8F2F-5B87C14A85B5}"/>
+                <a16:creationId xmlns:a16="http://schemas.microsoft.com/office/drawing/2014/main" xmlns="" id="{20B9A64F-8AB8-4B49-8F2F-5B87C14A85B5}"/>
               </a:ext>
             </a:extLst>
           </p:cNvPr>
@@ -3582,7 +3582,7 @@
           <p:cNvPr id="7" name="Elipse 6">
             <a:extLst>
               <a:ext uri="{FF2B5EF4-FFF2-40B4-BE49-F238E27FC236}">
-                <a16:creationId xmlns:a16="http://schemas.microsoft.com/office/drawing/2014/main" id="{E53AA0BB-9DAA-4719-BC1B-0A2249B30204}"/>
+                <a16:creationId xmlns:a16="http://schemas.microsoft.com/office/drawing/2014/main" xmlns="" id="{E53AA0BB-9DAA-4719-BC1B-0A2249B30204}"/>
               </a:ext>
             </a:extLst>
           </p:cNvPr>
@@ -3634,7 +3634,7 @@
           <p:cNvPr id="8" name="Elipse 7">
             <a:extLst>
               <a:ext uri="{FF2B5EF4-FFF2-40B4-BE49-F238E27FC236}">
-                <a16:creationId xmlns:a16="http://schemas.microsoft.com/office/drawing/2014/main" id="{FB3B5605-05C3-48F1-ACF3-9384C7443965}"/>
+                <a16:creationId xmlns:a16="http://schemas.microsoft.com/office/drawing/2014/main" xmlns="" id="{FB3B5605-05C3-48F1-ACF3-9384C7443965}"/>
               </a:ext>
             </a:extLst>
           </p:cNvPr>
@@ -3686,7 +3686,7 @@
           <p:cNvPr id="9" name="Elipse 8">
             <a:extLst>
               <a:ext uri="{FF2B5EF4-FFF2-40B4-BE49-F238E27FC236}">
-                <a16:creationId xmlns:a16="http://schemas.microsoft.com/office/drawing/2014/main" id="{CD281981-2817-468F-8E23-D242B5E5FA0D}"/>
+                <a16:creationId xmlns:a16="http://schemas.microsoft.com/office/drawing/2014/main" xmlns="" id="{CD281981-2817-468F-8E23-D242B5E5FA0D}"/>
               </a:ext>
             </a:extLst>
           </p:cNvPr>
@@ -3738,7 +3738,7 @@
           <p:cNvPr id="10" name="Elipse 9">
             <a:extLst>
               <a:ext uri="{FF2B5EF4-FFF2-40B4-BE49-F238E27FC236}">
-                <a16:creationId xmlns:a16="http://schemas.microsoft.com/office/drawing/2014/main" id="{ECE1B6BB-058D-4E3D-A935-89A9A4432B0D}"/>
+                <a16:creationId xmlns:a16="http://schemas.microsoft.com/office/drawing/2014/main" xmlns="" id="{ECE1B6BB-058D-4E3D-A935-89A9A4432B0D}"/>
               </a:ext>
             </a:extLst>
           </p:cNvPr>
@@ -3790,7 +3790,7 @@
           <p:cNvPr id="11" name="Elipse 10">
             <a:extLst>
               <a:ext uri="{FF2B5EF4-FFF2-40B4-BE49-F238E27FC236}">
-                <a16:creationId xmlns:a16="http://schemas.microsoft.com/office/drawing/2014/main" id="{F50D8E89-C8B7-4373-879B-48C5740700C9}"/>
+                <a16:creationId xmlns:a16="http://schemas.microsoft.com/office/drawing/2014/main" xmlns="" id="{F50D8E89-C8B7-4373-879B-48C5740700C9}"/>
               </a:ext>
             </a:extLst>
           </p:cNvPr>
@@ -3842,7 +3842,7 @@
           <p:cNvPr id="12" name="Elipse 11">
             <a:extLst>
               <a:ext uri="{FF2B5EF4-FFF2-40B4-BE49-F238E27FC236}">
-                <a16:creationId xmlns:a16="http://schemas.microsoft.com/office/drawing/2014/main" id="{3C1DB7AA-669B-4E1E-A0B5-09B7262E4783}"/>
+                <a16:creationId xmlns:a16="http://schemas.microsoft.com/office/drawing/2014/main" xmlns="" id="{3C1DB7AA-669B-4E1E-A0B5-09B7262E4783}"/>
               </a:ext>
             </a:extLst>
           </p:cNvPr>
@@ -3894,7 +3894,7 @@
           <p:cNvPr id="13" name="Elipse 12">
             <a:extLst>
               <a:ext uri="{FF2B5EF4-FFF2-40B4-BE49-F238E27FC236}">
-                <a16:creationId xmlns:a16="http://schemas.microsoft.com/office/drawing/2014/main" id="{8E60EAEA-884C-4590-AC40-420571BE364E}"/>
+                <a16:creationId xmlns:a16="http://schemas.microsoft.com/office/drawing/2014/main" xmlns="" id="{8E60EAEA-884C-4590-AC40-420571BE364E}"/>
               </a:ext>
             </a:extLst>
           </p:cNvPr>
@@ -3951,14 +3951,21 @@
   <p:clrMapOvr>
     <a:masterClrMapping/>
   </p:clrMapOvr>
-  <mc:AlternateContent xmlns:mc="http://schemas.openxmlformats.org/markup-compatibility/2006">
-    <mc:Choice xmlns:p14="http://schemas.microsoft.com/office/powerpoint/2010/main" Requires="p14">
+  <mc:AlternateContent xmlns:mc="http://schemas.openxmlformats.org/markup-compatibility/2006" xmlns:p14="http://schemas.microsoft.com/office/powerpoint/2010/main">
+    <mc:Choice Requires="p14">
       <p:transition spd="slow" p14:dur="2000" advClick="0" advTm="4000"/>
     </mc:Choice>
-    <mc:Fallback>
+    <mc:Fallback xmlns="">
       <p:transition spd="slow" advClick="0" advTm="4000"/>
     </mc:Fallback>
   </mc:AlternateContent>
+  <p:timing>
+    <p:tnLst>
+      <p:par>
+        <p:cTn id="1" dur="indefinite" restart="never" nodeType="tmRoot"/>
+      </p:par>
+    </p:tnLst>
+  </p:timing>
 </p:sld>
 </file>
 
@@ -3984,7 +3991,7 @@
           <p:cNvPr id="5" name="Agrupar 4">
             <a:extLst>
               <a:ext uri="{FF2B5EF4-FFF2-40B4-BE49-F238E27FC236}">
-                <a16:creationId xmlns:a16="http://schemas.microsoft.com/office/drawing/2014/main" id="{C7F75122-DABE-42E3-97F5-E8F06A78CF69}"/>
+                <a16:creationId xmlns:a16="http://schemas.microsoft.com/office/drawing/2014/main" xmlns="" id="{C7F75122-DABE-42E3-97F5-E8F06A78CF69}"/>
               </a:ext>
             </a:extLst>
           </p:cNvPr>
@@ -4004,7 +4011,7 @@
             <p:cNvPr id="6" name="Grupo 12">
               <a:extLst>
                 <a:ext uri="{FF2B5EF4-FFF2-40B4-BE49-F238E27FC236}">
-                  <a16:creationId xmlns:a16="http://schemas.microsoft.com/office/drawing/2014/main" id="{9C134253-B3AE-4133-A507-EB06452E9D0E}"/>
+                  <a16:creationId xmlns:a16="http://schemas.microsoft.com/office/drawing/2014/main" xmlns="" id="{9C134253-B3AE-4133-A507-EB06452E9D0E}"/>
                 </a:ext>
               </a:extLst>
             </p:cNvPr>
@@ -4024,7 +4031,7 @@
               <p:cNvPr id="10" name="Grupo 11">
                 <a:extLst>
                   <a:ext uri="{FF2B5EF4-FFF2-40B4-BE49-F238E27FC236}">
-                    <a16:creationId xmlns:a16="http://schemas.microsoft.com/office/drawing/2014/main" id="{8F2AA7ED-0379-45F3-9AC6-FA2E7074A840}"/>
+                    <a16:creationId xmlns:a16="http://schemas.microsoft.com/office/drawing/2014/main" xmlns="" id="{8F2AA7ED-0379-45F3-9AC6-FA2E7074A840}"/>
                   </a:ext>
                 </a:extLst>
               </p:cNvPr>
@@ -4044,7 +4051,7 @@
                 <p:cNvPr id="17" name="Agrupar 3">
                   <a:extLst>
                     <a:ext uri="{FF2B5EF4-FFF2-40B4-BE49-F238E27FC236}">
-                      <a16:creationId xmlns:a16="http://schemas.microsoft.com/office/drawing/2014/main" id="{78FD1B5B-A568-43D4-A2B4-AE3A66D4EFA5}"/>
+                      <a16:creationId xmlns:a16="http://schemas.microsoft.com/office/drawing/2014/main" xmlns="" id="{78FD1B5B-A568-43D4-A2B4-AE3A66D4EFA5}"/>
                     </a:ext>
                   </a:extLst>
                 </p:cNvPr>
@@ -4064,7 +4071,7 @@
                   <p:cNvPr id="25" name="Retângulo: Cantos Arredondados 4">
                     <a:extLst>
                       <a:ext uri="{FF2B5EF4-FFF2-40B4-BE49-F238E27FC236}">
-                        <a16:creationId xmlns:a16="http://schemas.microsoft.com/office/drawing/2014/main" id="{8B6DEE69-6EF8-49B7-B774-0BEB7DC28C12}"/>
+                        <a16:creationId xmlns:a16="http://schemas.microsoft.com/office/drawing/2014/main" xmlns="" id="{8B6DEE69-6EF8-49B7-B774-0BEB7DC28C12}"/>
                       </a:ext>
                     </a:extLst>
                   </p:cNvPr>
@@ -4115,7 +4122,7 @@
                   <p:cNvPr id="26" name="Retângulo: Cantos Arredondados 5">
                     <a:extLst>
                       <a:ext uri="{FF2B5EF4-FFF2-40B4-BE49-F238E27FC236}">
-                        <a16:creationId xmlns:a16="http://schemas.microsoft.com/office/drawing/2014/main" id="{5E7569DC-A17C-4B13-B9F7-D4F13FDEF85B}"/>
+                        <a16:creationId xmlns:a16="http://schemas.microsoft.com/office/drawing/2014/main" xmlns="" id="{5E7569DC-A17C-4B13-B9F7-D4F13FDEF85B}"/>
                       </a:ext>
                     </a:extLst>
                   </p:cNvPr>
@@ -4169,7 +4176,7 @@
                   <p:cNvPr id="27" name="Retângulo: Cantos Arredondados 6">
                     <a:extLst>
                       <a:ext uri="{FF2B5EF4-FFF2-40B4-BE49-F238E27FC236}">
-                        <a16:creationId xmlns:a16="http://schemas.microsoft.com/office/drawing/2014/main" id="{86ADDAC0-2B71-4EB3-9C99-0BE68E41BDFD}"/>
+                        <a16:creationId xmlns:a16="http://schemas.microsoft.com/office/drawing/2014/main" xmlns="" id="{86ADDAC0-2B71-4EB3-9C99-0BE68E41BDFD}"/>
                       </a:ext>
                     </a:extLst>
                   </p:cNvPr>
@@ -4223,7 +4230,7 @@
                   <p:cNvPr id="28" name="Forma Livre: Forma 7">
                     <a:extLst>
                       <a:ext uri="{FF2B5EF4-FFF2-40B4-BE49-F238E27FC236}">
-                        <a16:creationId xmlns:a16="http://schemas.microsoft.com/office/drawing/2014/main" id="{2762ADD9-0760-43FB-B2EB-D3E018170E14}"/>
+                        <a16:creationId xmlns:a16="http://schemas.microsoft.com/office/drawing/2014/main" xmlns="" id="{2762ADD9-0760-43FB-B2EB-D3E018170E14}"/>
                       </a:ext>
                     </a:extLst>
                   </p:cNvPr>
@@ -4354,7 +4361,7 @@
                   <p:cNvPr id="29" name="Retângulo 28">
                     <a:extLst>
                       <a:ext uri="{FF2B5EF4-FFF2-40B4-BE49-F238E27FC236}">
-                        <a16:creationId xmlns:a16="http://schemas.microsoft.com/office/drawing/2014/main" id="{A5B87EBD-55EA-42C0-B512-2DDB28285C50}"/>
+                        <a16:creationId xmlns:a16="http://schemas.microsoft.com/office/drawing/2014/main" xmlns="" id="{A5B87EBD-55EA-42C0-B512-2DDB28285C50}"/>
                       </a:ext>
                     </a:extLst>
                   </p:cNvPr>
@@ -4406,7 +4413,7 @@
                   <p:cNvPr id="30" name="Retângulo: Cantos Arredondados 9">
                     <a:extLst>
                       <a:ext uri="{FF2B5EF4-FFF2-40B4-BE49-F238E27FC236}">
-                        <a16:creationId xmlns:a16="http://schemas.microsoft.com/office/drawing/2014/main" id="{6836D504-15E4-496C-944B-6A7001352718}"/>
+                        <a16:creationId xmlns:a16="http://schemas.microsoft.com/office/drawing/2014/main" xmlns="" id="{6836D504-15E4-496C-944B-6A7001352718}"/>
                       </a:ext>
                     </a:extLst>
                   </p:cNvPr>
@@ -4460,7 +4467,7 @@
                   <p:cNvPr id="31" name="Retângulo: Cantos Arredondados 10">
                     <a:extLst>
                       <a:ext uri="{FF2B5EF4-FFF2-40B4-BE49-F238E27FC236}">
-                        <a16:creationId xmlns:a16="http://schemas.microsoft.com/office/drawing/2014/main" id="{1205C36F-23F8-42B5-8AEB-CAB13F3E41C8}"/>
+                        <a16:creationId xmlns:a16="http://schemas.microsoft.com/office/drawing/2014/main" xmlns="" id="{1205C36F-23F8-42B5-8AEB-CAB13F3E41C8}"/>
                       </a:ext>
                     </a:extLst>
                   </p:cNvPr>
@@ -4515,7 +4522,7 @@
                 <p:cNvPr id="18" name="Agrupar 17">
                   <a:extLst>
                     <a:ext uri="{FF2B5EF4-FFF2-40B4-BE49-F238E27FC236}">
-                      <a16:creationId xmlns:a16="http://schemas.microsoft.com/office/drawing/2014/main" id="{92939F49-14B0-454E-AB33-B94328715DE2}"/>
+                      <a16:creationId xmlns:a16="http://schemas.microsoft.com/office/drawing/2014/main" xmlns="" id="{92939F49-14B0-454E-AB33-B94328715DE2}"/>
                     </a:ext>
                   </a:extLst>
                 </p:cNvPr>
@@ -4535,7 +4542,7 @@
                   <p:cNvPr id="19" name="Forma Livre: Forma 18">
                     <a:extLst>
                       <a:ext uri="{FF2B5EF4-FFF2-40B4-BE49-F238E27FC236}">
-                        <a16:creationId xmlns:a16="http://schemas.microsoft.com/office/drawing/2014/main" id="{BAD52E33-180E-4F90-9389-CC7E167A912B}"/>
+                        <a16:creationId xmlns:a16="http://schemas.microsoft.com/office/drawing/2014/main" xmlns="" id="{BAD52E33-180E-4F90-9389-CC7E167A912B}"/>
                       </a:ext>
                     </a:extLst>
                   </p:cNvPr>
@@ -4670,7 +4677,7 @@
                   <p:cNvPr id="20" name="Forma Livre: Forma 19">
                     <a:extLst>
                       <a:ext uri="{FF2B5EF4-FFF2-40B4-BE49-F238E27FC236}">
-                        <a16:creationId xmlns:a16="http://schemas.microsoft.com/office/drawing/2014/main" id="{55A63886-408D-4591-81D5-B47D759EC8DE}"/>
+                        <a16:creationId xmlns:a16="http://schemas.microsoft.com/office/drawing/2014/main" xmlns="" id="{55A63886-408D-4591-81D5-B47D759EC8DE}"/>
                       </a:ext>
                     </a:extLst>
                   </p:cNvPr>
@@ -4805,7 +4812,7 @@
                   <p:cNvPr id="21" name="Elipse 20">
                     <a:extLst>
                       <a:ext uri="{FF2B5EF4-FFF2-40B4-BE49-F238E27FC236}">
-                        <a16:creationId xmlns:a16="http://schemas.microsoft.com/office/drawing/2014/main" id="{6D5BFB76-F8B2-4BB2-96ED-932648A2E09A}"/>
+                        <a16:creationId xmlns:a16="http://schemas.microsoft.com/office/drawing/2014/main" xmlns="" id="{6D5BFB76-F8B2-4BB2-96ED-932648A2E09A}"/>
                       </a:ext>
                     </a:extLst>
                   </p:cNvPr>
@@ -4857,7 +4864,7 @@
                   <p:cNvPr id="22" name="Retângulo: Cantos Arredondados 21">
                     <a:extLst>
                       <a:ext uri="{FF2B5EF4-FFF2-40B4-BE49-F238E27FC236}">
-                        <a16:creationId xmlns:a16="http://schemas.microsoft.com/office/drawing/2014/main" id="{1ED7B1C2-C8A4-4664-98A5-C0315D116C92}"/>
+                        <a16:creationId xmlns:a16="http://schemas.microsoft.com/office/drawing/2014/main" xmlns="" id="{1ED7B1C2-C8A4-4664-98A5-C0315D116C92}"/>
                       </a:ext>
                     </a:extLst>
                   </p:cNvPr>
@@ -4911,7 +4918,7 @@
                   <p:cNvPr id="23" name="Retângulo: Cantos Arredondados 22">
                     <a:extLst>
                       <a:ext uri="{FF2B5EF4-FFF2-40B4-BE49-F238E27FC236}">
-                        <a16:creationId xmlns:a16="http://schemas.microsoft.com/office/drawing/2014/main" id="{89535B19-428F-4DDC-8C77-A796E0382FD4}"/>
+                        <a16:creationId xmlns:a16="http://schemas.microsoft.com/office/drawing/2014/main" xmlns="" id="{89535B19-428F-4DDC-8C77-A796E0382FD4}"/>
                       </a:ext>
                     </a:extLst>
                   </p:cNvPr>
@@ -4965,7 +4972,7 @@
                   <p:cNvPr id="24" name="Retângulo: Cantos Arredondados 23">
                     <a:extLst>
                       <a:ext uri="{FF2B5EF4-FFF2-40B4-BE49-F238E27FC236}">
-                        <a16:creationId xmlns:a16="http://schemas.microsoft.com/office/drawing/2014/main" id="{E3279415-2C59-423B-8E8A-9C01C73C5F99}"/>
+                        <a16:creationId xmlns:a16="http://schemas.microsoft.com/office/drawing/2014/main" xmlns="" id="{E3279415-2C59-423B-8E8A-9C01C73C5F99}"/>
                       </a:ext>
                     </a:extLst>
                   </p:cNvPr>
@@ -5021,7 +5028,7 @@
               <p:cNvPr id="11" name="Agrupar 11">
                 <a:extLst>
                   <a:ext uri="{FF2B5EF4-FFF2-40B4-BE49-F238E27FC236}">
-                    <a16:creationId xmlns:a16="http://schemas.microsoft.com/office/drawing/2014/main" id="{AF05D767-535B-4406-8E1B-DC460C147172}"/>
+                    <a16:creationId xmlns:a16="http://schemas.microsoft.com/office/drawing/2014/main" xmlns="" id="{AF05D767-535B-4406-8E1B-DC460C147172}"/>
                   </a:ext>
                 </a:extLst>
               </p:cNvPr>
@@ -5041,7 +5048,7 @@
                 <p:cNvPr id="15" name="Retângulo: Cantos Arredondados 12">
                   <a:extLst>
                     <a:ext uri="{FF2B5EF4-FFF2-40B4-BE49-F238E27FC236}">
-                      <a16:creationId xmlns:a16="http://schemas.microsoft.com/office/drawing/2014/main" id="{2D4E8F62-5DB6-499D-950A-79B2E3A38088}"/>
+                      <a16:creationId xmlns:a16="http://schemas.microsoft.com/office/drawing/2014/main" xmlns="" id="{2D4E8F62-5DB6-499D-950A-79B2E3A38088}"/>
                     </a:ext>
                   </a:extLst>
                 </p:cNvPr>
@@ -5095,7 +5102,7 @@
                 <p:cNvPr id="16" name="Retângulo: Cantos Arredondados 13">
                   <a:extLst>
                     <a:ext uri="{FF2B5EF4-FFF2-40B4-BE49-F238E27FC236}">
-                      <a16:creationId xmlns:a16="http://schemas.microsoft.com/office/drawing/2014/main" id="{E4198695-753B-4508-B3CC-7EBF43D7B2C5}"/>
+                      <a16:creationId xmlns:a16="http://schemas.microsoft.com/office/drawing/2014/main" xmlns="" id="{E4198695-753B-4508-B3CC-7EBF43D7B2C5}"/>
                     </a:ext>
                   </a:extLst>
                 </p:cNvPr>
@@ -5150,7 +5157,7 @@
               <p:cNvPr id="12" name="Agrupar 14">
                 <a:extLst>
                   <a:ext uri="{FF2B5EF4-FFF2-40B4-BE49-F238E27FC236}">
-                    <a16:creationId xmlns:a16="http://schemas.microsoft.com/office/drawing/2014/main" id="{71F5180A-6411-4FD5-B4B4-3B5680BEEBE2}"/>
+                    <a16:creationId xmlns:a16="http://schemas.microsoft.com/office/drawing/2014/main" xmlns="" id="{71F5180A-6411-4FD5-B4B4-3B5680BEEBE2}"/>
                   </a:ext>
                 </a:extLst>
               </p:cNvPr>
@@ -5170,7 +5177,7 @@
                 <p:cNvPr id="13" name="Retângulo: Cantos Arredondados 15">
                   <a:extLst>
                     <a:ext uri="{FF2B5EF4-FFF2-40B4-BE49-F238E27FC236}">
-                      <a16:creationId xmlns:a16="http://schemas.microsoft.com/office/drawing/2014/main" id="{73378FA8-D5C8-4FE3-A03F-7BBD1AFFA31B}"/>
+                      <a16:creationId xmlns:a16="http://schemas.microsoft.com/office/drawing/2014/main" xmlns="" id="{73378FA8-D5C8-4FE3-A03F-7BBD1AFFA31B}"/>
                     </a:ext>
                   </a:extLst>
                 </p:cNvPr>
@@ -5224,7 +5231,7 @@
                 <p:cNvPr id="14" name="Retângulo: Cantos Arredondados 16">
                   <a:extLst>
                     <a:ext uri="{FF2B5EF4-FFF2-40B4-BE49-F238E27FC236}">
-                      <a16:creationId xmlns:a16="http://schemas.microsoft.com/office/drawing/2014/main" id="{CA6F9BAE-1F33-4B0F-8849-716FDF5139B8}"/>
+                      <a16:creationId xmlns:a16="http://schemas.microsoft.com/office/drawing/2014/main" xmlns="" id="{CA6F9BAE-1F33-4B0F-8849-716FDF5139B8}"/>
                     </a:ext>
                   </a:extLst>
                 </p:cNvPr>
@@ -5280,7 +5287,7 @@
             <p:cNvPr id="7" name="Agrupar 6">
               <a:extLst>
                 <a:ext uri="{FF2B5EF4-FFF2-40B4-BE49-F238E27FC236}">
-                  <a16:creationId xmlns:a16="http://schemas.microsoft.com/office/drawing/2014/main" id="{E41FC07F-5D39-42B6-AF5B-E5B701564D9F}"/>
+                  <a16:creationId xmlns:a16="http://schemas.microsoft.com/office/drawing/2014/main" xmlns="" id="{E41FC07F-5D39-42B6-AF5B-E5B701564D9F}"/>
                 </a:ext>
               </a:extLst>
             </p:cNvPr>
@@ -5300,7 +5307,7 @@
               <p:cNvPr id="8" name="Forma Livre: Forma 7">
                 <a:extLst>
                   <a:ext uri="{FF2B5EF4-FFF2-40B4-BE49-F238E27FC236}">
-                    <a16:creationId xmlns:a16="http://schemas.microsoft.com/office/drawing/2014/main" id="{A8E18D61-C2DA-4A62-97EE-F0ECA2A4C86F}"/>
+                    <a16:creationId xmlns:a16="http://schemas.microsoft.com/office/drawing/2014/main" xmlns="" id="{A8E18D61-C2DA-4A62-97EE-F0ECA2A4C86F}"/>
                   </a:ext>
                 </a:extLst>
               </p:cNvPr>
@@ -5407,7 +5414,7 @@
               <p:cNvPr id="9" name="Forma Livre: Forma 8">
                 <a:extLst>
                   <a:ext uri="{FF2B5EF4-FFF2-40B4-BE49-F238E27FC236}">
-                    <a16:creationId xmlns:a16="http://schemas.microsoft.com/office/drawing/2014/main" id="{B7581CEC-8DB9-4BA0-B002-B104AE351B7A}"/>
+                    <a16:creationId xmlns:a16="http://schemas.microsoft.com/office/drawing/2014/main" xmlns="" id="{B7581CEC-8DB9-4BA0-B002-B104AE351B7A}"/>
                   </a:ext>
                 </a:extLst>
               </p:cNvPr>
@@ -5552,7 +5559,7 @@
           <p:cNvPr id="32" name="Grupo 12">
             <a:extLst>
               <a:ext uri="{FF2B5EF4-FFF2-40B4-BE49-F238E27FC236}">
-                <a16:creationId xmlns:a16="http://schemas.microsoft.com/office/drawing/2014/main" id="{36B187A1-7D33-493D-93F4-5D35DCB8A05B}"/>
+                <a16:creationId xmlns:a16="http://schemas.microsoft.com/office/drawing/2014/main" xmlns="" id="{36B187A1-7D33-493D-93F4-5D35DCB8A05B}"/>
               </a:ext>
             </a:extLst>
           </p:cNvPr>
@@ -5572,7 +5579,7 @@
             <p:cNvPr id="33" name="Grupo 11">
               <a:extLst>
                 <a:ext uri="{FF2B5EF4-FFF2-40B4-BE49-F238E27FC236}">
-                  <a16:creationId xmlns:a16="http://schemas.microsoft.com/office/drawing/2014/main" id="{D6C18329-4037-46A4-A02B-DDD81B53187F}"/>
+                  <a16:creationId xmlns:a16="http://schemas.microsoft.com/office/drawing/2014/main" xmlns="" id="{D6C18329-4037-46A4-A02B-DDD81B53187F}"/>
                 </a:ext>
               </a:extLst>
             </p:cNvPr>
@@ -5592,7 +5599,7 @@
               <p:cNvPr id="40" name="Agrupar 3">
                 <a:extLst>
                   <a:ext uri="{FF2B5EF4-FFF2-40B4-BE49-F238E27FC236}">
-                    <a16:creationId xmlns:a16="http://schemas.microsoft.com/office/drawing/2014/main" id="{45261C26-CE73-47E2-92E4-0B18B65AEC55}"/>
+                    <a16:creationId xmlns:a16="http://schemas.microsoft.com/office/drawing/2014/main" xmlns="" id="{45261C26-CE73-47E2-92E4-0B18B65AEC55}"/>
                   </a:ext>
                 </a:extLst>
               </p:cNvPr>
@@ -5612,7 +5619,7 @@
                 <p:cNvPr id="49" name="Retângulo: Cantos Arredondados 4">
                   <a:extLst>
                     <a:ext uri="{FF2B5EF4-FFF2-40B4-BE49-F238E27FC236}">
-                      <a16:creationId xmlns:a16="http://schemas.microsoft.com/office/drawing/2014/main" id="{E66D9316-A3B3-4ACB-A8EF-5E6A04FDEDBE}"/>
+                      <a16:creationId xmlns:a16="http://schemas.microsoft.com/office/drawing/2014/main" xmlns="" id="{E66D9316-A3B3-4ACB-A8EF-5E6A04FDEDBE}"/>
                     </a:ext>
                   </a:extLst>
                 </p:cNvPr>
@@ -5663,7 +5670,7 @@
                 <p:cNvPr id="50" name="Retângulo: Cantos Arredondados 5">
                   <a:extLst>
                     <a:ext uri="{FF2B5EF4-FFF2-40B4-BE49-F238E27FC236}">
-                      <a16:creationId xmlns:a16="http://schemas.microsoft.com/office/drawing/2014/main" id="{3BB0CD46-FEF5-484F-B00B-8AACD3B50A33}"/>
+                      <a16:creationId xmlns:a16="http://schemas.microsoft.com/office/drawing/2014/main" xmlns="" id="{3BB0CD46-FEF5-484F-B00B-8AACD3B50A33}"/>
                     </a:ext>
                   </a:extLst>
                 </p:cNvPr>
@@ -5717,7 +5724,7 @@
                 <p:cNvPr id="51" name="Retângulo: Cantos Arredondados 6">
                   <a:extLst>
                     <a:ext uri="{FF2B5EF4-FFF2-40B4-BE49-F238E27FC236}">
-                      <a16:creationId xmlns:a16="http://schemas.microsoft.com/office/drawing/2014/main" id="{E85F8C1C-9843-4F12-916E-04E03BC29388}"/>
+                      <a16:creationId xmlns:a16="http://schemas.microsoft.com/office/drawing/2014/main" xmlns="" id="{E85F8C1C-9843-4F12-916E-04E03BC29388}"/>
                     </a:ext>
                   </a:extLst>
                 </p:cNvPr>
@@ -5771,7 +5778,7 @@
                 <p:cNvPr id="52" name="Forma Livre: Forma 7">
                   <a:extLst>
                     <a:ext uri="{FF2B5EF4-FFF2-40B4-BE49-F238E27FC236}">
-                      <a16:creationId xmlns:a16="http://schemas.microsoft.com/office/drawing/2014/main" id="{4A1469F0-9209-4CF3-9FED-A04E2AA0564B}"/>
+                      <a16:creationId xmlns:a16="http://schemas.microsoft.com/office/drawing/2014/main" xmlns="" id="{4A1469F0-9209-4CF3-9FED-A04E2AA0564B}"/>
                     </a:ext>
                   </a:extLst>
                 </p:cNvPr>
@@ -5902,7 +5909,7 @@
                 <p:cNvPr id="53" name="Retângulo 52">
                   <a:extLst>
                     <a:ext uri="{FF2B5EF4-FFF2-40B4-BE49-F238E27FC236}">
-                      <a16:creationId xmlns:a16="http://schemas.microsoft.com/office/drawing/2014/main" id="{E6DA5428-367C-4E0A-BA15-431C2033AD57}"/>
+                      <a16:creationId xmlns:a16="http://schemas.microsoft.com/office/drawing/2014/main" xmlns="" id="{E6DA5428-367C-4E0A-BA15-431C2033AD57}"/>
                     </a:ext>
                   </a:extLst>
                 </p:cNvPr>
@@ -5954,7 +5961,7 @@
                 <p:cNvPr id="54" name="Retângulo: Cantos Arredondados 9">
                   <a:extLst>
                     <a:ext uri="{FF2B5EF4-FFF2-40B4-BE49-F238E27FC236}">
-                      <a16:creationId xmlns:a16="http://schemas.microsoft.com/office/drawing/2014/main" id="{54DD415C-5764-4345-9885-4F786A9E66A1}"/>
+                      <a16:creationId xmlns:a16="http://schemas.microsoft.com/office/drawing/2014/main" xmlns="" id="{54DD415C-5764-4345-9885-4F786A9E66A1}"/>
                     </a:ext>
                   </a:extLst>
                 </p:cNvPr>
@@ -6008,7 +6015,7 @@
                 <p:cNvPr id="55" name="Retângulo: Cantos Arredondados 10">
                   <a:extLst>
                     <a:ext uri="{FF2B5EF4-FFF2-40B4-BE49-F238E27FC236}">
-                      <a16:creationId xmlns:a16="http://schemas.microsoft.com/office/drawing/2014/main" id="{B62620F7-3C6F-41C3-B72A-DEF26F53097E}"/>
+                      <a16:creationId xmlns:a16="http://schemas.microsoft.com/office/drawing/2014/main" xmlns="" id="{B62620F7-3C6F-41C3-B72A-DEF26F53097E}"/>
                     </a:ext>
                   </a:extLst>
                 </p:cNvPr>
@@ -6063,7 +6070,7 @@
               <p:cNvPr id="41" name="Agrupar 17">
                 <a:extLst>
                   <a:ext uri="{FF2B5EF4-FFF2-40B4-BE49-F238E27FC236}">
-                    <a16:creationId xmlns:a16="http://schemas.microsoft.com/office/drawing/2014/main" id="{BF9D7525-D450-41A6-AEC6-639C61FF69B3}"/>
+                    <a16:creationId xmlns:a16="http://schemas.microsoft.com/office/drawing/2014/main" xmlns="" id="{BF9D7525-D450-41A6-AEC6-639C61FF69B3}"/>
                   </a:ext>
                 </a:extLst>
               </p:cNvPr>
@@ -6083,7 +6090,7 @@
                 <p:cNvPr id="43" name="Forma Livre: Forma 18">
                   <a:extLst>
                     <a:ext uri="{FF2B5EF4-FFF2-40B4-BE49-F238E27FC236}">
-                      <a16:creationId xmlns:a16="http://schemas.microsoft.com/office/drawing/2014/main" id="{7123B068-28FC-4F35-930A-35030509D5D2}"/>
+                      <a16:creationId xmlns:a16="http://schemas.microsoft.com/office/drawing/2014/main" xmlns="" id="{7123B068-28FC-4F35-930A-35030509D5D2}"/>
                     </a:ext>
                   </a:extLst>
                 </p:cNvPr>
@@ -6218,7 +6225,7 @@
                 <p:cNvPr id="44" name="Forma Livre: Forma 19">
                   <a:extLst>
                     <a:ext uri="{FF2B5EF4-FFF2-40B4-BE49-F238E27FC236}">
-                      <a16:creationId xmlns:a16="http://schemas.microsoft.com/office/drawing/2014/main" id="{CD8F2BD2-E622-4D78-AED1-82215A7B1227}"/>
+                      <a16:creationId xmlns:a16="http://schemas.microsoft.com/office/drawing/2014/main" xmlns="" id="{CD8F2BD2-E622-4D78-AED1-82215A7B1227}"/>
                     </a:ext>
                   </a:extLst>
                 </p:cNvPr>
@@ -6353,7 +6360,7 @@
                 <p:cNvPr id="45" name="Elipse 44">
                   <a:extLst>
                     <a:ext uri="{FF2B5EF4-FFF2-40B4-BE49-F238E27FC236}">
-                      <a16:creationId xmlns:a16="http://schemas.microsoft.com/office/drawing/2014/main" id="{F8FE3AD4-33AD-4953-B231-FB2E99DE9DC6}"/>
+                      <a16:creationId xmlns:a16="http://schemas.microsoft.com/office/drawing/2014/main" xmlns="" id="{F8FE3AD4-33AD-4953-B231-FB2E99DE9DC6}"/>
                     </a:ext>
                   </a:extLst>
                 </p:cNvPr>
@@ -6405,7 +6412,7 @@
                 <p:cNvPr id="46" name="Retângulo: Cantos Arredondados 21">
                   <a:extLst>
                     <a:ext uri="{FF2B5EF4-FFF2-40B4-BE49-F238E27FC236}">
-                      <a16:creationId xmlns:a16="http://schemas.microsoft.com/office/drawing/2014/main" id="{F6F3EC36-F458-487C-A1C3-B48BDF57CFFB}"/>
+                      <a16:creationId xmlns:a16="http://schemas.microsoft.com/office/drawing/2014/main" xmlns="" id="{F6F3EC36-F458-487C-A1C3-B48BDF57CFFB}"/>
                     </a:ext>
                   </a:extLst>
                 </p:cNvPr>
@@ -6459,7 +6466,7 @@
                 <p:cNvPr id="47" name="Retângulo: Cantos Arredondados 22">
                   <a:extLst>
                     <a:ext uri="{FF2B5EF4-FFF2-40B4-BE49-F238E27FC236}">
-                      <a16:creationId xmlns:a16="http://schemas.microsoft.com/office/drawing/2014/main" id="{DC83D428-7AAB-4A30-BBC3-259ABBF9F97E}"/>
+                      <a16:creationId xmlns:a16="http://schemas.microsoft.com/office/drawing/2014/main" xmlns="" id="{DC83D428-7AAB-4A30-BBC3-259ABBF9F97E}"/>
                     </a:ext>
                   </a:extLst>
                 </p:cNvPr>
@@ -6513,7 +6520,7 @@
                 <p:cNvPr id="48" name="Retângulo: Cantos Arredondados 23">
                   <a:extLst>
                     <a:ext uri="{FF2B5EF4-FFF2-40B4-BE49-F238E27FC236}">
-                      <a16:creationId xmlns:a16="http://schemas.microsoft.com/office/drawing/2014/main" id="{1DB620D4-4B5B-4410-B70A-BF9DD3CE7D49}"/>
+                      <a16:creationId xmlns:a16="http://schemas.microsoft.com/office/drawing/2014/main" xmlns="" id="{1DB620D4-4B5B-4410-B70A-BF9DD3CE7D49}"/>
                     </a:ext>
                   </a:extLst>
                 </p:cNvPr>
@@ -6568,7 +6575,7 @@
               <p:cNvPr id="42" name="Forma Livre: Forma 24">
                 <a:extLst>
                   <a:ext uri="{FF2B5EF4-FFF2-40B4-BE49-F238E27FC236}">
-                    <a16:creationId xmlns:a16="http://schemas.microsoft.com/office/drawing/2014/main" id="{C23CE8C9-9281-4F3C-BFA0-A519883793D1}"/>
+                    <a16:creationId xmlns:a16="http://schemas.microsoft.com/office/drawing/2014/main" xmlns="" id="{C23CE8C9-9281-4F3C-BFA0-A519883793D1}"/>
                   </a:ext>
                 </a:extLst>
               </p:cNvPr>
@@ -6728,7 +6735,7 @@
             <p:cNvPr id="34" name="Agrupar 11">
               <a:extLst>
                 <a:ext uri="{FF2B5EF4-FFF2-40B4-BE49-F238E27FC236}">
-                  <a16:creationId xmlns:a16="http://schemas.microsoft.com/office/drawing/2014/main" id="{A38E1BB1-6885-4C5F-BC80-8FB963063D91}"/>
+                  <a16:creationId xmlns:a16="http://schemas.microsoft.com/office/drawing/2014/main" xmlns="" id="{A38E1BB1-6885-4C5F-BC80-8FB963063D91}"/>
                 </a:ext>
               </a:extLst>
             </p:cNvPr>
@@ -6748,7 +6755,7 @@
               <p:cNvPr id="38" name="Retângulo: Cantos Arredondados 12">
                 <a:extLst>
                   <a:ext uri="{FF2B5EF4-FFF2-40B4-BE49-F238E27FC236}">
-                    <a16:creationId xmlns:a16="http://schemas.microsoft.com/office/drawing/2014/main" id="{FB316E2E-1EEF-4745-A443-404675B94652}"/>
+                    <a16:creationId xmlns:a16="http://schemas.microsoft.com/office/drawing/2014/main" xmlns="" id="{FB316E2E-1EEF-4745-A443-404675B94652}"/>
                   </a:ext>
                 </a:extLst>
               </p:cNvPr>
@@ -6802,7 +6809,7 @@
               <p:cNvPr id="39" name="Retângulo: Cantos Arredondados 13">
                 <a:extLst>
                   <a:ext uri="{FF2B5EF4-FFF2-40B4-BE49-F238E27FC236}">
-                    <a16:creationId xmlns:a16="http://schemas.microsoft.com/office/drawing/2014/main" id="{6B78E24C-A0D7-4291-AB8C-EFA1FE062443}"/>
+                    <a16:creationId xmlns:a16="http://schemas.microsoft.com/office/drawing/2014/main" xmlns="" id="{6B78E24C-A0D7-4291-AB8C-EFA1FE062443}"/>
                   </a:ext>
                 </a:extLst>
               </p:cNvPr>
@@ -6857,7 +6864,7 @@
             <p:cNvPr id="35" name="Agrupar 14">
               <a:extLst>
                 <a:ext uri="{FF2B5EF4-FFF2-40B4-BE49-F238E27FC236}">
-                  <a16:creationId xmlns:a16="http://schemas.microsoft.com/office/drawing/2014/main" id="{5A97E5FB-68B1-476D-8E5A-0E41A294BD7C}"/>
+                  <a16:creationId xmlns:a16="http://schemas.microsoft.com/office/drawing/2014/main" xmlns="" id="{5A97E5FB-68B1-476D-8E5A-0E41A294BD7C}"/>
                 </a:ext>
               </a:extLst>
             </p:cNvPr>
@@ -6877,7 +6884,7 @@
               <p:cNvPr id="36" name="Retângulo: Cantos Arredondados 15">
                 <a:extLst>
                   <a:ext uri="{FF2B5EF4-FFF2-40B4-BE49-F238E27FC236}">
-                    <a16:creationId xmlns:a16="http://schemas.microsoft.com/office/drawing/2014/main" id="{2CC42DB6-340E-48D0-B0E8-4E4C98241841}"/>
+                    <a16:creationId xmlns:a16="http://schemas.microsoft.com/office/drawing/2014/main" xmlns="" id="{2CC42DB6-340E-48D0-B0E8-4E4C98241841}"/>
                   </a:ext>
                 </a:extLst>
               </p:cNvPr>
@@ -6931,7 +6938,7 @@
               <p:cNvPr id="37" name="Retângulo: Cantos Arredondados 16">
                 <a:extLst>
                   <a:ext uri="{FF2B5EF4-FFF2-40B4-BE49-F238E27FC236}">
-                    <a16:creationId xmlns:a16="http://schemas.microsoft.com/office/drawing/2014/main" id="{B36299D4-C2BF-48F1-A2DA-B46EA1626AE6}"/>
+                    <a16:creationId xmlns:a16="http://schemas.microsoft.com/office/drawing/2014/main" xmlns="" id="{B36299D4-C2BF-48F1-A2DA-B46EA1626AE6}"/>
                   </a:ext>
                 </a:extLst>
               </p:cNvPr>
@@ -6987,7 +6994,7 @@
           <p:cNvPr id="56" name="Retângulo 55">
             <a:extLst>
               <a:ext uri="{FF2B5EF4-FFF2-40B4-BE49-F238E27FC236}">
-                <a16:creationId xmlns:a16="http://schemas.microsoft.com/office/drawing/2014/main" id="{D8AC7571-E85D-4456-B744-F77CE6F5E81D}"/>
+                <a16:creationId xmlns:a16="http://schemas.microsoft.com/office/drawing/2014/main" xmlns="" id="{D8AC7571-E85D-4456-B744-F77CE6F5E81D}"/>
               </a:ext>
             </a:extLst>
           </p:cNvPr>
@@ -7039,7 +7046,7 @@
           <p:cNvPr id="57" name="Forma Livre: Forma 56">
             <a:extLst>
               <a:ext uri="{FF2B5EF4-FFF2-40B4-BE49-F238E27FC236}">
-                <a16:creationId xmlns:a16="http://schemas.microsoft.com/office/drawing/2014/main" id="{7D71645D-3720-46B4-906A-77B3DCA09413}"/>
+                <a16:creationId xmlns:a16="http://schemas.microsoft.com/office/drawing/2014/main" xmlns="" id="{7D71645D-3720-46B4-906A-77B3DCA09413}"/>
               </a:ext>
             </a:extLst>
           </p:cNvPr>
@@ -7206,7 +7213,7 @@
           <p:cNvPr id="58" name="Forma Livre: Forma 57">
             <a:extLst>
               <a:ext uri="{FF2B5EF4-FFF2-40B4-BE49-F238E27FC236}">
-                <a16:creationId xmlns:a16="http://schemas.microsoft.com/office/drawing/2014/main" id="{DC2402AA-236D-4FC6-8E69-ED6CA3309311}"/>
+                <a16:creationId xmlns:a16="http://schemas.microsoft.com/office/drawing/2014/main" xmlns="" id="{DC2402AA-236D-4FC6-8E69-ED6CA3309311}"/>
               </a:ext>
             </a:extLst>
           </p:cNvPr>
@@ -7358,7 +7365,7 @@
           <p:cNvPr id="59" name="Forma Livre: Forma 58">
             <a:extLst>
               <a:ext uri="{FF2B5EF4-FFF2-40B4-BE49-F238E27FC236}">
-                <a16:creationId xmlns:a16="http://schemas.microsoft.com/office/drawing/2014/main" id="{0135304F-892B-46B0-82FB-51DF19A7C1C6}"/>
+                <a16:creationId xmlns:a16="http://schemas.microsoft.com/office/drawing/2014/main" xmlns="" id="{0135304F-892B-46B0-82FB-51DF19A7C1C6}"/>
               </a:ext>
             </a:extLst>
           </p:cNvPr>
@@ -7656,7 +7663,7 @@
           <p:cNvPr id="60" name="Agrupar 59">
             <a:extLst>
               <a:ext uri="{FF2B5EF4-FFF2-40B4-BE49-F238E27FC236}">
-                <a16:creationId xmlns:a16="http://schemas.microsoft.com/office/drawing/2014/main" id="{CC338A4C-D285-4858-AEAF-DC77DD59A4E9}"/>
+                <a16:creationId xmlns:a16="http://schemas.microsoft.com/office/drawing/2014/main" xmlns="" id="{CC338A4C-D285-4858-AEAF-DC77DD59A4E9}"/>
               </a:ext>
             </a:extLst>
           </p:cNvPr>
@@ -7679,7 +7686,7 @@
             <p:cNvPr id="61" name="Cruz 60">
               <a:extLst>
                 <a:ext uri="{FF2B5EF4-FFF2-40B4-BE49-F238E27FC236}">
-                  <a16:creationId xmlns:a16="http://schemas.microsoft.com/office/drawing/2014/main" id="{E0752C28-BE77-49DE-A3C9-BDFFD6B7374B}"/>
+                  <a16:creationId xmlns:a16="http://schemas.microsoft.com/office/drawing/2014/main" xmlns="" id="{E0752C28-BE77-49DE-A3C9-BDFFD6B7374B}"/>
                 </a:ext>
               </a:extLst>
             </p:cNvPr>
@@ -7731,7 +7738,7 @@
             <p:cNvPr id="62" name="Cruz 61">
               <a:extLst>
                 <a:ext uri="{FF2B5EF4-FFF2-40B4-BE49-F238E27FC236}">
-                  <a16:creationId xmlns:a16="http://schemas.microsoft.com/office/drawing/2014/main" id="{FBEE2578-9C27-4785-863E-21CB3CF2C8EC}"/>
+                  <a16:creationId xmlns:a16="http://schemas.microsoft.com/office/drawing/2014/main" xmlns="" id="{FBEE2578-9C27-4785-863E-21CB3CF2C8EC}"/>
                 </a:ext>
               </a:extLst>
             </p:cNvPr>
@@ -7783,7 +7790,7 @@
             <p:cNvPr id="63" name="Cruz 62">
               <a:extLst>
                 <a:ext uri="{FF2B5EF4-FFF2-40B4-BE49-F238E27FC236}">
-                  <a16:creationId xmlns:a16="http://schemas.microsoft.com/office/drawing/2014/main" id="{E27B02EC-7E26-4778-81D8-4476D30931B3}"/>
+                  <a16:creationId xmlns:a16="http://schemas.microsoft.com/office/drawing/2014/main" xmlns="" id="{E27B02EC-7E26-4778-81D8-4476D30931B3}"/>
                 </a:ext>
               </a:extLst>
             </p:cNvPr>
@@ -7835,7 +7842,7 @@
             <p:cNvPr id="64" name="Grupo 19">
               <a:extLst>
                 <a:ext uri="{FF2B5EF4-FFF2-40B4-BE49-F238E27FC236}">
-                  <a16:creationId xmlns:a16="http://schemas.microsoft.com/office/drawing/2014/main" id="{4E18CC5B-41D4-43E9-AC9E-DF05A3C840EF}"/>
+                  <a16:creationId xmlns:a16="http://schemas.microsoft.com/office/drawing/2014/main" xmlns="" id="{4E18CC5B-41D4-43E9-AC9E-DF05A3C840EF}"/>
                 </a:ext>
               </a:extLst>
             </p:cNvPr>
@@ -7856,7 +7863,7 @@
               <p:cNvPr id="65" name="Cruz 64">
                 <a:extLst>
                   <a:ext uri="{FF2B5EF4-FFF2-40B4-BE49-F238E27FC236}">
-                    <a16:creationId xmlns:a16="http://schemas.microsoft.com/office/drawing/2014/main" id="{A6CE64CC-7D77-491D-998A-3AF503AD17F7}"/>
+                    <a16:creationId xmlns:a16="http://schemas.microsoft.com/office/drawing/2014/main" xmlns="" id="{A6CE64CC-7D77-491D-998A-3AF503AD17F7}"/>
                   </a:ext>
                 </a:extLst>
               </p:cNvPr>
@@ -7908,7 +7915,7 @@
               <p:cNvPr id="66" name="Cruz 65">
                 <a:extLst>
                   <a:ext uri="{FF2B5EF4-FFF2-40B4-BE49-F238E27FC236}">
-                    <a16:creationId xmlns:a16="http://schemas.microsoft.com/office/drawing/2014/main" id="{24A77E00-E6B6-4BDB-9D02-198FF5F97182}"/>
+                    <a16:creationId xmlns:a16="http://schemas.microsoft.com/office/drawing/2014/main" xmlns="" id="{24A77E00-E6B6-4BDB-9D02-198FF5F97182}"/>
                   </a:ext>
                 </a:extLst>
               </p:cNvPr>
@@ -7962,7 +7969,7 @@
           <p:cNvPr id="67" name="Grupo 1">
             <a:extLst>
               <a:ext uri="{FF2B5EF4-FFF2-40B4-BE49-F238E27FC236}">
-                <a16:creationId xmlns:a16="http://schemas.microsoft.com/office/drawing/2014/main" id="{D8CE6C4D-E74E-4309-B685-542C7BB10E4F}"/>
+                <a16:creationId xmlns:a16="http://schemas.microsoft.com/office/drawing/2014/main" xmlns="" id="{D8CE6C4D-E74E-4309-B685-542C7BB10E4F}"/>
               </a:ext>
             </a:extLst>
           </p:cNvPr>
@@ -7982,7 +7989,7 @@
             <p:cNvPr id="68" name="Retângulo 67">
               <a:extLst>
                 <a:ext uri="{FF2B5EF4-FFF2-40B4-BE49-F238E27FC236}">
-                  <a16:creationId xmlns:a16="http://schemas.microsoft.com/office/drawing/2014/main" id="{5D44BDC9-6D46-447D-A353-16CA88820C3F}"/>
+                  <a16:creationId xmlns:a16="http://schemas.microsoft.com/office/drawing/2014/main" xmlns="" id="{5D44BDC9-6D46-447D-A353-16CA88820C3F}"/>
                 </a:ext>
               </a:extLst>
             </p:cNvPr>
@@ -8034,7 +8041,7 @@
             <p:cNvPr id="69" name="Triângulo Retângulo 68">
               <a:extLst>
                 <a:ext uri="{FF2B5EF4-FFF2-40B4-BE49-F238E27FC236}">
-                  <a16:creationId xmlns:a16="http://schemas.microsoft.com/office/drawing/2014/main" id="{B310C7AE-31A3-4C21-B6BF-AB9AEADB422C}"/>
+                  <a16:creationId xmlns:a16="http://schemas.microsoft.com/office/drawing/2014/main" xmlns="" id="{B310C7AE-31A3-4C21-B6BF-AB9AEADB422C}"/>
                 </a:ext>
               </a:extLst>
             </p:cNvPr>
@@ -8087,7 +8094,7 @@
           <p:cNvPr id="70" name="Grupo 10">
             <a:extLst>
               <a:ext uri="{FF2B5EF4-FFF2-40B4-BE49-F238E27FC236}">
-                <a16:creationId xmlns:a16="http://schemas.microsoft.com/office/drawing/2014/main" id="{99EEEA5F-E2F1-45A4-B7C2-C2CBF37059D1}"/>
+                <a16:creationId xmlns:a16="http://schemas.microsoft.com/office/drawing/2014/main" xmlns="" id="{99EEEA5F-E2F1-45A4-B7C2-C2CBF37059D1}"/>
               </a:ext>
             </a:extLst>
           </p:cNvPr>
@@ -8107,7 +8114,7 @@
             <p:cNvPr id="71" name="Agrupar 3">
               <a:extLst>
                 <a:ext uri="{FF2B5EF4-FFF2-40B4-BE49-F238E27FC236}">
-                  <a16:creationId xmlns:a16="http://schemas.microsoft.com/office/drawing/2014/main" id="{A9D17EA6-23C7-4156-8800-DE4A6953119C}"/>
+                  <a16:creationId xmlns:a16="http://schemas.microsoft.com/office/drawing/2014/main" xmlns="" id="{A9D17EA6-23C7-4156-8800-DE4A6953119C}"/>
                 </a:ext>
               </a:extLst>
             </p:cNvPr>
@@ -8127,7 +8134,7 @@
               <p:cNvPr id="82" name="Retângulo: Cantos Arredondados 4">
                 <a:extLst>
                   <a:ext uri="{FF2B5EF4-FFF2-40B4-BE49-F238E27FC236}">
-                    <a16:creationId xmlns:a16="http://schemas.microsoft.com/office/drawing/2014/main" id="{63EB42B2-0F3A-425E-BFCE-70D1A98EC107}"/>
+                    <a16:creationId xmlns:a16="http://schemas.microsoft.com/office/drawing/2014/main" xmlns="" id="{63EB42B2-0F3A-425E-BFCE-70D1A98EC107}"/>
                   </a:ext>
                 </a:extLst>
               </p:cNvPr>
@@ -8178,7 +8185,7 @@
               <p:cNvPr id="83" name="Retângulo: Cantos Arredondados 5">
                 <a:extLst>
                   <a:ext uri="{FF2B5EF4-FFF2-40B4-BE49-F238E27FC236}">
-                    <a16:creationId xmlns:a16="http://schemas.microsoft.com/office/drawing/2014/main" id="{BCE010C6-6204-41FB-8D12-6D5DF55AE178}"/>
+                    <a16:creationId xmlns:a16="http://schemas.microsoft.com/office/drawing/2014/main" xmlns="" id="{BCE010C6-6204-41FB-8D12-6D5DF55AE178}"/>
                   </a:ext>
                 </a:extLst>
               </p:cNvPr>
@@ -8232,7 +8239,7 @@
               <p:cNvPr id="84" name="Retângulo: Cantos Arredondados 6">
                 <a:extLst>
                   <a:ext uri="{FF2B5EF4-FFF2-40B4-BE49-F238E27FC236}">
-                    <a16:creationId xmlns:a16="http://schemas.microsoft.com/office/drawing/2014/main" id="{7F0BFC9B-E2A1-44FB-BAF0-92F749AE5FBF}"/>
+                    <a16:creationId xmlns:a16="http://schemas.microsoft.com/office/drawing/2014/main" xmlns="" id="{7F0BFC9B-E2A1-44FB-BAF0-92F749AE5FBF}"/>
                   </a:ext>
                 </a:extLst>
               </p:cNvPr>
@@ -8286,7 +8293,7 @@
               <p:cNvPr id="85" name="Forma Livre: Forma 7">
                 <a:extLst>
                   <a:ext uri="{FF2B5EF4-FFF2-40B4-BE49-F238E27FC236}">
-                    <a16:creationId xmlns:a16="http://schemas.microsoft.com/office/drawing/2014/main" id="{ECDF7175-5DCC-49F5-A7A1-4BD6CB428D9B}"/>
+                    <a16:creationId xmlns:a16="http://schemas.microsoft.com/office/drawing/2014/main" xmlns="" id="{ECDF7175-5DCC-49F5-A7A1-4BD6CB428D9B}"/>
                   </a:ext>
                 </a:extLst>
               </p:cNvPr>
@@ -8417,7 +8424,7 @@
               <p:cNvPr id="86" name="Retângulo 85">
                 <a:extLst>
                   <a:ext uri="{FF2B5EF4-FFF2-40B4-BE49-F238E27FC236}">
-                    <a16:creationId xmlns:a16="http://schemas.microsoft.com/office/drawing/2014/main" id="{4FEEBD15-85B2-4553-9382-B4F27A7213D4}"/>
+                    <a16:creationId xmlns:a16="http://schemas.microsoft.com/office/drawing/2014/main" xmlns="" id="{4FEEBD15-85B2-4553-9382-B4F27A7213D4}"/>
                   </a:ext>
                 </a:extLst>
               </p:cNvPr>
@@ -8469,7 +8476,7 @@
               <p:cNvPr id="87" name="Retângulo: Cantos Arredondados 9">
                 <a:extLst>
                   <a:ext uri="{FF2B5EF4-FFF2-40B4-BE49-F238E27FC236}">
-                    <a16:creationId xmlns:a16="http://schemas.microsoft.com/office/drawing/2014/main" id="{821A7BD2-70DB-4975-9098-B9B74522A62C}"/>
+                    <a16:creationId xmlns:a16="http://schemas.microsoft.com/office/drawing/2014/main" xmlns="" id="{821A7BD2-70DB-4975-9098-B9B74522A62C}"/>
                   </a:ext>
                 </a:extLst>
               </p:cNvPr>
@@ -8523,7 +8530,7 @@
               <p:cNvPr id="88" name="Retângulo: Cantos Arredondados 10">
                 <a:extLst>
                   <a:ext uri="{FF2B5EF4-FFF2-40B4-BE49-F238E27FC236}">
-                    <a16:creationId xmlns:a16="http://schemas.microsoft.com/office/drawing/2014/main" id="{7FC189FD-3A5D-4564-8CFF-60C4118E1B05}"/>
+                    <a16:creationId xmlns:a16="http://schemas.microsoft.com/office/drawing/2014/main" xmlns="" id="{7FC189FD-3A5D-4564-8CFF-60C4118E1B05}"/>
                   </a:ext>
                 </a:extLst>
               </p:cNvPr>
@@ -8578,7 +8585,7 @@
             <p:cNvPr id="72" name="Agrupar 17">
               <a:extLst>
                 <a:ext uri="{FF2B5EF4-FFF2-40B4-BE49-F238E27FC236}">
-                  <a16:creationId xmlns:a16="http://schemas.microsoft.com/office/drawing/2014/main" id="{3CF44AD6-E89C-4147-A9A6-746458B05328}"/>
+                  <a16:creationId xmlns:a16="http://schemas.microsoft.com/office/drawing/2014/main" xmlns="" id="{3CF44AD6-E89C-4147-A9A6-746458B05328}"/>
                 </a:ext>
               </a:extLst>
             </p:cNvPr>
@@ -8598,7 +8605,7 @@
               <p:cNvPr id="76" name="Forma Livre: Forma 18">
                 <a:extLst>
                   <a:ext uri="{FF2B5EF4-FFF2-40B4-BE49-F238E27FC236}">
-                    <a16:creationId xmlns:a16="http://schemas.microsoft.com/office/drawing/2014/main" id="{56D4948E-446E-493A-86E9-A16E4BB950A7}"/>
+                    <a16:creationId xmlns:a16="http://schemas.microsoft.com/office/drawing/2014/main" xmlns="" id="{56D4948E-446E-493A-86E9-A16E4BB950A7}"/>
                   </a:ext>
                 </a:extLst>
               </p:cNvPr>
@@ -8733,7 +8740,7 @@
               <p:cNvPr id="77" name="Forma Livre: Forma 19">
                 <a:extLst>
                   <a:ext uri="{FF2B5EF4-FFF2-40B4-BE49-F238E27FC236}">
-                    <a16:creationId xmlns:a16="http://schemas.microsoft.com/office/drawing/2014/main" id="{2F325523-E94D-49A3-801F-88F26C75EFA3}"/>
+                    <a16:creationId xmlns:a16="http://schemas.microsoft.com/office/drawing/2014/main" xmlns="" id="{2F325523-E94D-49A3-801F-88F26C75EFA3}"/>
                   </a:ext>
                 </a:extLst>
               </p:cNvPr>
@@ -8868,7 +8875,7 @@
               <p:cNvPr id="78" name="Elipse 77">
                 <a:extLst>
                   <a:ext uri="{FF2B5EF4-FFF2-40B4-BE49-F238E27FC236}">
-                    <a16:creationId xmlns:a16="http://schemas.microsoft.com/office/drawing/2014/main" id="{702C186F-3286-4B62-A1BB-74C5D56D57C8}"/>
+                    <a16:creationId xmlns:a16="http://schemas.microsoft.com/office/drawing/2014/main" xmlns="" id="{702C186F-3286-4B62-A1BB-74C5D56D57C8}"/>
                   </a:ext>
                 </a:extLst>
               </p:cNvPr>
@@ -8920,7 +8927,7 @@
               <p:cNvPr id="79" name="Retângulo: Cantos Arredondados 21">
                 <a:extLst>
                   <a:ext uri="{FF2B5EF4-FFF2-40B4-BE49-F238E27FC236}">
-                    <a16:creationId xmlns:a16="http://schemas.microsoft.com/office/drawing/2014/main" id="{00D0C1D8-B0B3-4F01-BCC1-DD1265B6E421}"/>
+                    <a16:creationId xmlns:a16="http://schemas.microsoft.com/office/drawing/2014/main" xmlns="" id="{00D0C1D8-B0B3-4F01-BCC1-DD1265B6E421}"/>
                   </a:ext>
                 </a:extLst>
               </p:cNvPr>
@@ -8974,7 +8981,7 @@
               <p:cNvPr id="80" name="Retângulo: Cantos Arredondados 22">
                 <a:extLst>
                   <a:ext uri="{FF2B5EF4-FFF2-40B4-BE49-F238E27FC236}">
-                    <a16:creationId xmlns:a16="http://schemas.microsoft.com/office/drawing/2014/main" id="{3FA261CF-F0FF-4D5B-B776-B0A9ABA4B59F}"/>
+                    <a16:creationId xmlns:a16="http://schemas.microsoft.com/office/drawing/2014/main" xmlns="" id="{3FA261CF-F0FF-4D5B-B776-B0A9ABA4B59F}"/>
                   </a:ext>
                 </a:extLst>
               </p:cNvPr>
@@ -9028,7 +9035,7 @@
               <p:cNvPr id="81" name="Retângulo: Cantos Arredondados 23">
                 <a:extLst>
                   <a:ext uri="{FF2B5EF4-FFF2-40B4-BE49-F238E27FC236}">
-                    <a16:creationId xmlns:a16="http://schemas.microsoft.com/office/drawing/2014/main" id="{4452907C-B340-4C1F-A251-08A54DA61908}"/>
+                    <a16:creationId xmlns:a16="http://schemas.microsoft.com/office/drawing/2014/main" xmlns="" id="{4452907C-B340-4C1F-A251-08A54DA61908}"/>
                   </a:ext>
                 </a:extLst>
               </p:cNvPr>
@@ -9083,7 +9090,7 @@
             <p:cNvPr id="73" name="Forma Livre: Forma 24">
               <a:extLst>
                 <a:ext uri="{FF2B5EF4-FFF2-40B4-BE49-F238E27FC236}">
-                  <a16:creationId xmlns:a16="http://schemas.microsoft.com/office/drawing/2014/main" id="{9DD6F43F-BEF8-4D80-A095-5502413BFFFA}"/>
+                  <a16:creationId xmlns:a16="http://schemas.microsoft.com/office/drawing/2014/main" xmlns="" id="{9DD6F43F-BEF8-4D80-A095-5502413BFFFA}"/>
                 </a:ext>
               </a:extLst>
             </p:cNvPr>
@@ -9242,7 +9249,7 @@
             <p:cNvPr id="74" name="Retângulo de cantos arredondados 6">
               <a:extLst>
                 <a:ext uri="{FF2B5EF4-FFF2-40B4-BE49-F238E27FC236}">
-                  <a16:creationId xmlns:a16="http://schemas.microsoft.com/office/drawing/2014/main" id="{46E4EBC0-C7EF-41D0-8A15-1406A7C4F5BF}"/>
+                  <a16:creationId xmlns:a16="http://schemas.microsoft.com/office/drawing/2014/main" xmlns="" id="{46E4EBC0-C7EF-41D0-8A15-1406A7C4F5BF}"/>
                 </a:ext>
               </a:extLst>
             </p:cNvPr>
@@ -9329,7 +9336,7 @@
             <p:cNvPr id="75" name="Retângulo de cantos arredondados 6">
               <a:extLst>
                 <a:ext uri="{FF2B5EF4-FFF2-40B4-BE49-F238E27FC236}">
-                  <a16:creationId xmlns:a16="http://schemas.microsoft.com/office/drawing/2014/main" id="{FFE812F1-74EC-4F1D-9686-17C5F3402F11}"/>
+                  <a16:creationId xmlns:a16="http://schemas.microsoft.com/office/drawing/2014/main" xmlns="" id="{FFE812F1-74EC-4F1D-9686-17C5F3402F11}"/>
                 </a:ext>
               </a:extLst>
             </p:cNvPr>
@@ -9422,11 +9429,11 @@
   <p:clrMapOvr>
     <a:masterClrMapping/>
   </p:clrMapOvr>
-  <mc:AlternateContent xmlns:mc="http://schemas.openxmlformats.org/markup-compatibility/2006">
-    <mc:Choice xmlns:p14="http://schemas.microsoft.com/office/powerpoint/2010/main" Requires="p14">
+  <mc:AlternateContent xmlns:mc="http://schemas.openxmlformats.org/markup-compatibility/2006" xmlns:p14="http://schemas.microsoft.com/office/powerpoint/2010/main">
+    <mc:Choice Requires="p14">
       <p:transition spd="slow" p14:dur="2000" advClick="0" advTm="4000"/>
     </mc:Choice>
-    <mc:Fallback>
+    <mc:Fallback xmlns="">
       <p:transition spd="slow" advClick="0" advTm="4000"/>
     </mc:Fallback>
   </mc:AlternateContent>
@@ -10451,7 +10458,7 @@
           <p:cNvPr id="9" name="Retângulo 8">
             <a:extLst>
               <a:ext uri="{FF2B5EF4-FFF2-40B4-BE49-F238E27FC236}">
-                <a16:creationId xmlns:a16="http://schemas.microsoft.com/office/drawing/2014/main" id="{C54D026B-CAC2-48B0-B1DE-B150AF20C06D}"/>
+                <a16:creationId xmlns:a16="http://schemas.microsoft.com/office/drawing/2014/main" xmlns="" id="{C54D026B-CAC2-48B0-B1DE-B150AF20C06D}"/>
               </a:ext>
             </a:extLst>
           </p:cNvPr>
@@ -10503,7 +10510,7 @@
           <p:cNvPr id="14" name="Retângulo 13">
             <a:extLst>
               <a:ext uri="{FF2B5EF4-FFF2-40B4-BE49-F238E27FC236}">
-                <a16:creationId xmlns:a16="http://schemas.microsoft.com/office/drawing/2014/main" id="{B5100106-EBB5-428E-8F83-8D2748F7E67D}"/>
+                <a16:creationId xmlns:a16="http://schemas.microsoft.com/office/drawing/2014/main" xmlns="" id="{B5100106-EBB5-428E-8F83-8D2748F7E67D}"/>
               </a:ext>
             </a:extLst>
           </p:cNvPr>
@@ -10555,7 +10562,7 @@
           <p:cNvPr id="15" name="Retângulo 14">
             <a:extLst>
               <a:ext uri="{FF2B5EF4-FFF2-40B4-BE49-F238E27FC236}">
-                <a16:creationId xmlns:a16="http://schemas.microsoft.com/office/drawing/2014/main" id="{2FBCBB79-CFF5-49F5-96A8-2CDB6DCDAAB1}"/>
+                <a16:creationId xmlns:a16="http://schemas.microsoft.com/office/drawing/2014/main" xmlns="" id="{2FBCBB79-CFF5-49F5-96A8-2CDB6DCDAAB1}"/>
               </a:ext>
             </a:extLst>
           </p:cNvPr>
@@ -10612,11 +10619,11 @@
   <p:clrMapOvr>
     <a:masterClrMapping/>
   </p:clrMapOvr>
-  <mc:AlternateContent xmlns:mc="http://schemas.openxmlformats.org/markup-compatibility/2006">
-    <mc:Choice xmlns:p14="http://schemas.microsoft.com/office/powerpoint/2010/main" Requires="p14">
+  <mc:AlternateContent xmlns:mc="http://schemas.openxmlformats.org/markup-compatibility/2006" xmlns:p14="http://schemas.microsoft.com/office/powerpoint/2010/main">
+    <mc:Choice Requires="p14">
       <p:transition spd="slow" p14:dur="2000" advClick="0" advTm="4000"/>
     </mc:Choice>
-    <mc:Fallback>
+    <mc:Fallback xmlns="">
       <p:transition spd="slow" advClick="0" advTm="4000"/>
     </mc:Fallback>
   </mc:AlternateContent>
@@ -11151,7 +11158,7 @@
           <p:cNvPr id="18" name="Agrupar 17">
             <a:extLst>
               <a:ext uri="{FF2B5EF4-FFF2-40B4-BE49-F238E27FC236}">
-                <a16:creationId xmlns:a16="http://schemas.microsoft.com/office/drawing/2014/main" id="{7E3865F9-12B1-4183-AB47-2BB2BC2C3990}"/>
+                <a16:creationId xmlns:a16="http://schemas.microsoft.com/office/drawing/2014/main" xmlns="" id="{7E3865F9-12B1-4183-AB47-2BB2BC2C3990}"/>
               </a:ext>
             </a:extLst>
           </p:cNvPr>
@@ -11174,7 +11181,7 @@
             <p:cNvPr id="4" name="Retângulo 3">
               <a:extLst>
                 <a:ext uri="{FF2B5EF4-FFF2-40B4-BE49-F238E27FC236}">
-                  <a16:creationId xmlns:a16="http://schemas.microsoft.com/office/drawing/2014/main" id="{163BC121-9EA3-45AC-8D66-7A524009522D}"/>
+                  <a16:creationId xmlns:a16="http://schemas.microsoft.com/office/drawing/2014/main" xmlns="" id="{163BC121-9EA3-45AC-8D66-7A524009522D}"/>
                 </a:ext>
               </a:extLst>
             </p:cNvPr>
@@ -11224,7 +11231,7 @@
             <p:cNvPr id="5" name="Forma Livre: Forma 4">
               <a:extLst>
                 <a:ext uri="{FF2B5EF4-FFF2-40B4-BE49-F238E27FC236}">
-                  <a16:creationId xmlns:a16="http://schemas.microsoft.com/office/drawing/2014/main" id="{7D28F622-EBB7-4379-A25A-4A31EB26705E}"/>
+                  <a16:creationId xmlns:a16="http://schemas.microsoft.com/office/drawing/2014/main" xmlns="" id="{7D28F622-EBB7-4379-A25A-4A31EB26705E}"/>
                 </a:ext>
               </a:extLst>
             </p:cNvPr>
@@ -11389,7 +11396,7 @@
             <p:cNvPr id="6" name="Forma Livre: Forma 5">
               <a:extLst>
                 <a:ext uri="{FF2B5EF4-FFF2-40B4-BE49-F238E27FC236}">
-                  <a16:creationId xmlns:a16="http://schemas.microsoft.com/office/drawing/2014/main" id="{73E2DD77-ABE3-4AB6-8064-8A1897BC33FA}"/>
+                  <a16:creationId xmlns:a16="http://schemas.microsoft.com/office/drawing/2014/main" xmlns="" id="{73E2DD77-ABE3-4AB6-8064-8A1897BC33FA}"/>
                 </a:ext>
               </a:extLst>
             </p:cNvPr>
@@ -11539,7 +11546,7 @@
             <p:cNvPr id="7" name="Forma Livre: Forma 6">
               <a:extLst>
                 <a:ext uri="{FF2B5EF4-FFF2-40B4-BE49-F238E27FC236}">
-                  <a16:creationId xmlns:a16="http://schemas.microsoft.com/office/drawing/2014/main" id="{91383EB5-3876-4052-BCEB-546922009605}"/>
+                  <a16:creationId xmlns:a16="http://schemas.microsoft.com/office/drawing/2014/main" xmlns="" id="{91383EB5-3876-4052-BCEB-546922009605}"/>
                 </a:ext>
               </a:extLst>
             </p:cNvPr>
@@ -11835,7 +11842,7 @@
             <p:cNvPr id="8" name="Agrupar 7">
               <a:extLst>
                 <a:ext uri="{FF2B5EF4-FFF2-40B4-BE49-F238E27FC236}">
-                  <a16:creationId xmlns:a16="http://schemas.microsoft.com/office/drawing/2014/main" id="{B6C0F07C-BBFD-412D-8714-29C6E5CDE20C}"/>
+                  <a16:creationId xmlns:a16="http://schemas.microsoft.com/office/drawing/2014/main" xmlns="" id="{B6C0F07C-BBFD-412D-8714-29C6E5CDE20C}"/>
                 </a:ext>
               </a:extLst>
             </p:cNvPr>
@@ -11856,7 +11863,7 @@
               <p:cNvPr id="9" name="Cruz 8">
                 <a:extLst>
                   <a:ext uri="{FF2B5EF4-FFF2-40B4-BE49-F238E27FC236}">
-                    <a16:creationId xmlns:a16="http://schemas.microsoft.com/office/drawing/2014/main" id="{EFF07702-2113-4215-A608-8E3F9F0574E7}"/>
+                    <a16:creationId xmlns:a16="http://schemas.microsoft.com/office/drawing/2014/main" xmlns="" id="{EFF07702-2113-4215-A608-8E3F9F0574E7}"/>
                   </a:ext>
                 </a:extLst>
               </p:cNvPr>
@@ -11908,7 +11915,7 @@
               <p:cNvPr id="10" name="Cruz 9">
                 <a:extLst>
                   <a:ext uri="{FF2B5EF4-FFF2-40B4-BE49-F238E27FC236}">
-                    <a16:creationId xmlns:a16="http://schemas.microsoft.com/office/drawing/2014/main" id="{600E30CD-9F47-4B8F-9131-2AB2B1142669}"/>
+                    <a16:creationId xmlns:a16="http://schemas.microsoft.com/office/drawing/2014/main" xmlns="" id="{600E30CD-9F47-4B8F-9131-2AB2B1142669}"/>
                   </a:ext>
                 </a:extLst>
               </p:cNvPr>
@@ -11960,7 +11967,7 @@
               <p:cNvPr id="11" name="Cruz 10">
                 <a:extLst>
                   <a:ext uri="{FF2B5EF4-FFF2-40B4-BE49-F238E27FC236}">
-                    <a16:creationId xmlns:a16="http://schemas.microsoft.com/office/drawing/2014/main" id="{E2C6690A-3716-4B87-9BD5-58DB353DDE94}"/>
+                    <a16:creationId xmlns:a16="http://schemas.microsoft.com/office/drawing/2014/main" xmlns="" id="{E2C6690A-3716-4B87-9BD5-58DB353DDE94}"/>
                   </a:ext>
                 </a:extLst>
               </p:cNvPr>
@@ -12012,7 +12019,7 @@
               <p:cNvPr id="12" name="Grupo 19">
                 <a:extLst>
                   <a:ext uri="{FF2B5EF4-FFF2-40B4-BE49-F238E27FC236}">
-                    <a16:creationId xmlns:a16="http://schemas.microsoft.com/office/drawing/2014/main" id="{806100E0-936B-4250-AD2B-3E03C0765463}"/>
+                    <a16:creationId xmlns:a16="http://schemas.microsoft.com/office/drawing/2014/main" xmlns="" id="{806100E0-936B-4250-AD2B-3E03C0765463}"/>
                   </a:ext>
                 </a:extLst>
               </p:cNvPr>
@@ -12033,7 +12040,7 @@
                 <p:cNvPr id="13" name="Cruz 12">
                   <a:extLst>
                     <a:ext uri="{FF2B5EF4-FFF2-40B4-BE49-F238E27FC236}">
-                      <a16:creationId xmlns:a16="http://schemas.microsoft.com/office/drawing/2014/main" id="{12227CAC-73C7-4F77-B416-F5950FE07997}"/>
+                      <a16:creationId xmlns:a16="http://schemas.microsoft.com/office/drawing/2014/main" xmlns="" id="{12227CAC-73C7-4F77-B416-F5950FE07997}"/>
                     </a:ext>
                   </a:extLst>
                 </p:cNvPr>
@@ -12085,7 +12092,7 @@
                 <p:cNvPr id="14" name="Cruz 13">
                   <a:extLst>
                     <a:ext uri="{FF2B5EF4-FFF2-40B4-BE49-F238E27FC236}">
-                      <a16:creationId xmlns:a16="http://schemas.microsoft.com/office/drawing/2014/main" id="{B0E61E89-7F3D-422D-9164-7C9D09A06689}"/>
+                      <a16:creationId xmlns:a16="http://schemas.microsoft.com/office/drawing/2014/main" xmlns="" id="{B0E61E89-7F3D-422D-9164-7C9D09A06689}"/>
                     </a:ext>
                   </a:extLst>
                 </p:cNvPr>
@@ -12139,7 +12146,7 @@
             <p:cNvPr id="15" name="Grupo 1">
               <a:extLst>
                 <a:ext uri="{FF2B5EF4-FFF2-40B4-BE49-F238E27FC236}">
-                  <a16:creationId xmlns:a16="http://schemas.microsoft.com/office/drawing/2014/main" id="{40067425-BE84-4A51-B659-7BDA91520B0C}"/>
+                  <a16:creationId xmlns:a16="http://schemas.microsoft.com/office/drawing/2014/main" xmlns="" id="{40067425-BE84-4A51-B659-7BDA91520B0C}"/>
                 </a:ext>
               </a:extLst>
             </p:cNvPr>
@@ -12160,7 +12167,7 @@
               <p:cNvPr id="16" name="Retângulo 15">
                 <a:extLst>
                   <a:ext uri="{FF2B5EF4-FFF2-40B4-BE49-F238E27FC236}">
-                    <a16:creationId xmlns:a16="http://schemas.microsoft.com/office/drawing/2014/main" id="{43AC0D77-9687-4479-8573-23578652E6A5}"/>
+                    <a16:creationId xmlns:a16="http://schemas.microsoft.com/office/drawing/2014/main" xmlns="" id="{43AC0D77-9687-4479-8573-23578652E6A5}"/>
                   </a:ext>
                 </a:extLst>
               </p:cNvPr>
@@ -12210,7 +12217,7 @@
               <p:cNvPr id="17" name="Triângulo Retângulo 16">
                 <a:extLst>
                   <a:ext uri="{FF2B5EF4-FFF2-40B4-BE49-F238E27FC236}">
-                    <a16:creationId xmlns:a16="http://schemas.microsoft.com/office/drawing/2014/main" id="{B869CBF9-EA9D-42B4-B31D-F112807E583F}"/>
+                    <a16:creationId xmlns:a16="http://schemas.microsoft.com/office/drawing/2014/main" xmlns="" id="{B869CBF9-EA9D-42B4-B31D-F112807E583F}"/>
                   </a:ext>
                 </a:extLst>
               </p:cNvPr>
@@ -12262,7 +12269,7 @@
           <p:cNvPr id="57" name="Grupo 12">
             <a:extLst>
               <a:ext uri="{FF2B5EF4-FFF2-40B4-BE49-F238E27FC236}">
-                <a16:creationId xmlns:a16="http://schemas.microsoft.com/office/drawing/2014/main" id="{403A9A42-8023-405A-8817-EE75AB52C0CC}"/>
+                <a16:creationId xmlns:a16="http://schemas.microsoft.com/office/drawing/2014/main" xmlns="" id="{403A9A42-8023-405A-8817-EE75AB52C0CC}"/>
               </a:ext>
             </a:extLst>
           </p:cNvPr>
@@ -12282,7 +12289,7 @@
             <p:cNvPr id="58" name="Grupo 11">
               <a:extLst>
                 <a:ext uri="{FF2B5EF4-FFF2-40B4-BE49-F238E27FC236}">
-                  <a16:creationId xmlns:a16="http://schemas.microsoft.com/office/drawing/2014/main" id="{C6F65446-D9C0-4489-A698-727F1D6EF1EA}"/>
+                  <a16:creationId xmlns:a16="http://schemas.microsoft.com/office/drawing/2014/main" xmlns="" id="{C6F65446-D9C0-4489-A698-727F1D6EF1EA}"/>
                 </a:ext>
               </a:extLst>
             </p:cNvPr>
@@ -12302,7 +12309,7 @@
               <p:cNvPr id="65" name="Agrupar 3">
                 <a:extLst>
                   <a:ext uri="{FF2B5EF4-FFF2-40B4-BE49-F238E27FC236}">
-                    <a16:creationId xmlns:a16="http://schemas.microsoft.com/office/drawing/2014/main" id="{F930D6FA-C039-4412-8297-3174934678D7}"/>
+                    <a16:creationId xmlns:a16="http://schemas.microsoft.com/office/drawing/2014/main" xmlns="" id="{F930D6FA-C039-4412-8297-3174934678D7}"/>
                   </a:ext>
                 </a:extLst>
               </p:cNvPr>
@@ -12322,7 +12329,7 @@
                 <p:cNvPr id="74" name="Retângulo: Cantos Arredondados 4">
                   <a:extLst>
                     <a:ext uri="{FF2B5EF4-FFF2-40B4-BE49-F238E27FC236}">
-                      <a16:creationId xmlns:a16="http://schemas.microsoft.com/office/drawing/2014/main" id="{02ED9689-F86F-4320-A889-FE62BF218D61}"/>
+                      <a16:creationId xmlns:a16="http://schemas.microsoft.com/office/drawing/2014/main" xmlns="" id="{02ED9689-F86F-4320-A889-FE62BF218D61}"/>
                     </a:ext>
                   </a:extLst>
                 </p:cNvPr>
@@ -12373,7 +12380,7 @@
                 <p:cNvPr id="75" name="Retângulo: Cantos Arredondados 5">
                   <a:extLst>
                     <a:ext uri="{FF2B5EF4-FFF2-40B4-BE49-F238E27FC236}">
-                      <a16:creationId xmlns:a16="http://schemas.microsoft.com/office/drawing/2014/main" id="{01B0A967-695C-48C2-83E3-71944B0EFB15}"/>
+                      <a16:creationId xmlns:a16="http://schemas.microsoft.com/office/drawing/2014/main" xmlns="" id="{01B0A967-695C-48C2-83E3-71944B0EFB15}"/>
                     </a:ext>
                   </a:extLst>
                 </p:cNvPr>
@@ -12427,7 +12434,7 @@
                 <p:cNvPr id="76" name="Retângulo: Cantos Arredondados 6">
                   <a:extLst>
                     <a:ext uri="{FF2B5EF4-FFF2-40B4-BE49-F238E27FC236}">
-                      <a16:creationId xmlns:a16="http://schemas.microsoft.com/office/drawing/2014/main" id="{B9931D68-C986-4F09-8882-D64B2192A55C}"/>
+                      <a16:creationId xmlns:a16="http://schemas.microsoft.com/office/drawing/2014/main" xmlns="" id="{B9931D68-C986-4F09-8882-D64B2192A55C}"/>
                     </a:ext>
                   </a:extLst>
                 </p:cNvPr>
@@ -12481,7 +12488,7 @@
                 <p:cNvPr id="77" name="Forma Livre: Forma 7">
                   <a:extLst>
                     <a:ext uri="{FF2B5EF4-FFF2-40B4-BE49-F238E27FC236}">
-                      <a16:creationId xmlns:a16="http://schemas.microsoft.com/office/drawing/2014/main" id="{59255B60-DD8E-4A1C-BC5D-2F37826A1561}"/>
+                      <a16:creationId xmlns:a16="http://schemas.microsoft.com/office/drawing/2014/main" xmlns="" id="{59255B60-DD8E-4A1C-BC5D-2F37826A1561}"/>
                     </a:ext>
                   </a:extLst>
                 </p:cNvPr>
@@ -12612,7 +12619,7 @@
                 <p:cNvPr id="78" name="Retângulo 77">
                   <a:extLst>
                     <a:ext uri="{FF2B5EF4-FFF2-40B4-BE49-F238E27FC236}">
-                      <a16:creationId xmlns:a16="http://schemas.microsoft.com/office/drawing/2014/main" id="{C4D2138A-CA62-45C9-827C-0A2EF7196A19}"/>
+                      <a16:creationId xmlns:a16="http://schemas.microsoft.com/office/drawing/2014/main" xmlns="" id="{C4D2138A-CA62-45C9-827C-0A2EF7196A19}"/>
                     </a:ext>
                   </a:extLst>
                 </p:cNvPr>
@@ -12664,7 +12671,7 @@
                 <p:cNvPr id="79" name="Retângulo: Cantos Arredondados 9">
                   <a:extLst>
                     <a:ext uri="{FF2B5EF4-FFF2-40B4-BE49-F238E27FC236}">
-                      <a16:creationId xmlns:a16="http://schemas.microsoft.com/office/drawing/2014/main" id="{D4F04FAF-6733-4A03-8FEC-48EA27B77A7B}"/>
+                      <a16:creationId xmlns:a16="http://schemas.microsoft.com/office/drawing/2014/main" xmlns="" id="{D4F04FAF-6733-4A03-8FEC-48EA27B77A7B}"/>
                     </a:ext>
                   </a:extLst>
                 </p:cNvPr>
@@ -12718,7 +12725,7 @@
                 <p:cNvPr id="80" name="Retângulo: Cantos Arredondados 10">
                   <a:extLst>
                     <a:ext uri="{FF2B5EF4-FFF2-40B4-BE49-F238E27FC236}">
-                      <a16:creationId xmlns:a16="http://schemas.microsoft.com/office/drawing/2014/main" id="{E35C7B02-2931-4C43-B6C1-672A84321EF5}"/>
+                      <a16:creationId xmlns:a16="http://schemas.microsoft.com/office/drawing/2014/main" xmlns="" id="{E35C7B02-2931-4C43-B6C1-672A84321EF5}"/>
                     </a:ext>
                   </a:extLst>
                 </p:cNvPr>
@@ -12773,7 +12780,7 @@
               <p:cNvPr id="66" name="Agrupar 17">
                 <a:extLst>
                   <a:ext uri="{FF2B5EF4-FFF2-40B4-BE49-F238E27FC236}">
-                    <a16:creationId xmlns:a16="http://schemas.microsoft.com/office/drawing/2014/main" id="{FB1E34D3-361C-4048-9774-6DE71A21752E}"/>
+                    <a16:creationId xmlns:a16="http://schemas.microsoft.com/office/drawing/2014/main" xmlns="" id="{FB1E34D3-361C-4048-9774-6DE71A21752E}"/>
                   </a:ext>
                 </a:extLst>
               </p:cNvPr>
@@ -12793,7 +12800,7 @@
                 <p:cNvPr id="68" name="Forma Livre: Forma 18">
                   <a:extLst>
                     <a:ext uri="{FF2B5EF4-FFF2-40B4-BE49-F238E27FC236}">
-                      <a16:creationId xmlns:a16="http://schemas.microsoft.com/office/drawing/2014/main" id="{CD3A6BCD-0D5E-4BD6-882B-EEF61843CD0D}"/>
+                      <a16:creationId xmlns:a16="http://schemas.microsoft.com/office/drawing/2014/main" xmlns="" id="{CD3A6BCD-0D5E-4BD6-882B-EEF61843CD0D}"/>
                     </a:ext>
                   </a:extLst>
                 </p:cNvPr>
@@ -12928,7 +12935,7 @@
                 <p:cNvPr id="69" name="Forma Livre: Forma 19">
                   <a:extLst>
                     <a:ext uri="{FF2B5EF4-FFF2-40B4-BE49-F238E27FC236}">
-                      <a16:creationId xmlns:a16="http://schemas.microsoft.com/office/drawing/2014/main" id="{D7A274B4-1A7E-413F-8C6D-32B69A11A006}"/>
+                      <a16:creationId xmlns:a16="http://schemas.microsoft.com/office/drawing/2014/main" xmlns="" id="{D7A274B4-1A7E-413F-8C6D-32B69A11A006}"/>
                     </a:ext>
                   </a:extLst>
                 </p:cNvPr>
@@ -13063,7 +13070,7 @@
                 <p:cNvPr id="70" name="Elipse 69">
                   <a:extLst>
                     <a:ext uri="{FF2B5EF4-FFF2-40B4-BE49-F238E27FC236}">
-                      <a16:creationId xmlns:a16="http://schemas.microsoft.com/office/drawing/2014/main" id="{8A45001A-B9AB-4BED-8292-D95E0971B328}"/>
+                      <a16:creationId xmlns:a16="http://schemas.microsoft.com/office/drawing/2014/main" xmlns="" id="{8A45001A-B9AB-4BED-8292-D95E0971B328}"/>
                     </a:ext>
                   </a:extLst>
                 </p:cNvPr>
@@ -13115,7 +13122,7 @@
                 <p:cNvPr id="71" name="Retângulo: Cantos Arredondados 21">
                   <a:extLst>
                     <a:ext uri="{FF2B5EF4-FFF2-40B4-BE49-F238E27FC236}">
-                      <a16:creationId xmlns:a16="http://schemas.microsoft.com/office/drawing/2014/main" id="{1570863F-2A64-43EB-BBDB-42862A03776A}"/>
+                      <a16:creationId xmlns:a16="http://schemas.microsoft.com/office/drawing/2014/main" xmlns="" id="{1570863F-2A64-43EB-BBDB-42862A03776A}"/>
                     </a:ext>
                   </a:extLst>
                 </p:cNvPr>
@@ -13169,7 +13176,7 @@
                 <p:cNvPr id="72" name="Retângulo: Cantos Arredondados 22">
                   <a:extLst>
                     <a:ext uri="{FF2B5EF4-FFF2-40B4-BE49-F238E27FC236}">
-                      <a16:creationId xmlns:a16="http://schemas.microsoft.com/office/drawing/2014/main" id="{FEA18746-1B35-413A-975D-AA3FC016347D}"/>
+                      <a16:creationId xmlns:a16="http://schemas.microsoft.com/office/drawing/2014/main" xmlns="" id="{FEA18746-1B35-413A-975D-AA3FC016347D}"/>
                     </a:ext>
                   </a:extLst>
                 </p:cNvPr>
@@ -13223,7 +13230,7 @@
                 <p:cNvPr id="73" name="Retângulo: Cantos Arredondados 23">
                   <a:extLst>
                     <a:ext uri="{FF2B5EF4-FFF2-40B4-BE49-F238E27FC236}">
-                      <a16:creationId xmlns:a16="http://schemas.microsoft.com/office/drawing/2014/main" id="{E7B34203-85D3-444F-9473-3B5734FA52A7}"/>
+                      <a16:creationId xmlns:a16="http://schemas.microsoft.com/office/drawing/2014/main" xmlns="" id="{E7B34203-85D3-444F-9473-3B5734FA52A7}"/>
                     </a:ext>
                   </a:extLst>
                 </p:cNvPr>
@@ -13278,7 +13285,7 @@
               <p:cNvPr id="67" name="Forma Livre: Forma 24">
                 <a:extLst>
                   <a:ext uri="{FF2B5EF4-FFF2-40B4-BE49-F238E27FC236}">
-                    <a16:creationId xmlns:a16="http://schemas.microsoft.com/office/drawing/2014/main" id="{CE29CAC3-C9E2-4543-93BC-510BB64317AA}"/>
+                    <a16:creationId xmlns:a16="http://schemas.microsoft.com/office/drawing/2014/main" xmlns="" id="{CE29CAC3-C9E2-4543-93BC-510BB64317AA}"/>
                   </a:ext>
                 </a:extLst>
               </p:cNvPr>
@@ -13438,7 +13445,7 @@
             <p:cNvPr id="59" name="Agrupar 11">
               <a:extLst>
                 <a:ext uri="{FF2B5EF4-FFF2-40B4-BE49-F238E27FC236}">
-                  <a16:creationId xmlns:a16="http://schemas.microsoft.com/office/drawing/2014/main" id="{3ECCD1BD-DAAD-4C8D-B216-A467E9F25018}"/>
+                  <a16:creationId xmlns:a16="http://schemas.microsoft.com/office/drawing/2014/main" xmlns="" id="{3ECCD1BD-DAAD-4C8D-B216-A467E9F25018}"/>
                 </a:ext>
               </a:extLst>
             </p:cNvPr>
@@ -13458,7 +13465,7 @@
               <p:cNvPr id="63" name="Retângulo: Cantos Arredondados 12">
                 <a:extLst>
                   <a:ext uri="{FF2B5EF4-FFF2-40B4-BE49-F238E27FC236}">
-                    <a16:creationId xmlns:a16="http://schemas.microsoft.com/office/drawing/2014/main" id="{EF001B5E-6633-47D5-AD3A-1EF0B5338A66}"/>
+                    <a16:creationId xmlns:a16="http://schemas.microsoft.com/office/drawing/2014/main" xmlns="" id="{EF001B5E-6633-47D5-AD3A-1EF0B5338A66}"/>
                   </a:ext>
                 </a:extLst>
               </p:cNvPr>
@@ -13512,7 +13519,7 @@
               <p:cNvPr id="64" name="Retângulo: Cantos Arredondados 13">
                 <a:extLst>
                   <a:ext uri="{FF2B5EF4-FFF2-40B4-BE49-F238E27FC236}">
-                    <a16:creationId xmlns:a16="http://schemas.microsoft.com/office/drawing/2014/main" id="{35F5B17B-65E6-4FE7-9D78-825964BD7347}"/>
+                    <a16:creationId xmlns:a16="http://schemas.microsoft.com/office/drawing/2014/main" xmlns="" id="{35F5B17B-65E6-4FE7-9D78-825964BD7347}"/>
                   </a:ext>
                 </a:extLst>
               </p:cNvPr>
@@ -13567,7 +13574,7 @@
             <p:cNvPr id="60" name="Agrupar 14">
               <a:extLst>
                 <a:ext uri="{FF2B5EF4-FFF2-40B4-BE49-F238E27FC236}">
-                  <a16:creationId xmlns:a16="http://schemas.microsoft.com/office/drawing/2014/main" id="{00408DBE-37B7-485C-B1CC-728D91FC9C84}"/>
+                  <a16:creationId xmlns:a16="http://schemas.microsoft.com/office/drawing/2014/main" xmlns="" id="{00408DBE-37B7-485C-B1CC-728D91FC9C84}"/>
                 </a:ext>
               </a:extLst>
             </p:cNvPr>
@@ -13587,7 +13594,7 @@
               <p:cNvPr id="61" name="Retângulo: Cantos Arredondados 15">
                 <a:extLst>
                   <a:ext uri="{FF2B5EF4-FFF2-40B4-BE49-F238E27FC236}">
-                    <a16:creationId xmlns:a16="http://schemas.microsoft.com/office/drawing/2014/main" id="{67A26C7C-6C4E-4C8E-B1AD-E36E7B28CF23}"/>
+                    <a16:creationId xmlns:a16="http://schemas.microsoft.com/office/drawing/2014/main" xmlns="" id="{67A26C7C-6C4E-4C8E-B1AD-E36E7B28CF23}"/>
                   </a:ext>
                 </a:extLst>
               </p:cNvPr>
@@ -13641,7 +13648,7 @@
               <p:cNvPr id="62" name="Retângulo: Cantos Arredondados 16">
                 <a:extLst>
                   <a:ext uri="{FF2B5EF4-FFF2-40B4-BE49-F238E27FC236}">
-                    <a16:creationId xmlns:a16="http://schemas.microsoft.com/office/drawing/2014/main" id="{D3EA9BE5-38E7-4020-98B4-64A1D9817235}"/>
+                    <a16:creationId xmlns:a16="http://schemas.microsoft.com/office/drawing/2014/main" xmlns="" id="{D3EA9BE5-38E7-4020-98B4-64A1D9817235}"/>
                   </a:ext>
                 </a:extLst>
               </p:cNvPr>
@@ -13697,7 +13704,7 @@
           <p:cNvPr id="38" name="Grupo 10">
             <a:extLst>
               <a:ext uri="{FF2B5EF4-FFF2-40B4-BE49-F238E27FC236}">
-                <a16:creationId xmlns:a16="http://schemas.microsoft.com/office/drawing/2014/main" id="{820283F1-6C5D-4ADA-831F-607F6F76B4C9}"/>
+                <a16:creationId xmlns:a16="http://schemas.microsoft.com/office/drawing/2014/main" xmlns="" id="{820283F1-6C5D-4ADA-831F-607F6F76B4C9}"/>
               </a:ext>
             </a:extLst>
           </p:cNvPr>
@@ -13717,7 +13724,7 @@
             <p:cNvPr id="39" name="Agrupar 3">
               <a:extLst>
                 <a:ext uri="{FF2B5EF4-FFF2-40B4-BE49-F238E27FC236}">
-                  <a16:creationId xmlns:a16="http://schemas.microsoft.com/office/drawing/2014/main" id="{666F5F66-B0B3-450D-87A4-3071FF7FC187}"/>
+                  <a16:creationId xmlns:a16="http://schemas.microsoft.com/office/drawing/2014/main" xmlns="" id="{666F5F66-B0B3-450D-87A4-3071FF7FC187}"/>
                 </a:ext>
               </a:extLst>
             </p:cNvPr>
@@ -13737,7 +13744,7 @@
               <p:cNvPr id="50" name="Retângulo: Cantos Arredondados 4">
                 <a:extLst>
                   <a:ext uri="{FF2B5EF4-FFF2-40B4-BE49-F238E27FC236}">
-                    <a16:creationId xmlns:a16="http://schemas.microsoft.com/office/drawing/2014/main" id="{4D9B2370-7EB5-424A-A37F-A2E722B84B61}"/>
+                    <a16:creationId xmlns:a16="http://schemas.microsoft.com/office/drawing/2014/main" xmlns="" id="{4D9B2370-7EB5-424A-A37F-A2E722B84B61}"/>
                   </a:ext>
                 </a:extLst>
               </p:cNvPr>
@@ -13788,7 +13795,7 @@
               <p:cNvPr id="51" name="Retângulo: Cantos Arredondados 5">
                 <a:extLst>
                   <a:ext uri="{FF2B5EF4-FFF2-40B4-BE49-F238E27FC236}">
-                    <a16:creationId xmlns:a16="http://schemas.microsoft.com/office/drawing/2014/main" id="{33D07EB3-FC32-45C7-9363-8953E3222972}"/>
+                    <a16:creationId xmlns:a16="http://schemas.microsoft.com/office/drawing/2014/main" xmlns="" id="{33D07EB3-FC32-45C7-9363-8953E3222972}"/>
                   </a:ext>
                 </a:extLst>
               </p:cNvPr>
@@ -13842,7 +13849,7 @@
               <p:cNvPr id="52" name="Retângulo: Cantos Arredondados 6">
                 <a:extLst>
                   <a:ext uri="{FF2B5EF4-FFF2-40B4-BE49-F238E27FC236}">
-                    <a16:creationId xmlns:a16="http://schemas.microsoft.com/office/drawing/2014/main" id="{70C9F89C-0A33-4CD8-B443-6111AAE47D77}"/>
+                    <a16:creationId xmlns:a16="http://schemas.microsoft.com/office/drawing/2014/main" xmlns="" id="{70C9F89C-0A33-4CD8-B443-6111AAE47D77}"/>
                   </a:ext>
                 </a:extLst>
               </p:cNvPr>
@@ -13896,7 +13903,7 @@
               <p:cNvPr id="53" name="Forma Livre: Forma 7">
                 <a:extLst>
                   <a:ext uri="{FF2B5EF4-FFF2-40B4-BE49-F238E27FC236}">
-                    <a16:creationId xmlns:a16="http://schemas.microsoft.com/office/drawing/2014/main" id="{D83DDD28-61B7-4D25-A08A-2D0915811A5C}"/>
+                    <a16:creationId xmlns:a16="http://schemas.microsoft.com/office/drawing/2014/main" xmlns="" id="{D83DDD28-61B7-4D25-A08A-2D0915811A5C}"/>
                   </a:ext>
                 </a:extLst>
               </p:cNvPr>
@@ -14027,7 +14034,7 @@
               <p:cNvPr id="54" name="Retângulo 53">
                 <a:extLst>
                   <a:ext uri="{FF2B5EF4-FFF2-40B4-BE49-F238E27FC236}">
-                    <a16:creationId xmlns:a16="http://schemas.microsoft.com/office/drawing/2014/main" id="{6B2C3942-CD2E-4922-9715-FE9C07049939}"/>
+                    <a16:creationId xmlns:a16="http://schemas.microsoft.com/office/drawing/2014/main" xmlns="" id="{6B2C3942-CD2E-4922-9715-FE9C07049939}"/>
                   </a:ext>
                 </a:extLst>
               </p:cNvPr>
@@ -14079,7 +14086,7 @@
               <p:cNvPr id="55" name="Retângulo: Cantos Arredondados 9">
                 <a:extLst>
                   <a:ext uri="{FF2B5EF4-FFF2-40B4-BE49-F238E27FC236}">
-                    <a16:creationId xmlns:a16="http://schemas.microsoft.com/office/drawing/2014/main" id="{9422F0B7-E037-4EE3-BBE9-B53E1FDD9F23}"/>
+                    <a16:creationId xmlns:a16="http://schemas.microsoft.com/office/drawing/2014/main" xmlns="" id="{9422F0B7-E037-4EE3-BBE9-B53E1FDD9F23}"/>
                   </a:ext>
                 </a:extLst>
               </p:cNvPr>
@@ -14133,7 +14140,7 @@
               <p:cNvPr id="56" name="Retângulo: Cantos Arredondados 10">
                 <a:extLst>
                   <a:ext uri="{FF2B5EF4-FFF2-40B4-BE49-F238E27FC236}">
-                    <a16:creationId xmlns:a16="http://schemas.microsoft.com/office/drawing/2014/main" id="{B97B573A-7BD1-433F-950E-B76B702F0FC6}"/>
+                    <a16:creationId xmlns:a16="http://schemas.microsoft.com/office/drawing/2014/main" xmlns="" id="{B97B573A-7BD1-433F-950E-B76B702F0FC6}"/>
                   </a:ext>
                 </a:extLst>
               </p:cNvPr>
@@ -14188,7 +14195,7 @@
             <p:cNvPr id="40" name="Agrupar 17">
               <a:extLst>
                 <a:ext uri="{FF2B5EF4-FFF2-40B4-BE49-F238E27FC236}">
-                  <a16:creationId xmlns:a16="http://schemas.microsoft.com/office/drawing/2014/main" id="{ABB8787A-8C83-47D2-87A2-D9574F8B1903}"/>
+                  <a16:creationId xmlns:a16="http://schemas.microsoft.com/office/drawing/2014/main" xmlns="" id="{ABB8787A-8C83-47D2-87A2-D9574F8B1903}"/>
                 </a:ext>
               </a:extLst>
             </p:cNvPr>
@@ -14208,7 +14215,7 @@
               <p:cNvPr id="44" name="Forma Livre: Forma 18">
                 <a:extLst>
                   <a:ext uri="{FF2B5EF4-FFF2-40B4-BE49-F238E27FC236}">
-                    <a16:creationId xmlns:a16="http://schemas.microsoft.com/office/drawing/2014/main" id="{E51284B4-473B-4FC5-B9C9-D12EAE994A89}"/>
+                    <a16:creationId xmlns:a16="http://schemas.microsoft.com/office/drawing/2014/main" xmlns="" id="{E51284B4-473B-4FC5-B9C9-D12EAE994A89}"/>
                   </a:ext>
                 </a:extLst>
               </p:cNvPr>
@@ -14343,7 +14350,7 @@
               <p:cNvPr id="45" name="Forma Livre: Forma 19">
                 <a:extLst>
                   <a:ext uri="{FF2B5EF4-FFF2-40B4-BE49-F238E27FC236}">
-                    <a16:creationId xmlns:a16="http://schemas.microsoft.com/office/drawing/2014/main" id="{37ED7AB8-2693-4C1C-BF2E-25677D4BD67A}"/>
+                    <a16:creationId xmlns:a16="http://schemas.microsoft.com/office/drawing/2014/main" xmlns="" id="{37ED7AB8-2693-4C1C-BF2E-25677D4BD67A}"/>
                   </a:ext>
                 </a:extLst>
               </p:cNvPr>
@@ -14478,7 +14485,7 @@
               <p:cNvPr id="46" name="Elipse 45">
                 <a:extLst>
                   <a:ext uri="{FF2B5EF4-FFF2-40B4-BE49-F238E27FC236}">
-                    <a16:creationId xmlns:a16="http://schemas.microsoft.com/office/drawing/2014/main" id="{BA06344F-8C85-458D-9FAE-341FA5023637}"/>
+                    <a16:creationId xmlns:a16="http://schemas.microsoft.com/office/drawing/2014/main" xmlns="" id="{BA06344F-8C85-458D-9FAE-341FA5023637}"/>
                   </a:ext>
                 </a:extLst>
               </p:cNvPr>
@@ -14530,7 +14537,7 @@
               <p:cNvPr id="47" name="Retângulo: Cantos Arredondados 21">
                 <a:extLst>
                   <a:ext uri="{FF2B5EF4-FFF2-40B4-BE49-F238E27FC236}">
-                    <a16:creationId xmlns:a16="http://schemas.microsoft.com/office/drawing/2014/main" id="{D9F453B7-5B75-408F-835C-405D06F8337C}"/>
+                    <a16:creationId xmlns:a16="http://schemas.microsoft.com/office/drawing/2014/main" xmlns="" id="{D9F453B7-5B75-408F-835C-405D06F8337C}"/>
                   </a:ext>
                 </a:extLst>
               </p:cNvPr>
@@ -14584,7 +14591,7 @@
               <p:cNvPr id="48" name="Retângulo: Cantos Arredondados 22">
                 <a:extLst>
                   <a:ext uri="{FF2B5EF4-FFF2-40B4-BE49-F238E27FC236}">
-                    <a16:creationId xmlns:a16="http://schemas.microsoft.com/office/drawing/2014/main" id="{1FB2ED43-66B2-423F-A18A-AC28043BF24F}"/>
+                    <a16:creationId xmlns:a16="http://schemas.microsoft.com/office/drawing/2014/main" xmlns="" id="{1FB2ED43-66B2-423F-A18A-AC28043BF24F}"/>
                   </a:ext>
                 </a:extLst>
               </p:cNvPr>
@@ -14638,7 +14645,7 @@
               <p:cNvPr id="49" name="Retângulo: Cantos Arredondados 23">
                 <a:extLst>
                   <a:ext uri="{FF2B5EF4-FFF2-40B4-BE49-F238E27FC236}">
-                    <a16:creationId xmlns:a16="http://schemas.microsoft.com/office/drawing/2014/main" id="{3252869B-B8BF-4141-9268-77811F9C7E01}"/>
+                    <a16:creationId xmlns:a16="http://schemas.microsoft.com/office/drawing/2014/main" xmlns="" id="{3252869B-B8BF-4141-9268-77811F9C7E01}"/>
                   </a:ext>
                 </a:extLst>
               </p:cNvPr>
@@ -14693,7 +14700,7 @@
             <p:cNvPr id="41" name="Forma Livre: Forma 24">
               <a:extLst>
                 <a:ext uri="{FF2B5EF4-FFF2-40B4-BE49-F238E27FC236}">
-                  <a16:creationId xmlns:a16="http://schemas.microsoft.com/office/drawing/2014/main" id="{1F977B16-974F-4522-BCA5-C428B0913A73}"/>
+                  <a16:creationId xmlns:a16="http://schemas.microsoft.com/office/drawing/2014/main" xmlns="" id="{1F977B16-974F-4522-BCA5-C428B0913A73}"/>
                 </a:ext>
               </a:extLst>
             </p:cNvPr>
@@ -14852,7 +14859,7 @@
             <p:cNvPr id="42" name="Retângulo de cantos arredondados 6">
               <a:extLst>
                 <a:ext uri="{FF2B5EF4-FFF2-40B4-BE49-F238E27FC236}">
-                  <a16:creationId xmlns:a16="http://schemas.microsoft.com/office/drawing/2014/main" id="{702E445C-853C-4344-8C79-5434B3F84D3F}"/>
+                  <a16:creationId xmlns:a16="http://schemas.microsoft.com/office/drawing/2014/main" xmlns="" id="{702E445C-853C-4344-8C79-5434B3F84D3F}"/>
                 </a:ext>
               </a:extLst>
             </p:cNvPr>
@@ -14939,7 +14946,7 @@
             <p:cNvPr id="43" name="Retângulo de cantos arredondados 6">
               <a:extLst>
                 <a:ext uri="{FF2B5EF4-FFF2-40B4-BE49-F238E27FC236}">
-                  <a16:creationId xmlns:a16="http://schemas.microsoft.com/office/drawing/2014/main" id="{E8274172-0D1D-4E88-B43D-49880A4456B2}"/>
+                  <a16:creationId xmlns:a16="http://schemas.microsoft.com/office/drawing/2014/main" xmlns="" id="{E8274172-0D1D-4E88-B43D-49880A4456B2}"/>
                 </a:ext>
               </a:extLst>
             </p:cNvPr>
@@ -15027,7 +15034,7 @@
           <p:cNvPr id="81" name="Agrupar 80">
             <a:extLst>
               <a:ext uri="{FF2B5EF4-FFF2-40B4-BE49-F238E27FC236}">
-                <a16:creationId xmlns:a16="http://schemas.microsoft.com/office/drawing/2014/main" id="{16983F25-1B39-4996-818E-B134A94E7180}"/>
+                <a16:creationId xmlns:a16="http://schemas.microsoft.com/office/drawing/2014/main" xmlns="" id="{16983F25-1B39-4996-818E-B134A94E7180}"/>
               </a:ext>
             </a:extLst>
           </p:cNvPr>
@@ -15036,8 +15043,8 @@
         </p:nvGrpSpPr>
         <p:grpSpPr>
           <a:xfrm>
-            <a:off x="5525189" y="1415243"/>
-            <a:ext cx="2312525" cy="2757615"/>
+            <a:off x="5536426" y="1416245"/>
+            <a:ext cx="2298012" cy="2757615"/>
             <a:chOff x="15157549" y="3647728"/>
             <a:chExt cx="2298013" cy="2757615"/>
           </a:xfrm>
@@ -15047,7 +15054,7 @@
             <p:cNvPr id="82" name="Grupo 12">
               <a:extLst>
                 <a:ext uri="{FF2B5EF4-FFF2-40B4-BE49-F238E27FC236}">
-                  <a16:creationId xmlns:a16="http://schemas.microsoft.com/office/drawing/2014/main" id="{895E5361-20DC-40C8-9197-93DB459FE199}"/>
+                  <a16:creationId xmlns:a16="http://schemas.microsoft.com/office/drawing/2014/main" xmlns="" id="{895E5361-20DC-40C8-9197-93DB459FE199}"/>
                 </a:ext>
               </a:extLst>
             </p:cNvPr>
@@ -15067,7 +15074,7 @@
               <p:cNvPr id="86" name="Grupo 11">
                 <a:extLst>
                   <a:ext uri="{FF2B5EF4-FFF2-40B4-BE49-F238E27FC236}">
-                    <a16:creationId xmlns:a16="http://schemas.microsoft.com/office/drawing/2014/main" id="{1F15CF61-291C-4394-AC4A-C57F568D7406}"/>
+                    <a16:creationId xmlns:a16="http://schemas.microsoft.com/office/drawing/2014/main" xmlns="" id="{1F15CF61-291C-4394-AC4A-C57F568D7406}"/>
                   </a:ext>
                 </a:extLst>
               </p:cNvPr>
@@ -15087,7 +15094,7 @@
                 <p:cNvPr id="93" name="Agrupar 3">
                   <a:extLst>
                     <a:ext uri="{FF2B5EF4-FFF2-40B4-BE49-F238E27FC236}">
-                      <a16:creationId xmlns:a16="http://schemas.microsoft.com/office/drawing/2014/main" id="{4B524DF1-4FBF-4DCD-87DD-6933CA051DC1}"/>
+                      <a16:creationId xmlns:a16="http://schemas.microsoft.com/office/drawing/2014/main" xmlns="" id="{4B524DF1-4FBF-4DCD-87DD-6933CA051DC1}"/>
                     </a:ext>
                   </a:extLst>
                 </p:cNvPr>
@@ -15107,7 +15114,7 @@
                   <p:cNvPr id="101" name="Retângulo: Cantos Arredondados 4">
                     <a:extLst>
                       <a:ext uri="{FF2B5EF4-FFF2-40B4-BE49-F238E27FC236}">
-                        <a16:creationId xmlns:a16="http://schemas.microsoft.com/office/drawing/2014/main" id="{8D4B0446-458A-41F9-9F38-FA624B910448}"/>
+                        <a16:creationId xmlns:a16="http://schemas.microsoft.com/office/drawing/2014/main" xmlns="" id="{8D4B0446-458A-41F9-9F38-FA624B910448}"/>
                       </a:ext>
                     </a:extLst>
                   </p:cNvPr>
@@ -15158,7 +15165,7 @@
                   <p:cNvPr id="102" name="Retângulo: Cantos Arredondados 5">
                     <a:extLst>
                       <a:ext uri="{FF2B5EF4-FFF2-40B4-BE49-F238E27FC236}">
-                        <a16:creationId xmlns:a16="http://schemas.microsoft.com/office/drawing/2014/main" id="{C8D52F37-049A-43B9-AAAC-C3D32D8A4E7F}"/>
+                        <a16:creationId xmlns:a16="http://schemas.microsoft.com/office/drawing/2014/main" xmlns="" id="{C8D52F37-049A-43B9-AAAC-C3D32D8A4E7F}"/>
                       </a:ext>
                     </a:extLst>
                   </p:cNvPr>
@@ -15212,7 +15219,7 @@
                   <p:cNvPr id="103" name="Retângulo: Cantos Arredondados 6">
                     <a:extLst>
                       <a:ext uri="{FF2B5EF4-FFF2-40B4-BE49-F238E27FC236}">
-                        <a16:creationId xmlns:a16="http://schemas.microsoft.com/office/drawing/2014/main" id="{6410171E-B769-4DC5-BD52-1A881135387C}"/>
+                        <a16:creationId xmlns:a16="http://schemas.microsoft.com/office/drawing/2014/main" xmlns="" id="{6410171E-B769-4DC5-BD52-1A881135387C}"/>
                       </a:ext>
                     </a:extLst>
                   </p:cNvPr>
@@ -15266,7 +15273,7 @@
                   <p:cNvPr id="104" name="Forma Livre: Forma 7">
                     <a:extLst>
                       <a:ext uri="{FF2B5EF4-FFF2-40B4-BE49-F238E27FC236}">
-                        <a16:creationId xmlns:a16="http://schemas.microsoft.com/office/drawing/2014/main" id="{9C3633A1-F46F-454E-89FF-9C26F0E82536}"/>
+                        <a16:creationId xmlns:a16="http://schemas.microsoft.com/office/drawing/2014/main" xmlns="" id="{9C3633A1-F46F-454E-89FF-9C26F0E82536}"/>
                       </a:ext>
                     </a:extLst>
                   </p:cNvPr>
@@ -15397,7 +15404,7 @@
                   <p:cNvPr id="105" name="Retângulo 104">
                     <a:extLst>
                       <a:ext uri="{FF2B5EF4-FFF2-40B4-BE49-F238E27FC236}">
-                        <a16:creationId xmlns:a16="http://schemas.microsoft.com/office/drawing/2014/main" id="{C6677C20-D1C1-4FF7-84E5-1ABCD28E08FA}"/>
+                        <a16:creationId xmlns:a16="http://schemas.microsoft.com/office/drawing/2014/main" xmlns="" id="{C6677C20-D1C1-4FF7-84E5-1ABCD28E08FA}"/>
                       </a:ext>
                     </a:extLst>
                   </p:cNvPr>
@@ -15449,7 +15456,7 @@
                   <p:cNvPr id="106" name="Retângulo: Cantos Arredondados 9">
                     <a:extLst>
                       <a:ext uri="{FF2B5EF4-FFF2-40B4-BE49-F238E27FC236}">
-                        <a16:creationId xmlns:a16="http://schemas.microsoft.com/office/drawing/2014/main" id="{E50EAD44-EC47-4AC5-92EB-631085352C2D}"/>
+                        <a16:creationId xmlns:a16="http://schemas.microsoft.com/office/drawing/2014/main" xmlns="" id="{E50EAD44-EC47-4AC5-92EB-631085352C2D}"/>
                       </a:ext>
                     </a:extLst>
                   </p:cNvPr>
@@ -15503,7 +15510,7 @@
                   <p:cNvPr id="107" name="Retângulo: Cantos Arredondados 10">
                     <a:extLst>
                       <a:ext uri="{FF2B5EF4-FFF2-40B4-BE49-F238E27FC236}">
-                        <a16:creationId xmlns:a16="http://schemas.microsoft.com/office/drawing/2014/main" id="{2BF2A6E7-D817-4C0E-8EDC-EEEB6BBBFA13}"/>
+                        <a16:creationId xmlns:a16="http://schemas.microsoft.com/office/drawing/2014/main" xmlns="" id="{2BF2A6E7-D817-4C0E-8EDC-EEEB6BBBFA13}"/>
                       </a:ext>
                     </a:extLst>
                   </p:cNvPr>
@@ -15558,7 +15565,7 @@
                 <p:cNvPr id="94" name="Agrupar 93">
                   <a:extLst>
                     <a:ext uri="{FF2B5EF4-FFF2-40B4-BE49-F238E27FC236}">
-                      <a16:creationId xmlns:a16="http://schemas.microsoft.com/office/drawing/2014/main" id="{D8628CF8-F47D-4E27-8CDC-D58FB7CF8C36}"/>
+                      <a16:creationId xmlns:a16="http://schemas.microsoft.com/office/drawing/2014/main" xmlns="" id="{D8628CF8-F47D-4E27-8CDC-D58FB7CF8C36}"/>
                     </a:ext>
                   </a:extLst>
                 </p:cNvPr>
@@ -15578,7 +15585,7 @@
                   <p:cNvPr id="95" name="Forma Livre: Forma 94">
                     <a:extLst>
                       <a:ext uri="{FF2B5EF4-FFF2-40B4-BE49-F238E27FC236}">
-                        <a16:creationId xmlns:a16="http://schemas.microsoft.com/office/drawing/2014/main" id="{89DC7F12-19D9-42CD-8718-62513D53F5AD}"/>
+                        <a16:creationId xmlns:a16="http://schemas.microsoft.com/office/drawing/2014/main" xmlns="" id="{89DC7F12-19D9-42CD-8718-62513D53F5AD}"/>
                       </a:ext>
                     </a:extLst>
                   </p:cNvPr>
@@ -15713,7 +15720,7 @@
                   <p:cNvPr id="96" name="Forma Livre: Forma 95">
                     <a:extLst>
                       <a:ext uri="{FF2B5EF4-FFF2-40B4-BE49-F238E27FC236}">
-                        <a16:creationId xmlns:a16="http://schemas.microsoft.com/office/drawing/2014/main" id="{11C99363-6E30-4C1C-B8DC-809C57276743}"/>
+                        <a16:creationId xmlns:a16="http://schemas.microsoft.com/office/drawing/2014/main" xmlns="" id="{11C99363-6E30-4C1C-B8DC-809C57276743}"/>
                       </a:ext>
                     </a:extLst>
                   </p:cNvPr>
@@ -15848,7 +15855,7 @@
                   <p:cNvPr id="97" name="Elipse 96">
                     <a:extLst>
                       <a:ext uri="{FF2B5EF4-FFF2-40B4-BE49-F238E27FC236}">
-                        <a16:creationId xmlns:a16="http://schemas.microsoft.com/office/drawing/2014/main" id="{2CCF3187-84BD-449E-B437-7B5B3983433E}"/>
+                        <a16:creationId xmlns:a16="http://schemas.microsoft.com/office/drawing/2014/main" xmlns="" id="{2CCF3187-84BD-449E-B437-7B5B3983433E}"/>
                       </a:ext>
                     </a:extLst>
                   </p:cNvPr>
@@ -15900,7 +15907,7 @@
                   <p:cNvPr id="98" name="Retângulo: Cantos Arredondados 97">
                     <a:extLst>
                       <a:ext uri="{FF2B5EF4-FFF2-40B4-BE49-F238E27FC236}">
-                        <a16:creationId xmlns:a16="http://schemas.microsoft.com/office/drawing/2014/main" id="{BBACAF4A-AA43-4530-B9AE-2E0894AD5BD1}"/>
+                        <a16:creationId xmlns:a16="http://schemas.microsoft.com/office/drawing/2014/main" xmlns="" id="{BBACAF4A-AA43-4530-B9AE-2E0894AD5BD1}"/>
                       </a:ext>
                     </a:extLst>
                   </p:cNvPr>
@@ -15954,7 +15961,7 @@
                   <p:cNvPr id="99" name="Retângulo: Cantos Arredondados 98">
                     <a:extLst>
                       <a:ext uri="{FF2B5EF4-FFF2-40B4-BE49-F238E27FC236}">
-                        <a16:creationId xmlns:a16="http://schemas.microsoft.com/office/drawing/2014/main" id="{1832EC49-72EA-4FCA-BBCF-53A3987C8074}"/>
+                        <a16:creationId xmlns:a16="http://schemas.microsoft.com/office/drawing/2014/main" xmlns="" id="{1832EC49-72EA-4FCA-BBCF-53A3987C8074}"/>
                       </a:ext>
                     </a:extLst>
                   </p:cNvPr>
@@ -16008,7 +16015,7 @@
                   <p:cNvPr id="100" name="Retângulo: Cantos Arredondados 99">
                     <a:extLst>
                       <a:ext uri="{FF2B5EF4-FFF2-40B4-BE49-F238E27FC236}">
-                        <a16:creationId xmlns:a16="http://schemas.microsoft.com/office/drawing/2014/main" id="{4149D41B-6A79-40EF-AA89-2D0599E06E31}"/>
+                        <a16:creationId xmlns:a16="http://schemas.microsoft.com/office/drawing/2014/main" xmlns="" id="{4149D41B-6A79-40EF-AA89-2D0599E06E31}"/>
                       </a:ext>
                     </a:extLst>
                   </p:cNvPr>
@@ -16064,7 +16071,7 @@
               <p:cNvPr id="87" name="Agrupar 11">
                 <a:extLst>
                   <a:ext uri="{FF2B5EF4-FFF2-40B4-BE49-F238E27FC236}">
-                    <a16:creationId xmlns:a16="http://schemas.microsoft.com/office/drawing/2014/main" id="{FF1ACDFF-53C4-4046-8BAC-5659A177F97F}"/>
+                    <a16:creationId xmlns:a16="http://schemas.microsoft.com/office/drawing/2014/main" xmlns="" id="{FF1ACDFF-53C4-4046-8BAC-5659A177F97F}"/>
                   </a:ext>
                 </a:extLst>
               </p:cNvPr>
@@ -16084,7 +16091,7 @@
                 <p:cNvPr id="91" name="Retângulo: Cantos Arredondados 12">
                   <a:extLst>
                     <a:ext uri="{FF2B5EF4-FFF2-40B4-BE49-F238E27FC236}">
-                      <a16:creationId xmlns:a16="http://schemas.microsoft.com/office/drawing/2014/main" id="{32E5891B-A731-4FB5-ACF6-163B15D99891}"/>
+                      <a16:creationId xmlns:a16="http://schemas.microsoft.com/office/drawing/2014/main" xmlns="" id="{32E5891B-A731-4FB5-ACF6-163B15D99891}"/>
                     </a:ext>
                   </a:extLst>
                 </p:cNvPr>
@@ -16138,7 +16145,7 @@
                 <p:cNvPr id="92" name="Retângulo: Cantos Arredondados 13">
                   <a:extLst>
                     <a:ext uri="{FF2B5EF4-FFF2-40B4-BE49-F238E27FC236}">
-                      <a16:creationId xmlns:a16="http://schemas.microsoft.com/office/drawing/2014/main" id="{A814D18B-E602-4B8A-B9D1-141DB84BE861}"/>
+                      <a16:creationId xmlns:a16="http://schemas.microsoft.com/office/drawing/2014/main" xmlns="" id="{A814D18B-E602-4B8A-B9D1-141DB84BE861}"/>
                     </a:ext>
                   </a:extLst>
                 </p:cNvPr>
@@ -16193,7 +16200,7 @@
               <p:cNvPr id="88" name="Agrupar 14">
                 <a:extLst>
                   <a:ext uri="{FF2B5EF4-FFF2-40B4-BE49-F238E27FC236}">
-                    <a16:creationId xmlns:a16="http://schemas.microsoft.com/office/drawing/2014/main" id="{42451D24-90B3-4435-B4C1-6FA153B0B718}"/>
+                    <a16:creationId xmlns:a16="http://schemas.microsoft.com/office/drawing/2014/main" xmlns="" id="{42451D24-90B3-4435-B4C1-6FA153B0B718}"/>
                   </a:ext>
                 </a:extLst>
               </p:cNvPr>
@@ -16213,7 +16220,7 @@
                 <p:cNvPr id="89" name="Retângulo: Cantos Arredondados 15">
                   <a:extLst>
                     <a:ext uri="{FF2B5EF4-FFF2-40B4-BE49-F238E27FC236}">
-                      <a16:creationId xmlns:a16="http://schemas.microsoft.com/office/drawing/2014/main" id="{C1D98CE6-45EE-4230-94AF-921530AF0B61}"/>
+                      <a16:creationId xmlns:a16="http://schemas.microsoft.com/office/drawing/2014/main" xmlns="" id="{C1D98CE6-45EE-4230-94AF-921530AF0B61}"/>
                     </a:ext>
                   </a:extLst>
                 </p:cNvPr>
@@ -16267,7 +16274,7 @@
                 <p:cNvPr id="90" name="Retângulo: Cantos Arredondados 16">
                   <a:extLst>
                     <a:ext uri="{FF2B5EF4-FFF2-40B4-BE49-F238E27FC236}">
-                      <a16:creationId xmlns:a16="http://schemas.microsoft.com/office/drawing/2014/main" id="{DF5208D3-1CB5-409A-9B7D-5DA9FED0333F}"/>
+                      <a16:creationId xmlns:a16="http://schemas.microsoft.com/office/drawing/2014/main" xmlns="" id="{DF5208D3-1CB5-409A-9B7D-5DA9FED0333F}"/>
                     </a:ext>
                   </a:extLst>
                 </p:cNvPr>
@@ -16323,7 +16330,7 @@
             <p:cNvPr id="83" name="Agrupar 82">
               <a:extLst>
                 <a:ext uri="{FF2B5EF4-FFF2-40B4-BE49-F238E27FC236}">
-                  <a16:creationId xmlns:a16="http://schemas.microsoft.com/office/drawing/2014/main" id="{54960447-FDFF-45DE-A838-1492FDC600D6}"/>
+                  <a16:creationId xmlns:a16="http://schemas.microsoft.com/office/drawing/2014/main" xmlns="" id="{54960447-FDFF-45DE-A838-1492FDC600D6}"/>
                 </a:ext>
               </a:extLst>
             </p:cNvPr>
@@ -16343,7 +16350,7 @@
               <p:cNvPr id="84" name="Forma Livre: Forma 83">
                 <a:extLst>
                   <a:ext uri="{FF2B5EF4-FFF2-40B4-BE49-F238E27FC236}">
-                    <a16:creationId xmlns:a16="http://schemas.microsoft.com/office/drawing/2014/main" id="{1ECD66CD-F12E-4DA6-A566-D11A15F0E2FE}"/>
+                    <a16:creationId xmlns:a16="http://schemas.microsoft.com/office/drawing/2014/main" xmlns="" id="{1ECD66CD-F12E-4DA6-A566-D11A15F0E2FE}"/>
                   </a:ext>
                 </a:extLst>
               </p:cNvPr>
@@ -16450,7 +16457,7 @@
               <p:cNvPr id="85" name="Forma Livre: Forma 84">
                 <a:extLst>
                   <a:ext uri="{FF2B5EF4-FFF2-40B4-BE49-F238E27FC236}">
-                    <a16:creationId xmlns:a16="http://schemas.microsoft.com/office/drawing/2014/main" id="{D06248FC-2E8C-4724-9ADC-7EEFDB4EE49F}"/>
+                    <a16:creationId xmlns:a16="http://schemas.microsoft.com/office/drawing/2014/main" xmlns="" id="{D06248FC-2E8C-4724-9ADC-7EEFDB4EE49F}"/>
                   </a:ext>
                 </a:extLst>
               </p:cNvPr>
@@ -16590,6 +16597,970 @@
           </p:sp>
         </p:grpSp>
       </p:grpSp>
+      <p:grpSp>
+        <p:nvGrpSpPr>
+          <p:cNvPr id="20" name="Grupo 19"/>
+          <p:cNvGrpSpPr/>
+          <p:nvPr/>
+        </p:nvGrpSpPr>
+        <p:grpSpPr>
+          <a:xfrm>
+            <a:off x="-451490" y="-546971"/>
+            <a:ext cx="2582986" cy="2582986"/>
+            <a:chOff x="1028700" y="491655"/>
+            <a:chExt cx="1282060" cy="1282060"/>
+          </a:xfrm>
+          <a:solidFill>
+            <a:srgbClr val="0192E1"/>
+          </a:solidFill>
+        </p:grpSpPr>
+        <p:sp>
+          <p:nvSpPr>
+            <p:cNvPr id="19" name="Elipse 18"/>
+            <p:cNvSpPr/>
+            <p:nvPr/>
+          </p:nvSpPr>
+          <p:spPr>
+            <a:xfrm>
+              <a:off x="1028700" y="491655"/>
+              <a:ext cx="1282060" cy="1282060"/>
+            </a:xfrm>
+            <a:custGeom>
+              <a:avLst/>
+              <a:gdLst/>
+              <a:ahLst/>
+              <a:cxnLst/>
+              <a:rect l="l" t="t" r="r" b="b"/>
+              <a:pathLst>
+                <a:path w="1282060" h="1282060">
+                  <a:moveTo>
+                    <a:pt x="641030" y="229802"/>
+                  </a:moveTo>
+                  <a:cubicBezTo>
+                    <a:pt x="421930" y="229802"/>
+                    <a:pt x="244315" y="407417"/>
+                    <a:pt x="244315" y="626517"/>
+                  </a:cubicBezTo>
+                  <a:cubicBezTo>
+                    <a:pt x="244315" y="845617"/>
+                    <a:pt x="421930" y="1023232"/>
+                    <a:pt x="641030" y="1023232"/>
+                  </a:cubicBezTo>
+                  <a:cubicBezTo>
+                    <a:pt x="860130" y="1023232"/>
+                    <a:pt x="1037745" y="845617"/>
+                    <a:pt x="1037745" y="626517"/>
+                  </a:cubicBezTo>
+                  <a:cubicBezTo>
+                    <a:pt x="1037745" y="407417"/>
+                    <a:pt x="860130" y="229802"/>
+                    <a:pt x="641030" y="229802"/>
+                  </a:cubicBezTo>
+                  <a:close/>
+                  <a:moveTo>
+                    <a:pt x="641030" y="0"/>
+                  </a:moveTo>
+                  <a:cubicBezTo>
+                    <a:pt x="995061" y="0"/>
+                    <a:pt x="1282060" y="286999"/>
+                    <a:pt x="1282060" y="641030"/>
+                  </a:cubicBezTo>
+                  <a:cubicBezTo>
+                    <a:pt x="1282060" y="995061"/>
+                    <a:pt x="995061" y="1282060"/>
+                    <a:pt x="641030" y="1282060"/>
+                  </a:cubicBezTo>
+                  <a:cubicBezTo>
+                    <a:pt x="286999" y="1282060"/>
+                    <a:pt x="0" y="995061"/>
+                    <a:pt x="0" y="641030"/>
+                  </a:cubicBezTo>
+                  <a:cubicBezTo>
+                    <a:pt x="0" y="286999"/>
+                    <a:pt x="286999" y="0"/>
+                    <a:pt x="641030" y="0"/>
+                  </a:cubicBezTo>
+                  <a:close/>
+                </a:path>
+              </a:pathLst>
+            </a:custGeom>
+            <a:grpFill/>
+            <a:ln>
+              <a:noFill/>
+            </a:ln>
+          </p:spPr>
+          <p:style>
+            <a:lnRef idx="2">
+              <a:schemeClr val="accent1">
+                <a:shade val="50000"/>
+              </a:schemeClr>
+            </a:lnRef>
+            <a:fillRef idx="1">
+              <a:schemeClr val="accent1"/>
+            </a:fillRef>
+            <a:effectRef idx="0">
+              <a:schemeClr val="accent1"/>
+            </a:effectRef>
+            <a:fontRef idx="minor">
+              <a:schemeClr val="lt1"/>
+            </a:fontRef>
+          </p:style>
+          <p:txBody>
+            <a:bodyPr rtlCol="0" anchor="ctr"/>
+            <a:lstStyle/>
+            <a:p>
+              <a:pPr algn="ctr"/>
+              <a:endParaRPr lang="pt-BR"/>
+            </a:p>
+          </p:txBody>
+        </p:sp>
+        <p:sp>
+          <p:nvSpPr>
+            <p:cNvPr id="110" name="Elipse 18"/>
+            <p:cNvSpPr/>
+            <p:nvPr/>
+          </p:nvSpPr>
+          <p:spPr>
+            <a:xfrm>
+              <a:off x="1349215" y="812170"/>
+              <a:ext cx="641030" cy="641030"/>
+            </a:xfrm>
+            <a:custGeom>
+              <a:avLst/>
+              <a:gdLst/>
+              <a:ahLst/>
+              <a:cxnLst/>
+              <a:rect l="l" t="t" r="r" b="b"/>
+              <a:pathLst>
+                <a:path w="1282060" h="1282060">
+                  <a:moveTo>
+                    <a:pt x="641030" y="229802"/>
+                  </a:moveTo>
+                  <a:cubicBezTo>
+                    <a:pt x="421930" y="229802"/>
+                    <a:pt x="244315" y="407417"/>
+                    <a:pt x="244315" y="626517"/>
+                  </a:cubicBezTo>
+                  <a:cubicBezTo>
+                    <a:pt x="244315" y="845617"/>
+                    <a:pt x="421930" y="1023232"/>
+                    <a:pt x="641030" y="1023232"/>
+                  </a:cubicBezTo>
+                  <a:cubicBezTo>
+                    <a:pt x="860130" y="1023232"/>
+                    <a:pt x="1037745" y="845617"/>
+                    <a:pt x="1037745" y="626517"/>
+                  </a:cubicBezTo>
+                  <a:cubicBezTo>
+                    <a:pt x="1037745" y="407417"/>
+                    <a:pt x="860130" y="229802"/>
+                    <a:pt x="641030" y="229802"/>
+                  </a:cubicBezTo>
+                  <a:close/>
+                  <a:moveTo>
+                    <a:pt x="641030" y="0"/>
+                  </a:moveTo>
+                  <a:cubicBezTo>
+                    <a:pt x="995061" y="0"/>
+                    <a:pt x="1282060" y="286999"/>
+                    <a:pt x="1282060" y="641030"/>
+                  </a:cubicBezTo>
+                  <a:cubicBezTo>
+                    <a:pt x="1282060" y="995061"/>
+                    <a:pt x="995061" y="1282060"/>
+                    <a:pt x="641030" y="1282060"/>
+                  </a:cubicBezTo>
+                  <a:cubicBezTo>
+                    <a:pt x="286999" y="1282060"/>
+                    <a:pt x="0" y="995061"/>
+                    <a:pt x="0" y="641030"/>
+                  </a:cubicBezTo>
+                  <a:cubicBezTo>
+                    <a:pt x="0" y="286999"/>
+                    <a:pt x="286999" y="0"/>
+                    <a:pt x="641030" y="0"/>
+                  </a:cubicBezTo>
+                  <a:close/>
+                </a:path>
+              </a:pathLst>
+            </a:custGeom>
+            <a:grpFill/>
+            <a:ln>
+              <a:noFill/>
+            </a:ln>
+          </p:spPr>
+          <p:style>
+            <a:lnRef idx="2">
+              <a:schemeClr val="accent1">
+                <a:shade val="50000"/>
+              </a:schemeClr>
+            </a:lnRef>
+            <a:fillRef idx="1">
+              <a:schemeClr val="accent1"/>
+            </a:fillRef>
+            <a:effectRef idx="0">
+              <a:schemeClr val="accent1"/>
+            </a:effectRef>
+            <a:fontRef idx="minor">
+              <a:schemeClr val="lt1"/>
+            </a:fontRef>
+          </p:style>
+          <p:txBody>
+            <a:bodyPr rtlCol="0" anchor="ctr"/>
+            <a:lstStyle/>
+            <a:p>
+              <a:pPr algn="ctr"/>
+              <a:endParaRPr lang="pt-BR"/>
+            </a:p>
+          </p:txBody>
+        </p:sp>
+      </p:grpSp>
+      <p:grpSp>
+        <p:nvGrpSpPr>
+          <p:cNvPr id="111" name="Grupo 110"/>
+          <p:cNvGrpSpPr/>
+          <p:nvPr/>
+        </p:nvGrpSpPr>
+        <p:grpSpPr>
+          <a:xfrm>
+            <a:off x="840003" y="4636496"/>
+            <a:ext cx="1114313" cy="1114313"/>
+            <a:chOff x="1028700" y="491655"/>
+            <a:chExt cx="1282060" cy="1282060"/>
+          </a:xfrm>
+          <a:solidFill>
+            <a:srgbClr val="0192E1"/>
+          </a:solidFill>
+        </p:grpSpPr>
+        <p:sp>
+          <p:nvSpPr>
+            <p:cNvPr id="112" name="Elipse 18"/>
+            <p:cNvSpPr/>
+            <p:nvPr/>
+          </p:nvSpPr>
+          <p:spPr>
+            <a:xfrm>
+              <a:off x="1028700" y="491655"/>
+              <a:ext cx="1282060" cy="1282060"/>
+            </a:xfrm>
+            <a:custGeom>
+              <a:avLst/>
+              <a:gdLst/>
+              <a:ahLst/>
+              <a:cxnLst/>
+              <a:rect l="l" t="t" r="r" b="b"/>
+              <a:pathLst>
+                <a:path w="1282060" h="1282060">
+                  <a:moveTo>
+                    <a:pt x="641030" y="229802"/>
+                  </a:moveTo>
+                  <a:cubicBezTo>
+                    <a:pt x="421930" y="229802"/>
+                    <a:pt x="244315" y="407417"/>
+                    <a:pt x="244315" y="626517"/>
+                  </a:cubicBezTo>
+                  <a:cubicBezTo>
+                    <a:pt x="244315" y="845617"/>
+                    <a:pt x="421930" y="1023232"/>
+                    <a:pt x="641030" y="1023232"/>
+                  </a:cubicBezTo>
+                  <a:cubicBezTo>
+                    <a:pt x="860130" y="1023232"/>
+                    <a:pt x="1037745" y="845617"/>
+                    <a:pt x="1037745" y="626517"/>
+                  </a:cubicBezTo>
+                  <a:cubicBezTo>
+                    <a:pt x="1037745" y="407417"/>
+                    <a:pt x="860130" y="229802"/>
+                    <a:pt x="641030" y="229802"/>
+                  </a:cubicBezTo>
+                  <a:close/>
+                  <a:moveTo>
+                    <a:pt x="641030" y="0"/>
+                  </a:moveTo>
+                  <a:cubicBezTo>
+                    <a:pt x="995061" y="0"/>
+                    <a:pt x="1282060" y="286999"/>
+                    <a:pt x="1282060" y="641030"/>
+                  </a:cubicBezTo>
+                  <a:cubicBezTo>
+                    <a:pt x="1282060" y="995061"/>
+                    <a:pt x="995061" y="1282060"/>
+                    <a:pt x="641030" y="1282060"/>
+                  </a:cubicBezTo>
+                  <a:cubicBezTo>
+                    <a:pt x="286999" y="1282060"/>
+                    <a:pt x="0" y="995061"/>
+                    <a:pt x="0" y="641030"/>
+                  </a:cubicBezTo>
+                  <a:cubicBezTo>
+                    <a:pt x="0" y="286999"/>
+                    <a:pt x="286999" y="0"/>
+                    <a:pt x="641030" y="0"/>
+                  </a:cubicBezTo>
+                  <a:close/>
+                </a:path>
+              </a:pathLst>
+            </a:custGeom>
+            <a:grpFill/>
+            <a:ln>
+              <a:noFill/>
+            </a:ln>
+          </p:spPr>
+          <p:style>
+            <a:lnRef idx="2">
+              <a:schemeClr val="accent1">
+                <a:shade val="50000"/>
+              </a:schemeClr>
+            </a:lnRef>
+            <a:fillRef idx="1">
+              <a:schemeClr val="accent1"/>
+            </a:fillRef>
+            <a:effectRef idx="0">
+              <a:schemeClr val="accent1"/>
+            </a:effectRef>
+            <a:fontRef idx="minor">
+              <a:schemeClr val="lt1"/>
+            </a:fontRef>
+          </p:style>
+          <p:txBody>
+            <a:bodyPr rtlCol="0" anchor="ctr"/>
+            <a:lstStyle/>
+            <a:p>
+              <a:pPr algn="ctr"/>
+              <a:endParaRPr lang="pt-BR"/>
+            </a:p>
+          </p:txBody>
+        </p:sp>
+        <p:sp>
+          <p:nvSpPr>
+            <p:cNvPr id="113" name="Elipse 18"/>
+            <p:cNvSpPr/>
+            <p:nvPr/>
+          </p:nvSpPr>
+          <p:spPr>
+            <a:xfrm>
+              <a:off x="1349215" y="812170"/>
+              <a:ext cx="641030" cy="641030"/>
+            </a:xfrm>
+            <a:custGeom>
+              <a:avLst/>
+              <a:gdLst/>
+              <a:ahLst/>
+              <a:cxnLst/>
+              <a:rect l="l" t="t" r="r" b="b"/>
+              <a:pathLst>
+                <a:path w="1282060" h="1282060">
+                  <a:moveTo>
+                    <a:pt x="641030" y="229802"/>
+                  </a:moveTo>
+                  <a:cubicBezTo>
+                    <a:pt x="421930" y="229802"/>
+                    <a:pt x="244315" y="407417"/>
+                    <a:pt x="244315" y="626517"/>
+                  </a:cubicBezTo>
+                  <a:cubicBezTo>
+                    <a:pt x="244315" y="845617"/>
+                    <a:pt x="421930" y="1023232"/>
+                    <a:pt x="641030" y="1023232"/>
+                  </a:cubicBezTo>
+                  <a:cubicBezTo>
+                    <a:pt x="860130" y="1023232"/>
+                    <a:pt x="1037745" y="845617"/>
+                    <a:pt x="1037745" y="626517"/>
+                  </a:cubicBezTo>
+                  <a:cubicBezTo>
+                    <a:pt x="1037745" y="407417"/>
+                    <a:pt x="860130" y="229802"/>
+                    <a:pt x="641030" y="229802"/>
+                  </a:cubicBezTo>
+                  <a:close/>
+                  <a:moveTo>
+                    <a:pt x="641030" y="0"/>
+                  </a:moveTo>
+                  <a:cubicBezTo>
+                    <a:pt x="995061" y="0"/>
+                    <a:pt x="1282060" y="286999"/>
+                    <a:pt x="1282060" y="641030"/>
+                  </a:cubicBezTo>
+                  <a:cubicBezTo>
+                    <a:pt x="1282060" y="995061"/>
+                    <a:pt x="995061" y="1282060"/>
+                    <a:pt x="641030" y="1282060"/>
+                  </a:cubicBezTo>
+                  <a:cubicBezTo>
+                    <a:pt x="286999" y="1282060"/>
+                    <a:pt x="0" y="995061"/>
+                    <a:pt x="0" y="641030"/>
+                  </a:cubicBezTo>
+                  <a:cubicBezTo>
+                    <a:pt x="0" y="286999"/>
+                    <a:pt x="286999" y="0"/>
+                    <a:pt x="641030" y="0"/>
+                  </a:cubicBezTo>
+                  <a:close/>
+                </a:path>
+              </a:pathLst>
+            </a:custGeom>
+            <a:grpFill/>
+            <a:ln>
+              <a:noFill/>
+            </a:ln>
+          </p:spPr>
+          <p:style>
+            <a:lnRef idx="2">
+              <a:schemeClr val="accent1">
+                <a:shade val="50000"/>
+              </a:schemeClr>
+            </a:lnRef>
+            <a:fillRef idx="1">
+              <a:schemeClr val="accent1"/>
+            </a:fillRef>
+            <a:effectRef idx="0">
+              <a:schemeClr val="accent1"/>
+            </a:effectRef>
+            <a:fontRef idx="minor">
+              <a:schemeClr val="lt1"/>
+            </a:fontRef>
+          </p:style>
+          <p:txBody>
+            <a:bodyPr rtlCol="0" anchor="ctr"/>
+            <a:lstStyle/>
+            <a:p>
+              <a:pPr algn="ctr"/>
+              <a:endParaRPr lang="pt-BR"/>
+            </a:p>
+          </p:txBody>
+        </p:sp>
+      </p:grpSp>
+      <p:grpSp>
+        <p:nvGrpSpPr>
+          <p:cNvPr id="114" name="Grupo 113"/>
+          <p:cNvGrpSpPr/>
+          <p:nvPr/>
+        </p:nvGrpSpPr>
+        <p:grpSpPr>
+          <a:xfrm>
+            <a:off x="10474404" y="4247579"/>
+            <a:ext cx="1334989" cy="1334989"/>
+            <a:chOff x="1028700" y="491655"/>
+            <a:chExt cx="1282060" cy="1282060"/>
+          </a:xfrm>
+          <a:solidFill>
+            <a:srgbClr val="0192E1"/>
+          </a:solidFill>
+        </p:grpSpPr>
+        <p:sp>
+          <p:nvSpPr>
+            <p:cNvPr id="115" name="Elipse 18"/>
+            <p:cNvSpPr/>
+            <p:nvPr/>
+          </p:nvSpPr>
+          <p:spPr>
+            <a:xfrm>
+              <a:off x="1028700" y="491655"/>
+              <a:ext cx="1282060" cy="1282060"/>
+            </a:xfrm>
+            <a:custGeom>
+              <a:avLst/>
+              <a:gdLst/>
+              <a:ahLst/>
+              <a:cxnLst/>
+              <a:rect l="l" t="t" r="r" b="b"/>
+              <a:pathLst>
+                <a:path w="1282060" h="1282060">
+                  <a:moveTo>
+                    <a:pt x="641030" y="229802"/>
+                  </a:moveTo>
+                  <a:cubicBezTo>
+                    <a:pt x="421930" y="229802"/>
+                    <a:pt x="244315" y="407417"/>
+                    <a:pt x="244315" y="626517"/>
+                  </a:cubicBezTo>
+                  <a:cubicBezTo>
+                    <a:pt x="244315" y="845617"/>
+                    <a:pt x="421930" y="1023232"/>
+                    <a:pt x="641030" y="1023232"/>
+                  </a:cubicBezTo>
+                  <a:cubicBezTo>
+                    <a:pt x="860130" y="1023232"/>
+                    <a:pt x="1037745" y="845617"/>
+                    <a:pt x="1037745" y="626517"/>
+                  </a:cubicBezTo>
+                  <a:cubicBezTo>
+                    <a:pt x="1037745" y="407417"/>
+                    <a:pt x="860130" y="229802"/>
+                    <a:pt x="641030" y="229802"/>
+                  </a:cubicBezTo>
+                  <a:close/>
+                  <a:moveTo>
+                    <a:pt x="641030" y="0"/>
+                  </a:moveTo>
+                  <a:cubicBezTo>
+                    <a:pt x="995061" y="0"/>
+                    <a:pt x="1282060" y="286999"/>
+                    <a:pt x="1282060" y="641030"/>
+                  </a:cubicBezTo>
+                  <a:cubicBezTo>
+                    <a:pt x="1282060" y="995061"/>
+                    <a:pt x="995061" y="1282060"/>
+                    <a:pt x="641030" y="1282060"/>
+                  </a:cubicBezTo>
+                  <a:cubicBezTo>
+                    <a:pt x="286999" y="1282060"/>
+                    <a:pt x="0" y="995061"/>
+                    <a:pt x="0" y="641030"/>
+                  </a:cubicBezTo>
+                  <a:cubicBezTo>
+                    <a:pt x="0" y="286999"/>
+                    <a:pt x="286999" y="0"/>
+                    <a:pt x="641030" y="0"/>
+                  </a:cubicBezTo>
+                  <a:close/>
+                </a:path>
+              </a:pathLst>
+            </a:custGeom>
+            <a:grpFill/>
+            <a:ln>
+              <a:noFill/>
+            </a:ln>
+          </p:spPr>
+          <p:style>
+            <a:lnRef idx="2">
+              <a:schemeClr val="accent1">
+                <a:shade val="50000"/>
+              </a:schemeClr>
+            </a:lnRef>
+            <a:fillRef idx="1">
+              <a:schemeClr val="accent1"/>
+            </a:fillRef>
+            <a:effectRef idx="0">
+              <a:schemeClr val="accent1"/>
+            </a:effectRef>
+            <a:fontRef idx="minor">
+              <a:schemeClr val="lt1"/>
+            </a:fontRef>
+          </p:style>
+          <p:txBody>
+            <a:bodyPr rtlCol="0" anchor="ctr"/>
+            <a:lstStyle/>
+            <a:p>
+              <a:pPr algn="ctr"/>
+              <a:endParaRPr lang="pt-BR"/>
+            </a:p>
+          </p:txBody>
+        </p:sp>
+        <p:sp>
+          <p:nvSpPr>
+            <p:cNvPr id="116" name="Elipse 18"/>
+            <p:cNvSpPr/>
+            <p:nvPr/>
+          </p:nvSpPr>
+          <p:spPr>
+            <a:xfrm>
+              <a:off x="1349215" y="812170"/>
+              <a:ext cx="641030" cy="641030"/>
+            </a:xfrm>
+            <a:custGeom>
+              <a:avLst/>
+              <a:gdLst/>
+              <a:ahLst/>
+              <a:cxnLst/>
+              <a:rect l="l" t="t" r="r" b="b"/>
+              <a:pathLst>
+                <a:path w="1282060" h="1282060">
+                  <a:moveTo>
+                    <a:pt x="641030" y="229802"/>
+                  </a:moveTo>
+                  <a:cubicBezTo>
+                    <a:pt x="421930" y="229802"/>
+                    <a:pt x="244315" y="407417"/>
+                    <a:pt x="244315" y="626517"/>
+                  </a:cubicBezTo>
+                  <a:cubicBezTo>
+                    <a:pt x="244315" y="845617"/>
+                    <a:pt x="421930" y="1023232"/>
+                    <a:pt x="641030" y="1023232"/>
+                  </a:cubicBezTo>
+                  <a:cubicBezTo>
+                    <a:pt x="860130" y="1023232"/>
+                    <a:pt x="1037745" y="845617"/>
+                    <a:pt x="1037745" y="626517"/>
+                  </a:cubicBezTo>
+                  <a:cubicBezTo>
+                    <a:pt x="1037745" y="407417"/>
+                    <a:pt x="860130" y="229802"/>
+                    <a:pt x="641030" y="229802"/>
+                  </a:cubicBezTo>
+                  <a:close/>
+                  <a:moveTo>
+                    <a:pt x="641030" y="0"/>
+                  </a:moveTo>
+                  <a:cubicBezTo>
+                    <a:pt x="995061" y="0"/>
+                    <a:pt x="1282060" y="286999"/>
+                    <a:pt x="1282060" y="641030"/>
+                  </a:cubicBezTo>
+                  <a:cubicBezTo>
+                    <a:pt x="1282060" y="995061"/>
+                    <a:pt x="995061" y="1282060"/>
+                    <a:pt x="641030" y="1282060"/>
+                  </a:cubicBezTo>
+                  <a:cubicBezTo>
+                    <a:pt x="286999" y="1282060"/>
+                    <a:pt x="0" y="995061"/>
+                    <a:pt x="0" y="641030"/>
+                  </a:cubicBezTo>
+                  <a:cubicBezTo>
+                    <a:pt x="0" y="286999"/>
+                    <a:pt x="286999" y="0"/>
+                    <a:pt x="641030" y="0"/>
+                  </a:cubicBezTo>
+                  <a:close/>
+                </a:path>
+              </a:pathLst>
+            </a:custGeom>
+            <a:grpFill/>
+            <a:ln>
+              <a:noFill/>
+            </a:ln>
+          </p:spPr>
+          <p:style>
+            <a:lnRef idx="2">
+              <a:schemeClr val="accent1">
+                <a:shade val="50000"/>
+              </a:schemeClr>
+            </a:lnRef>
+            <a:fillRef idx="1">
+              <a:schemeClr val="accent1"/>
+            </a:fillRef>
+            <a:effectRef idx="0">
+              <a:schemeClr val="accent1"/>
+            </a:effectRef>
+            <a:fontRef idx="minor">
+              <a:schemeClr val="lt1"/>
+            </a:fontRef>
+          </p:style>
+          <p:txBody>
+            <a:bodyPr rtlCol="0" anchor="ctr"/>
+            <a:lstStyle/>
+            <a:p>
+              <a:pPr algn="ctr"/>
+              <a:endParaRPr lang="pt-BR"/>
+            </a:p>
+          </p:txBody>
+        </p:sp>
+      </p:grpSp>
+      <p:grpSp>
+        <p:nvGrpSpPr>
+          <p:cNvPr id="117" name="Grupo 116"/>
+          <p:cNvGrpSpPr/>
+          <p:nvPr/>
+        </p:nvGrpSpPr>
+        <p:grpSpPr>
+          <a:xfrm>
+            <a:off x="9166769" y="5207041"/>
+            <a:ext cx="1207235" cy="1207235"/>
+            <a:chOff x="1028700" y="491655"/>
+            <a:chExt cx="1282060" cy="1282060"/>
+          </a:xfrm>
+          <a:solidFill>
+            <a:srgbClr val="0192E1"/>
+          </a:solidFill>
+        </p:grpSpPr>
+        <p:sp>
+          <p:nvSpPr>
+            <p:cNvPr id="118" name="Elipse 18"/>
+            <p:cNvSpPr/>
+            <p:nvPr/>
+          </p:nvSpPr>
+          <p:spPr>
+            <a:xfrm>
+              <a:off x="1028700" y="491655"/>
+              <a:ext cx="1282060" cy="1282060"/>
+            </a:xfrm>
+            <a:custGeom>
+              <a:avLst/>
+              <a:gdLst/>
+              <a:ahLst/>
+              <a:cxnLst/>
+              <a:rect l="l" t="t" r="r" b="b"/>
+              <a:pathLst>
+                <a:path w="1282060" h="1282060">
+                  <a:moveTo>
+                    <a:pt x="641030" y="229802"/>
+                  </a:moveTo>
+                  <a:cubicBezTo>
+                    <a:pt x="421930" y="229802"/>
+                    <a:pt x="244315" y="407417"/>
+                    <a:pt x="244315" y="626517"/>
+                  </a:cubicBezTo>
+                  <a:cubicBezTo>
+                    <a:pt x="244315" y="845617"/>
+                    <a:pt x="421930" y="1023232"/>
+                    <a:pt x="641030" y="1023232"/>
+                  </a:cubicBezTo>
+                  <a:cubicBezTo>
+                    <a:pt x="860130" y="1023232"/>
+                    <a:pt x="1037745" y="845617"/>
+                    <a:pt x="1037745" y="626517"/>
+                  </a:cubicBezTo>
+                  <a:cubicBezTo>
+                    <a:pt x="1037745" y="407417"/>
+                    <a:pt x="860130" y="229802"/>
+                    <a:pt x="641030" y="229802"/>
+                  </a:cubicBezTo>
+                  <a:close/>
+                  <a:moveTo>
+                    <a:pt x="641030" y="0"/>
+                  </a:moveTo>
+                  <a:cubicBezTo>
+                    <a:pt x="995061" y="0"/>
+                    <a:pt x="1282060" y="286999"/>
+                    <a:pt x="1282060" y="641030"/>
+                  </a:cubicBezTo>
+                  <a:cubicBezTo>
+                    <a:pt x="1282060" y="995061"/>
+                    <a:pt x="995061" y="1282060"/>
+                    <a:pt x="641030" y="1282060"/>
+                  </a:cubicBezTo>
+                  <a:cubicBezTo>
+                    <a:pt x="286999" y="1282060"/>
+                    <a:pt x="0" y="995061"/>
+                    <a:pt x="0" y="641030"/>
+                  </a:cubicBezTo>
+                  <a:cubicBezTo>
+                    <a:pt x="0" y="286999"/>
+                    <a:pt x="286999" y="0"/>
+                    <a:pt x="641030" y="0"/>
+                  </a:cubicBezTo>
+                  <a:close/>
+                </a:path>
+              </a:pathLst>
+            </a:custGeom>
+            <a:grpFill/>
+            <a:ln>
+              <a:noFill/>
+            </a:ln>
+          </p:spPr>
+          <p:style>
+            <a:lnRef idx="2">
+              <a:schemeClr val="accent1">
+                <a:shade val="50000"/>
+              </a:schemeClr>
+            </a:lnRef>
+            <a:fillRef idx="1">
+              <a:schemeClr val="accent1"/>
+            </a:fillRef>
+            <a:effectRef idx="0">
+              <a:schemeClr val="accent1"/>
+            </a:effectRef>
+            <a:fontRef idx="minor">
+              <a:schemeClr val="lt1"/>
+            </a:fontRef>
+          </p:style>
+          <p:txBody>
+            <a:bodyPr rtlCol="0" anchor="ctr"/>
+            <a:lstStyle/>
+            <a:p>
+              <a:pPr algn="ctr"/>
+              <a:endParaRPr lang="pt-BR"/>
+            </a:p>
+          </p:txBody>
+        </p:sp>
+        <p:sp>
+          <p:nvSpPr>
+            <p:cNvPr id="119" name="Elipse 18"/>
+            <p:cNvSpPr/>
+            <p:nvPr/>
+          </p:nvSpPr>
+          <p:spPr>
+            <a:xfrm>
+              <a:off x="1349215" y="812170"/>
+              <a:ext cx="641030" cy="641030"/>
+            </a:xfrm>
+            <a:custGeom>
+              <a:avLst/>
+              <a:gdLst/>
+              <a:ahLst/>
+              <a:cxnLst/>
+              <a:rect l="l" t="t" r="r" b="b"/>
+              <a:pathLst>
+                <a:path w="1282060" h="1282060">
+                  <a:moveTo>
+                    <a:pt x="641030" y="229802"/>
+                  </a:moveTo>
+                  <a:cubicBezTo>
+                    <a:pt x="421930" y="229802"/>
+                    <a:pt x="244315" y="407417"/>
+                    <a:pt x="244315" y="626517"/>
+                  </a:cubicBezTo>
+                  <a:cubicBezTo>
+                    <a:pt x="244315" y="845617"/>
+                    <a:pt x="421930" y="1023232"/>
+                    <a:pt x="641030" y="1023232"/>
+                  </a:cubicBezTo>
+                  <a:cubicBezTo>
+                    <a:pt x="860130" y="1023232"/>
+                    <a:pt x="1037745" y="845617"/>
+                    <a:pt x="1037745" y="626517"/>
+                  </a:cubicBezTo>
+                  <a:cubicBezTo>
+                    <a:pt x="1037745" y="407417"/>
+                    <a:pt x="860130" y="229802"/>
+                    <a:pt x="641030" y="229802"/>
+                  </a:cubicBezTo>
+                  <a:close/>
+                  <a:moveTo>
+                    <a:pt x="641030" y="0"/>
+                  </a:moveTo>
+                  <a:cubicBezTo>
+                    <a:pt x="995061" y="0"/>
+                    <a:pt x="1282060" y="286999"/>
+                    <a:pt x="1282060" y="641030"/>
+                  </a:cubicBezTo>
+                  <a:cubicBezTo>
+                    <a:pt x="1282060" y="995061"/>
+                    <a:pt x="995061" y="1282060"/>
+                    <a:pt x="641030" y="1282060"/>
+                  </a:cubicBezTo>
+                  <a:cubicBezTo>
+                    <a:pt x="286999" y="1282060"/>
+                    <a:pt x="0" y="995061"/>
+                    <a:pt x="0" y="641030"/>
+                  </a:cubicBezTo>
+                  <a:cubicBezTo>
+                    <a:pt x="0" y="286999"/>
+                    <a:pt x="286999" y="0"/>
+                    <a:pt x="641030" y="0"/>
+                  </a:cubicBezTo>
+                  <a:close/>
+                </a:path>
+              </a:pathLst>
+            </a:custGeom>
+            <a:grpFill/>
+            <a:ln>
+              <a:noFill/>
+            </a:ln>
+          </p:spPr>
+          <p:style>
+            <a:lnRef idx="2">
+              <a:schemeClr val="accent1">
+                <a:shade val="50000"/>
+              </a:schemeClr>
+            </a:lnRef>
+            <a:fillRef idx="1">
+              <a:schemeClr val="accent1"/>
+            </a:fillRef>
+            <a:effectRef idx="0">
+              <a:schemeClr val="accent1"/>
+            </a:effectRef>
+            <a:fontRef idx="minor">
+              <a:schemeClr val="lt1"/>
+            </a:fontRef>
+          </p:style>
+          <p:txBody>
+            <a:bodyPr rtlCol="0" anchor="ctr"/>
+            <a:lstStyle/>
+            <a:p>
+              <a:pPr algn="ctr"/>
+              <a:endParaRPr lang="pt-BR"/>
+            </a:p>
+          </p:txBody>
+        </p:sp>
+      </p:grpSp>
+      <p:sp>
+        <p:nvSpPr>
+          <p:cNvPr id="21" name="Retângulo 20"/>
+          <p:cNvSpPr/>
+          <p:nvPr/>
+        </p:nvSpPr>
+        <p:spPr>
+          <a:xfrm rot="20404225">
+            <a:off x="9761961" y="-635416"/>
+            <a:ext cx="2759877" cy="2759877"/>
+          </a:xfrm>
+          <a:prstGeom prst="rect">
+            <a:avLst/>
+          </a:prstGeom>
+          <a:noFill/>
+          <a:ln w="76200">
+            <a:solidFill>
+              <a:srgbClr val="0174E1"/>
+            </a:solidFill>
+          </a:ln>
+        </p:spPr>
+        <p:style>
+          <a:lnRef idx="2">
+            <a:schemeClr val="accent1">
+              <a:shade val="50000"/>
+            </a:schemeClr>
+          </a:lnRef>
+          <a:fillRef idx="1">
+            <a:schemeClr val="accent1"/>
+          </a:fillRef>
+          <a:effectRef idx="0">
+            <a:schemeClr val="accent1"/>
+          </a:effectRef>
+          <a:fontRef idx="minor">
+            <a:schemeClr val="lt1"/>
+          </a:fontRef>
+        </p:style>
+        <p:txBody>
+          <a:bodyPr rtlCol="0" anchor="ctr"/>
+          <a:lstStyle/>
+          <a:p>
+            <a:pPr algn="ctr"/>
+            <a:endParaRPr lang="pt-BR"/>
+          </a:p>
+        </p:txBody>
+      </p:sp>
+      <p:sp>
+        <p:nvSpPr>
+          <p:cNvPr id="120" name="Retângulo 119"/>
+          <p:cNvSpPr/>
+          <p:nvPr/>
+        </p:nvSpPr>
+        <p:spPr>
+          <a:xfrm rot="18853478">
+            <a:off x="9834415" y="-1324908"/>
+            <a:ext cx="3146091" cy="3146091"/>
+          </a:xfrm>
+          <a:prstGeom prst="rect">
+            <a:avLst/>
+          </a:prstGeom>
+          <a:noFill/>
+          <a:ln w="76200">
+            <a:solidFill>
+              <a:srgbClr val="0174E1"/>
+            </a:solidFill>
+          </a:ln>
+        </p:spPr>
+        <p:style>
+          <a:lnRef idx="2">
+            <a:schemeClr val="accent1">
+              <a:shade val="50000"/>
+            </a:schemeClr>
+          </a:lnRef>
+          <a:fillRef idx="1">
+            <a:schemeClr val="accent1"/>
+          </a:fillRef>
+          <a:effectRef idx="0">
+            <a:schemeClr val="accent1"/>
+          </a:effectRef>
+          <a:fontRef idx="minor">
+            <a:schemeClr val="lt1"/>
+          </a:fontRef>
+        </p:style>
+        <p:txBody>
+          <a:bodyPr rtlCol="0" anchor="ctr"/>
+          <a:lstStyle/>
+          <a:p>
+            <a:pPr algn="ctr"/>
+            <a:endParaRPr lang="pt-BR"/>
+          </a:p>
+        </p:txBody>
+      </p:sp>
     </p:spTree>
     <p:extLst>
       <p:ext uri="{BB962C8B-B14F-4D97-AF65-F5344CB8AC3E}">
@@ -16600,11 +17571,11 @@
   <p:clrMapOvr>
     <a:masterClrMapping/>
   </p:clrMapOvr>
-  <mc:AlternateContent xmlns:mc="http://schemas.openxmlformats.org/markup-compatibility/2006">
-    <mc:Choice xmlns:p14="http://schemas.microsoft.com/office/powerpoint/2010/main" Requires="p14">
+  <mc:AlternateContent xmlns:mc="http://schemas.openxmlformats.org/markup-compatibility/2006" xmlns:p14="http://schemas.microsoft.com/office/powerpoint/2010/main">
+    <mc:Choice Requires="p14">
       <p:transition spd="slow" p14:dur="2000" advClick="0" advTm="6000"/>
     </mc:Choice>
-    <mc:Fallback>
+    <mc:Fallback xmlns="">
       <p:transition spd="slow" advClick="0" advTm="6000"/>
     </mc:Fallback>
   </mc:AlternateContent>
@@ -16632,7 +17603,7 @@
                             </p:stCondLst>
                             <p:childTnLst>
                               <p:par>
-                                <p:cTn id="5" presetID="1" presetClass="exit" presetSubtype="0" fill="hold" nodeType="afterEffect">
+                                <p:cTn id="5" presetID="2" presetClass="entr" presetSubtype="1" decel="100000" fill="hold" nodeType="withEffect">
                                   <p:stCondLst>
                                     <p:cond delay="0"/>
                                   </p:stCondLst>
@@ -16640,6 +17611,404 @@
                                     <p:set>
                                       <p:cBhvr>
                                         <p:cTn id="6" dur="1" fill="hold">
+                                          <p:stCondLst>
+                                            <p:cond delay="0"/>
+                                          </p:stCondLst>
+                                        </p:cTn>
+                                        <p:tgtEl>
+                                          <p:spTgt spid="20"/>
+                                        </p:tgtEl>
+                                        <p:attrNameLst>
+                                          <p:attrName>style.visibility</p:attrName>
+                                        </p:attrNameLst>
+                                      </p:cBhvr>
+                                      <p:to>
+                                        <p:strVal val="visible"/>
+                                      </p:to>
+                                    </p:set>
+                                    <p:anim calcmode="lin" valueType="num">
+                                      <p:cBhvr additive="base">
+                                        <p:cTn id="7" dur="1000" fill="hold"/>
+                                        <p:tgtEl>
+                                          <p:spTgt spid="20"/>
+                                        </p:tgtEl>
+                                        <p:attrNameLst>
+                                          <p:attrName>ppt_x</p:attrName>
+                                        </p:attrNameLst>
+                                      </p:cBhvr>
+                                      <p:tavLst>
+                                        <p:tav tm="0">
+                                          <p:val>
+                                            <p:strVal val="#ppt_x"/>
+                                          </p:val>
+                                        </p:tav>
+                                        <p:tav tm="100000">
+                                          <p:val>
+                                            <p:strVal val="#ppt_x"/>
+                                          </p:val>
+                                        </p:tav>
+                                      </p:tavLst>
+                                    </p:anim>
+                                    <p:anim calcmode="lin" valueType="num">
+                                      <p:cBhvr additive="base">
+                                        <p:cTn id="8" dur="1000" fill="hold"/>
+                                        <p:tgtEl>
+                                          <p:spTgt spid="20"/>
+                                        </p:tgtEl>
+                                        <p:attrNameLst>
+                                          <p:attrName>ppt_y</p:attrName>
+                                        </p:attrNameLst>
+                                      </p:cBhvr>
+                                      <p:tavLst>
+                                        <p:tav tm="0">
+                                          <p:val>
+                                            <p:strVal val="0-#ppt_h/2"/>
+                                          </p:val>
+                                        </p:tav>
+                                        <p:tav tm="100000">
+                                          <p:val>
+                                            <p:strVal val="#ppt_y"/>
+                                          </p:val>
+                                        </p:tav>
+                                      </p:tavLst>
+                                    </p:anim>
+                                  </p:childTnLst>
+                                </p:cTn>
+                              </p:par>
+                              <p:par>
+                                <p:cTn id="9" presetID="2" presetClass="entr" presetSubtype="4" decel="100000" fill="hold" nodeType="withEffect">
+                                  <p:stCondLst>
+                                    <p:cond delay="250"/>
+                                  </p:stCondLst>
+                                  <p:childTnLst>
+                                    <p:set>
+                                      <p:cBhvr>
+                                        <p:cTn id="10" dur="1" fill="hold">
+                                          <p:stCondLst>
+                                            <p:cond delay="0"/>
+                                          </p:stCondLst>
+                                        </p:cTn>
+                                        <p:tgtEl>
+                                          <p:spTgt spid="111"/>
+                                        </p:tgtEl>
+                                        <p:attrNameLst>
+                                          <p:attrName>style.visibility</p:attrName>
+                                        </p:attrNameLst>
+                                      </p:cBhvr>
+                                      <p:to>
+                                        <p:strVal val="visible"/>
+                                      </p:to>
+                                    </p:set>
+                                    <p:anim calcmode="lin" valueType="num">
+                                      <p:cBhvr additive="base">
+                                        <p:cTn id="11" dur="1000" fill="hold"/>
+                                        <p:tgtEl>
+                                          <p:spTgt spid="111"/>
+                                        </p:tgtEl>
+                                        <p:attrNameLst>
+                                          <p:attrName>ppt_x</p:attrName>
+                                        </p:attrNameLst>
+                                      </p:cBhvr>
+                                      <p:tavLst>
+                                        <p:tav tm="0">
+                                          <p:val>
+                                            <p:strVal val="#ppt_x"/>
+                                          </p:val>
+                                        </p:tav>
+                                        <p:tav tm="100000">
+                                          <p:val>
+                                            <p:strVal val="#ppt_x"/>
+                                          </p:val>
+                                        </p:tav>
+                                      </p:tavLst>
+                                    </p:anim>
+                                    <p:anim calcmode="lin" valueType="num">
+                                      <p:cBhvr additive="base">
+                                        <p:cTn id="12" dur="1000" fill="hold"/>
+                                        <p:tgtEl>
+                                          <p:spTgt spid="111"/>
+                                        </p:tgtEl>
+                                        <p:attrNameLst>
+                                          <p:attrName>ppt_y</p:attrName>
+                                        </p:attrNameLst>
+                                      </p:cBhvr>
+                                      <p:tavLst>
+                                        <p:tav tm="0">
+                                          <p:val>
+                                            <p:strVal val="1+#ppt_h/2"/>
+                                          </p:val>
+                                        </p:tav>
+                                        <p:tav tm="100000">
+                                          <p:val>
+                                            <p:strVal val="#ppt_y"/>
+                                          </p:val>
+                                        </p:tav>
+                                      </p:tavLst>
+                                    </p:anim>
+                                  </p:childTnLst>
+                                </p:cTn>
+                              </p:par>
+                              <p:par>
+                                <p:cTn id="13" presetID="2" presetClass="entr" presetSubtype="4" decel="100000" fill="hold" nodeType="withEffect">
+                                  <p:stCondLst>
+                                    <p:cond delay="750"/>
+                                  </p:stCondLst>
+                                  <p:childTnLst>
+                                    <p:set>
+                                      <p:cBhvr>
+                                        <p:cTn id="14" dur="1" fill="hold">
+                                          <p:stCondLst>
+                                            <p:cond delay="0"/>
+                                          </p:stCondLst>
+                                        </p:cTn>
+                                        <p:tgtEl>
+                                          <p:spTgt spid="117"/>
+                                        </p:tgtEl>
+                                        <p:attrNameLst>
+                                          <p:attrName>style.visibility</p:attrName>
+                                        </p:attrNameLst>
+                                      </p:cBhvr>
+                                      <p:to>
+                                        <p:strVal val="visible"/>
+                                      </p:to>
+                                    </p:set>
+                                    <p:anim calcmode="lin" valueType="num">
+                                      <p:cBhvr additive="base">
+                                        <p:cTn id="15" dur="1000" fill="hold"/>
+                                        <p:tgtEl>
+                                          <p:spTgt spid="117"/>
+                                        </p:tgtEl>
+                                        <p:attrNameLst>
+                                          <p:attrName>ppt_x</p:attrName>
+                                        </p:attrNameLst>
+                                      </p:cBhvr>
+                                      <p:tavLst>
+                                        <p:tav tm="0">
+                                          <p:val>
+                                            <p:strVal val="#ppt_x"/>
+                                          </p:val>
+                                        </p:tav>
+                                        <p:tav tm="100000">
+                                          <p:val>
+                                            <p:strVal val="#ppt_x"/>
+                                          </p:val>
+                                        </p:tav>
+                                      </p:tavLst>
+                                    </p:anim>
+                                    <p:anim calcmode="lin" valueType="num">
+                                      <p:cBhvr additive="base">
+                                        <p:cTn id="16" dur="1000" fill="hold"/>
+                                        <p:tgtEl>
+                                          <p:spTgt spid="117"/>
+                                        </p:tgtEl>
+                                        <p:attrNameLst>
+                                          <p:attrName>ppt_y</p:attrName>
+                                        </p:attrNameLst>
+                                      </p:cBhvr>
+                                      <p:tavLst>
+                                        <p:tav tm="0">
+                                          <p:val>
+                                            <p:strVal val="1+#ppt_h/2"/>
+                                          </p:val>
+                                        </p:tav>
+                                        <p:tav tm="100000">
+                                          <p:val>
+                                            <p:strVal val="#ppt_y"/>
+                                          </p:val>
+                                        </p:tav>
+                                      </p:tavLst>
+                                    </p:anim>
+                                  </p:childTnLst>
+                                </p:cTn>
+                              </p:par>
+                              <p:par>
+                                <p:cTn id="17" presetID="2" presetClass="entr" presetSubtype="4" decel="100000" fill="hold" nodeType="withEffect">
+                                  <p:stCondLst>
+                                    <p:cond delay="1000"/>
+                                  </p:stCondLst>
+                                  <p:childTnLst>
+                                    <p:set>
+                                      <p:cBhvr>
+                                        <p:cTn id="18" dur="1" fill="hold">
+                                          <p:stCondLst>
+                                            <p:cond delay="0"/>
+                                          </p:stCondLst>
+                                        </p:cTn>
+                                        <p:tgtEl>
+                                          <p:spTgt spid="114"/>
+                                        </p:tgtEl>
+                                        <p:attrNameLst>
+                                          <p:attrName>style.visibility</p:attrName>
+                                        </p:attrNameLst>
+                                      </p:cBhvr>
+                                      <p:to>
+                                        <p:strVal val="visible"/>
+                                      </p:to>
+                                    </p:set>
+                                    <p:anim calcmode="lin" valueType="num">
+                                      <p:cBhvr additive="base">
+                                        <p:cTn id="19" dur="1000" fill="hold"/>
+                                        <p:tgtEl>
+                                          <p:spTgt spid="114"/>
+                                        </p:tgtEl>
+                                        <p:attrNameLst>
+                                          <p:attrName>ppt_x</p:attrName>
+                                        </p:attrNameLst>
+                                      </p:cBhvr>
+                                      <p:tavLst>
+                                        <p:tav tm="0">
+                                          <p:val>
+                                            <p:strVal val="#ppt_x"/>
+                                          </p:val>
+                                        </p:tav>
+                                        <p:tav tm="100000">
+                                          <p:val>
+                                            <p:strVal val="#ppt_x"/>
+                                          </p:val>
+                                        </p:tav>
+                                      </p:tavLst>
+                                    </p:anim>
+                                    <p:anim calcmode="lin" valueType="num">
+                                      <p:cBhvr additive="base">
+                                        <p:cTn id="20" dur="1000" fill="hold"/>
+                                        <p:tgtEl>
+                                          <p:spTgt spid="114"/>
+                                        </p:tgtEl>
+                                        <p:attrNameLst>
+                                          <p:attrName>ppt_y</p:attrName>
+                                        </p:attrNameLst>
+                                      </p:cBhvr>
+                                      <p:tavLst>
+                                        <p:tav tm="0">
+                                          <p:val>
+                                            <p:strVal val="1+#ppt_h/2"/>
+                                          </p:val>
+                                        </p:tav>
+                                        <p:tav tm="100000">
+                                          <p:val>
+                                            <p:strVal val="#ppt_y"/>
+                                          </p:val>
+                                        </p:tav>
+                                      </p:tavLst>
+                                    </p:anim>
+                                  </p:childTnLst>
+                                </p:cTn>
+                              </p:par>
+                            </p:childTnLst>
+                          </p:cTn>
+                        </p:par>
+                        <p:par>
+                          <p:cTn id="21" fill="hold">
+                            <p:stCondLst>
+                              <p:cond delay="2000"/>
+                            </p:stCondLst>
+                            <p:childTnLst>
+                              <p:par>
+                                <p:cTn id="22" presetID="64" presetClass="path" presetSubtype="0" repeatCount="indefinite" accel="28000" decel="72000" autoRev="1" fill="hold" nodeType="afterEffect">
+                                  <p:stCondLst>
+                                    <p:cond delay="0"/>
+                                  </p:stCondLst>
+                                  <p:childTnLst>
+                                    <p:animMotion origin="layout" path="M -2.08333E-7 7.40741E-7 L -2.08333E-7 -0.12778 " pathEditMode="relative" rAng="0" ptsTypes="AA">
+                                      <p:cBhvr>
+                                        <p:cTn id="23" dur="4000" fill="hold"/>
+                                        <p:tgtEl>
+                                          <p:spTgt spid="20"/>
+                                        </p:tgtEl>
+                                        <p:attrNameLst>
+                                          <p:attrName>ppt_x</p:attrName>
+                                          <p:attrName>ppt_y</p:attrName>
+                                        </p:attrNameLst>
+                                      </p:cBhvr>
+                                      <p:rCtr x="0" y="-6389"/>
+                                    </p:animMotion>
+                                  </p:childTnLst>
+                                </p:cTn>
+                              </p:par>
+                              <p:par>
+                                <p:cTn id="24" presetID="42" presetClass="path" presetSubtype="0" repeatCount="indefinite" accel="50000" decel="50000" autoRev="1" fill="hold" nodeType="withEffect">
+                                  <p:stCondLst>
+                                    <p:cond delay="500"/>
+                                  </p:stCondLst>
+                                  <p:childTnLst>
+                                    <p:animMotion origin="layout" path="M -3.33333E-6 -3.7037E-7 L -3.33333E-6 0.13889 " pathEditMode="relative" rAng="0" ptsTypes="AA">
+                                      <p:cBhvr>
+                                        <p:cTn id="25" dur="4000" fill="hold"/>
+                                        <p:tgtEl>
+                                          <p:spTgt spid="111"/>
+                                        </p:tgtEl>
+                                        <p:attrNameLst>
+                                          <p:attrName>ppt_x</p:attrName>
+                                          <p:attrName>ppt_y</p:attrName>
+                                        </p:attrNameLst>
+                                      </p:cBhvr>
+                                      <p:rCtr x="0" y="6944"/>
+                                    </p:animMotion>
+                                  </p:childTnLst>
+                                </p:cTn>
+                              </p:par>
+                              <p:par>
+                                <p:cTn id="26" presetID="42" presetClass="path" presetSubtype="0" repeatCount="indefinite" accel="62000" decel="35000" autoRev="1" fill="hold" nodeType="withEffect">
+                                  <p:stCondLst>
+                                    <p:cond delay="1000"/>
+                                  </p:stCondLst>
+                                  <p:childTnLst>
+                                    <p:animMotion origin="layout" path="M -2.08333E-6 -2.22222E-6 L -2.08333E-6 0.11111 " pathEditMode="relative" rAng="0" ptsTypes="AA">
+                                      <p:cBhvr>
+                                        <p:cTn id="27" dur="4000" fill="hold"/>
+                                        <p:tgtEl>
+                                          <p:spTgt spid="117"/>
+                                        </p:tgtEl>
+                                        <p:attrNameLst>
+                                          <p:attrName>ppt_x</p:attrName>
+                                          <p:attrName>ppt_y</p:attrName>
+                                        </p:attrNameLst>
+                                      </p:cBhvr>
+                                      <p:rCtr x="0" y="5556"/>
+                                    </p:animMotion>
+                                  </p:childTnLst>
+                                </p:cTn>
+                              </p:par>
+                              <p:par>
+                                <p:cTn id="28" presetID="42" presetClass="path" presetSubtype="0" accel="50000" decel="50000" fill="hold" nodeType="withEffect">
+                                  <p:stCondLst>
+                                    <p:cond delay="1250"/>
+                                  </p:stCondLst>
+                                  <p:childTnLst>
+                                    <p:animMotion origin="layout" path="M -1.45833E-6 7.40741E-7 L -1.45833E-6 0.12222 " pathEditMode="relative" rAng="0" ptsTypes="AA">
+                                      <p:cBhvr>
+                                        <p:cTn id="29" dur="2000" fill="hold"/>
+                                        <p:tgtEl>
+                                          <p:spTgt spid="114"/>
+                                        </p:tgtEl>
+                                        <p:attrNameLst>
+                                          <p:attrName>ppt_x</p:attrName>
+                                          <p:attrName>ppt_y</p:attrName>
+                                        </p:attrNameLst>
+                                      </p:cBhvr>
+                                      <p:rCtr x="0" y="6111"/>
+                                    </p:animMotion>
+                                  </p:childTnLst>
+                                </p:cTn>
+                              </p:par>
+                            </p:childTnLst>
+                          </p:cTn>
+                        </p:par>
+                        <p:par>
+                          <p:cTn id="30" fill="hold">
+                            <p:stCondLst>
+                              <p:cond delay="11000"/>
+                            </p:stCondLst>
+                            <p:childTnLst>
+                              <p:par>
+                                <p:cTn id="31" presetID="1" presetClass="exit" presetSubtype="0" fill="hold" nodeType="afterEffect">
+                                  <p:stCondLst>
+                                    <p:cond delay="0"/>
+                                  </p:stCondLst>
+                                  <p:childTnLst>
+                                    <p:set>
+                                      <p:cBhvr>
+                                        <p:cTn id="32" dur="1" fill="hold">
                                           <p:stCondLst>
                                             <p:cond delay="0"/>
                                           </p:stCondLst>
@@ -16662,20 +18031,20 @@
                           </p:cTn>
                         </p:par>
                         <p:par>
-                          <p:cTn id="7" fill="hold">
+                          <p:cTn id="33" fill="hold">
                             <p:stCondLst>
-                              <p:cond delay="0"/>
+                              <p:cond delay="11000"/>
                             </p:stCondLst>
                             <p:childTnLst>
                               <p:par>
-                                <p:cTn id="8" presetID="1" presetClass="exit" presetSubtype="0" fill="hold" nodeType="afterEffect">
+                                <p:cTn id="34" presetID="1" presetClass="exit" presetSubtype="0" fill="hold" nodeType="afterEffect">
                                   <p:stCondLst>
                                     <p:cond delay="0"/>
                                   </p:stCondLst>
                                   <p:childTnLst>
                                     <p:set>
                                       <p:cBhvr>
-                                        <p:cTn id="9" dur="1" fill="hold">
+                                        <p:cTn id="35" dur="1" fill="hold">
                                           <p:stCondLst>
                                             <p:cond delay="0"/>
                                           </p:stCondLst>
@@ -16695,14 +18064,14 @@
                                 </p:cTn>
                               </p:par>
                               <p:par>
-                                <p:cTn id="10" presetID="2" presetClass="entr" presetSubtype="4" decel="100000" fill="hold" nodeType="withEffect">
+                                <p:cTn id="36" presetID="2" presetClass="entr" presetSubtype="4" decel="100000" fill="hold" nodeType="withEffect">
                                   <p:stCondLst>
                                     <p:cond delay="0"/>
                                   </p:stCondLst>
                                   <p:childTnLst>
                                     <p:set>
                                       <p:cBhvr>
-                                        <p:cTn id="11" dur="1" fill="hold">
+                                        <p:cTn id="37" dur="1" fill="hold">
                                           <p:stCondLst>
                                             <p:cond delay="0"/>
                                           </p:stCondLst>
@@ -16720,7 +18089,7 @@
                                     </p:set>
                                     <p:anim calcmode="lin" valueType="num">
                                       <p:cBhvr additive="base">
-                                        <p:cTn id="12" dur="1000" fill="hold"/>
+                                        <p:cTn id="38" dur="1000" fill="hold"/>
                                         <p:tgtEl>
                                           <p:spTgt spid="18"/>
                                         </p:tgtEl>
@@ -16743,7 +18112,7 @@
                                     </p:anim>
                                     <p:anim calcmode="lin" valueType="num">
                                       <p:cBhvr additive="base">
-                                        <p:cTn id="13" dur="1000" fill="hold"/>
+                                        <p:cTn id="39" dur="1000" fill="hold"/>
                                         <p:tgtEl>
                                           <p:spTgt spid="18"/>
                                         </p:tgtEl>
@@ -16771,20 +18140,20 @@
                           </p:cTn>
                         </p:par>
                         <p:par>
-                          <p:cTn id="14" fill="hold">
+                          <p:cTn id="40" fill="hold">
                             <p:stCondLst>
-                              <p:cond delay="1000"/>
+                              <p:cond delay="12000"/>
                             </p:stCondLst>
                             <p:childTnLst>
                               <p:par>
-                                <p:cTn id="15" presetID="42" presetClass="path" presetSubtype="0" accel="50000" decel="50000" fill="hold" nodeType="afterEffect">
+                                <p:cTn id="41" presetID="42" presetClass="path" presetSubtype="0" accel="50000" decel="50000" fill="hold" nodeType="afterEffect">
                                   <p:stCondLst>
                                     <p:cond delay="0"/>
                                   </p:stCondLst>
                                   <p:childTnLst>
                                     <p:animMotion origin="layout" path="M 3.33333E-6 -4.07407E-6 L 3.33333E-6 0.25 " pathEditMode="relative" rAng="0" ptsTypes="AA">
                                       <p:cBhvr>
-                                        <p:cTn id="16" dur="1750" fill="hold"/>
+                                        <p:cTn id="42" dur="1750" fill="hold"/>
                                         <p:tgtEl>
                                           <p:spTgt spid="18"/>
                                         </p:tgtEl>
@@ -16802,20 +18171,20 @@
                           </p:cTn>
                         </p:par>
                         <p:par>
-                          <p:cTn id="17" fill="hold">
+                          <p:cTn id="43" fill="hold">
                             <p:stCondLst>
-                              <p:cond delay="2750"/>
+                              <p:cond delay="13750"/>
                             </p:stCondLst>
                             <p:childTnLst>
                               <p:par>
-                                <p:cTn id="18" presetID="26" presetClass="entr" presetSubtype="0" fill="hold" nodeType="afterEffect">
+                                <p:cTn id="44" presetID="26" presetClass="entr" presetSubtype="0" fill="hold" nodeType="afterEffect">
                                   <p:stCondLst>
                                     <p:cond delay="0"/>
                                   </p:stCondLst>
                                   <p:childTnLst>
                                     <p:set>
                                       <p:cBhvr>
-                                        <p:cTn id="19" dur="1" fill="hold">
+                                        <p:cTn id="45" dur="1" fill="hold">
                                           <p:stCondLst>
                                             <p:cond delay="0"/>
                                           </p:stCondLst>
@@ -16833,7 +18202,7 @@
                                     </p:set>
                                     <p:animEffect transition="in" filter="wipe(down)">
                                       <p:cBhvr>
-                                        <p:cTn id="20" dur="435">
+                                        <p:cTn id="46" dur="435">
                                           <p:stCondLst>
                                             <p:cond delay="0"/>
                                           </p:stCondLst>
@@ -16845,7 +18214,7 @@
                                     </p:animEffect>
                                     <p:anim calcmode="lin" valueType="num">
                                       <p:cBhvr>
-                                        <p:cTn id="21" dur="1367" tmFilter="0,0; 0.14,0.36; 0.43,0.73; 0.71,0.91; 1.0,1.0">
+                                        <p:cTn id="47" dur="1367" tmFilter="0,0; 0.14,0.36; 0.43,0.73; 0.71,0.91; 1.0,1.0">
                                           <p:stCondLst>
                                             <p:cond delay="0"/>
                                           </p:stCondLst>
@@ -16872,7 +18241,7 @@
                                     </p:anim>
                                     <p:anim calcmode="lin" valueType="num">
                                       <p:cBhvr>
-                                        <p:cTn id="22" dur="498" tmFilter="0.0,0.0; 0.25,0.07; 0.50,0.2; 0.75,0.467; 1.0,1.0">
+                                        <p:cTn id="48" dur="498" tmFilter="0.0,0.0; 0.25,0.07; 0.50,0.2; 0.75,0.467; 1.0,1.0">
                                           <p:stCondLst>
                                             <p:cond delay="0"/>
                                           </p:stCondLst>
@@ -16899,7 +18268,7 @@
                                     </p:anim>
                                     <p:anim calcmode="lin" valueType="num">
                                       <p:cBhvr>
-                                        <p:cTn id="23" dur="498" tmFilter="0, 0; 0.125,0.2665; 0.25,0.4; 0.375,0.465; 0.5,0.5;  0.625,0.535; 0.75,0.6; 0.875,0.7335; 1,1">
+                                        <p:cTn id="49" dur="498" tmFilter="0, 0; 0.125,0.2665; 0.25,0.4; 0.375,0.465; 0.5,0.5;  0.625,0.535; 0.75,0.6; 0.875,0.7335; 1,1">
                                           <p:stCondLst>
                                             <p:cond delay="498"/>
                                           </p:stCondLst>
@@ -16926,7 +18295,7 @@
                                     </p:anim>
                                     <p:anim calcmode="lin" valueType="num">
                                       <p:cBhvr>
-                                        <p:cTn id="24" dur="249" tmFilter="0, 0; 0.125,0.2665; 0.25,0.4; 0.375,0.465; 0.5,0.5;  0.625,0.535; 0.75,0.6; 0.875,0.7335; 1,1">
+                                        <p:cTn id="50" dur="249" tmFilter="0, 0; 0.125,0.2665; 0.25,0.4; 0.375,0.465; 0.5,0.5;  0.625,0.535; 0.75,0.6; 0.875,0.7335; 1,1">
                                           <p:stCondLst>
                                             <p:cond delay="993"/>
                                           </p:stCondLst>
@@ -16953,7 +18322,7 @@
                                     </p:anim>
                                     <p:anim calcmode="lin" valueType="num">
                                       <p:cBhvr>
-                                        <p:cTn id="25" dur="123" tmFilter="0, 0; 0.125,0.2665; 0.25,0.4; 0.375,0.465; 0.5,0.5;  0.625,0.535; 0.75,0.6; 0.875,0.7335; 1,1">
+                                        <p:cTn id="51" dur="123" tmFilter="0, 0; 0.125,0.2665; 0.25,0.4; 0.375,0.465; 0.5,0.5;  0.625,0.535; 0.75,0.6; 0.875,0.7335; 1,1">
                                           <p:stCondLst>
                                             <p:cond delay="1242"/>
                                           </p:stCondLst>
@@ -16980,7 +18349,7 @@
                                     </p:anim>
                                     <p:animScale>
                                       <p:cBhvr>
-                                        <p:cTn id="26" dur="20">
+                                        <p:cTn id="52" dur="20">
                                           <p:stCondLst>
                                             <p:cond delay="487"/>
                                           </p:stCondLst>
@@ -16993,7 +18362,7 @@
                                     </p:animScale>
                                     <p:animScale>
                                       <p:cBhvr>
-                                        <p:cTn id="27" dur="124" decel="50000">
+                                        <p:cTn id="53" dur="124" decel="50000">
                                           <p:stCondLst>
                                             <p:cond delay="507"/>
                                           </p:stCondLst>
@@ -17006,7 +18375,7 @@
                                     </p:animScale>
                                     <p:animScale>
                                       <p:cBhvr>
-                                        <p:cTn id="28" dur="20">
+                                        <p:cTn id="54" dur="20">
                                           <p:stCondLst>
                                             <p:cond delay="984"/>
                                           </p:stCondLst>
@@ -17019,7 +18388,7 @@
                                     </p:animScale>
                                     <p:animScale>
                                       <p:cBhvr>
-                                        <p:cTn id="29" dur="124" decel="50000">
+                                        <p:cTn id="55" dur="124" decel="50000">
                                           <p:stCondLst>
                                             <p:cond delay="1004"/>
                                           </p:stCondLst>
@@ -17032,7 +18401,7 @@
                                     </p:animScale>
                                     <p:animScale>
                                       <p:cBhvr>
-                                        <p:cTn id="30" dur="20">
+                                        <p:cTn id="56" dur="20">
                                           <p:stCondLst>
                                             <p:cond delay="1231"/>
                                           </p:stCondLst>
@@ -17045,7 +18414,7 @@
                                     </p:animScale>
                                     <p:animScale>
                                       <p:cBhvr>
-                                        <p:cTn id="31" dur="124" decel="50000">
+                                        <p:cTn id="57" dur="124" decel="50000">
                                           <p:stCondLst>
                                             <p:cond delay="1251"/>
                                           </p:stCondLst>
@@ -17058,7 +18427,7 @@
                                     </p:animScale>
                                     <p:animScale>
                                       <p:cBhvr>
-                                        <p:cTn id="32" dur="20">
+                                        <p:cTn id="58" dur="20">
                                           <p:stCondLst>
                                             <p:cond delay="1356"/>
                                           </p:stCondLst>
@@ -17071,7 +18440,7 @@
                                     </p:animScale>
                                     <p:animScale>
                                       <p:cBhvr>
-                                        <p:cTn id="33" dur="124" decel="50000">
+                                        <p:cTn id="59" dur="124" decel="50000">
                                           <p:stCondLst>
                                             <p:cond delay="1376"/>
                                           </p:stCondLst>
@@ -17089,20 +18458,20 @@
                           </p:cTn>
                         </p:par>
                         <p:par>
-                          <p:cTn id="34" fill="hold">
+                          <p:cTn id="60" fill="hold">
                             <p:stCondLst>
-                              <p:cond delay="4250"/>
+                              <p:cond delay="15250"/>
                             </p:stCondLst>
                             <p:childTnLst>
                               <p:par>
-                                <p:cTn id="35" presetID="1" presetClass="exit" presetSubtype="0" fill="hold" nodeType="afterEffect">
+                                <p:cTn id="61" presetID="1" presetClass="exit" presetSubtype="0" fill="hold" nodeType="afterEffect">
                                   <p:stCondLst>
                                     <p:cond delay="0"/>
                                   </p:stCondLst>
                                   <p:childTnLst>
                                     <p:set>
                                       <p:cBhvr>
-                                        <p:cTn id="36" dur="1" fill="hold">
+                                        <p:cTn id="62" dur="1" fill="hold">
                                           <p:stCondLst>
                                             <p:cond delay="0"/>
                                           </p:stCondLst>
@@ -17125,20 +18494,20 @@
                           </p:cTn>
                         </p:par>
                         <p:par>
-                          <p:cTn id="37" fill="hold">
+                          <p:cTn id="63" fill="hold">
                             <p:stCondLst>
-                              <p:cond delay="4250"/>
+                              <p:cond delay="15250"/>
                             </p:stCondLst>
                             <p:childTnLst>
                               <p:par>
-                                <p:cTn id="38" presetID="1" presetClass="entr" presetSubtype="0" fill="hold" nodeType="afterEffect">
+                                <p:cTn id="64" presetID="1" presetClass="entr" presetSubtype="0" fill="hold" nodeType="afterEffect">
                                   <p:stCondLst>
                                     <p:cond delay="0"/>
                                   </p:stCondLst>
                                   <p:childTnLst>
                                     <p:set>
                                       <p:cBhvr>
-                                        <p:cTn id="39" dur="1" fill="hold">
+                                        <p:cTn id="65" dur="1" fill="hold">
                                           <p:stCondLst>
                                             <p:cond delay="0"/>
                                           </p:stCondLst>
@@ -17161,20 +18530,20 @@
                           </p:cTn>
                         </p:par>
                         <p:par>
-                          <p:cTn id="40" fill="hold">
+                          <p:cTn id="66" fill="hold">
                             <p:stCondLst>
-                              <p:cond delay="4250"/>
+                              <p:cond delay="15250"/>
                             </p:stCondLst>
                             <p:childTnLst>
                               <p:par>
-                                <p:cTn id="41" presetID="1" presetClass="exit" presetSubtype="0" fill="hold" nodeType="afterEffect">
+                                <p:cTn id="67" presetID="1" presetClass="exit" presetSubtype="0" fill="hold" nodeType="afterEffect">
                                   <p:stCondLst>
                                     <p:cond delay="500"/>
                                   </p:stCondLst>
                                   <p:childTnLst>
                                     <p:set>
                                       <p:cBhvr>
-                                        <p:cTn id="42" dur="1" fill="hold">
+                                        <p:cTn id="68" dur="1" fill="hold">
                                           <p:stCondLst>
                                             <p:cond delay="0"/>
                                           </p:stCondLst>
@@ -17197,20 +18566,20 @@
                           </p:cTn>
                         </p:par>
                         <p:par>
-                          <p:cTn id="43" fill="hold">
+                          <p:cTn id="69" fill="hold">
                             <p:stCondLst>
-                              <p:cond delay="4750"/>
+                              <p:cond delay="15750"/>
                             </p:stCondLst>
                             <p:childTnLst>
                               <p:par>
-                                <p:cTn id="44" presetID="1" presetClass="entr" presetSubtype="0" fill="hold" nodeType="afterEffect">
+                                <p:cTn id="70" presetID="1" presetClass="entr" presetSubtype="0" fill="hold" nodeType="afterEffect">
                                   <p:stCondLst>
                                     <p:cond delay="0"/>
                                   </p:stCondLst>
                                   <p:childTnLst>
                                     <p:set>
                                       <p:cBhvr>
-                                        <p:cTn id="45" dur="1" fill="hold">
+                                        <p:cTn id="71" dur="1" fill="hold">
                                           <p:stCondLst>
                                             <p:cond delay="0"/>
                                           </p:stCondLst>
@@ -17233,20 +18602,20 @@
                           </p:cTn>
                         </p:par>
                         <p:par>
-                          <p:cTn id="46" fill="hold">
+                          <p:cTn id="72" fill="hold">
                             <p:stCondLst>
-                              <p:cond delay="4750"/>
+                              <p:cond delay="15750"/>
                             </p:stCondLst>
                             <p:childTnLst>
                               <p:par>
-                                <p:cTn id="47" presetID="1" presetClass="exit" presetSubtype="0" fill="hold" nodeType="afterEffect">
+                                <p:cTn id="73" presetID="1" presetClass="exit" presetSubtype="0" fill="hold" nodeType="afterEffect">
                                   <p:stCondLst>
                                     <p:cond delay="500"/>
                                   </p:stCondLst>
                                   <p:childTnLst>
                                     <p:set>
                                       <p:cBhvr>
-                                        <p:cTn id="48" dur="1" fill="hold">
+                                        <p:cTn id="74" dur="1" fill="hold">
                                           <p:stCondLst>
                                             <p:cond delay="0"/>
                                           </p:stCondLst>
@@ -17269,20 +18638,20 @@
                           </p:cTn>
                         </p:par>
                         <p:par>
-                          <p:cTn id="49" fill="hold">
+                          <p:cTn id="75" fill="hold">
                             <p:stCondLst>
-                              <p:cond delay="5250"/>
+                              <p:cond delay="16250"/>
                             </p:stCondLst>
                             <p:childTnLst>
                               <p:par>
-                                <p:cTn id="50" presetID="1" presetClass="entr" presetSubtype="0" fill="hold" nodeType="afterEffect">
+                                <p:cTn id="76" presetID="1" presetClass="entr" presetSubtype="0" fill="hold" nodeType="afterEffect">
                                   <p:stCondLst>
                                     <p:cond delay="0"/>
                                   </p:stCondLst>
                                   <p:childTnLst>
                                     <p:set>
                                       <p:cBhvr>
-                                        <p:cTn id="51" dur="1" fill="hold">
+                                        <p:cTn id="77" dur="1" fill="hold">
                                           <p:stCondLst>
                                             <p:cond delay="0"/>
                                           </p:stCondLst>
@@ -17349,48 +18718,12 @@
           <a:chExt cx="0" cy="0"/>
         </a:xfrm>
       </p:grpSpPr>
-      <p:pic>
-        <p:nvPicPr>
-          <p:cNvPr id="7" name="Imagem 6">
-            <a:extLst>
-              <a:ext uri="{FF2B5EF4-FFF2-40B4-BE49-F238E27FC236}">
-                <a16:creationId xmlns:a16="http://schemas.microsoft.com/office/drawing/2014/main" id="{106BA0BA-BF87-43CE-A0A3-2A0613672C8F}"/>
-              </a:ext>
-            </a:extLst>
-          </p:cNvPr>
-          <p:cNvPicPr>
-            <a:picLocks noChangeAspect="1"/>
-          </p:cNvPicPr>
-          <p:nvPr/>
-        </p:nvPicPr>
-        <p:blipFill>
-          <a:blip r:embed="rId2">
-            <a:extLst>
-              <a:ext uri="{28A0092B-C50C-407E-A947-70E740481C1C}">
-                <a14:useLocalDpi xmlns:a14="http://schemas.microsoft.com/office/drawing/2010/main" val="0"/>
-              </a:ext>
-            </a:extLst>
-          </a:blip>
-          <a:stretch>
-            <a:fillRect/>
-          </a:stretch>
-        </p:blipFill>
-        <p:spPr>
-          <a:xfrm>
-            <a:off x="-2483670" y="-1386348"/>
-            <a:ext cx="19149347" cy="10771506"/>
-          </a:xfrm>
-          <a:prstGeom prst="rect">
-            <a:avLst/>
-          </a:prstGeom>
-        </p:spPr>
-      </p:pic>
       <p:sp>
         <p:nvSpPr>
           <p:cNvPr id="8" name="Retângulo 7">
             <a:extLst>
               <a:ext uri="{FF2B5EF4-FFF2-40B4-BE49-F238E27FC236}">
-                <a16:creationId xmlns:a16="http://schemas.microsoft.com/office/drawing/2014/main" id="{BAB3F456-50CC-41AE-9B76-EC97A2174643}"/>
+                <a16:creationId xmlns:a16="http://schemas.microsoft.com/office/drawing/2014/main" xmlns="" id="{BAB3F456-50CC-41AE-9B76-EC97A2174643}"/>
               </a:ext>
             </a:extLst>
           </p:cNvPr>
@@ -17399,7 +18732,7 @@
         </p:nvSpPr>
         <p:spPr>
           <a:xfrm>
-            <a:off x="-1969729" y="-13345653"/>
+            <a:off x="-2477729" y="-14319190"/>
             <a:ext cx="19143406" cy="10766324"/>
           </a:xfrm>
           <a:prstGeom prst="rect">
@@ -17437,6 +18770,47 @@
           </a:p>
         </p:txBody>
       </p:sp>
+      <p:pic>
+        <p:nvPicPr>
+          <p:cNvPr id="1026" name="Picture 2" descr="C:\Users\u18171\Documents\GitHub\Projeto-PP\Stud+\img\background3.jpg"/>
+          <p:cNvPicPr>
+            <a:picLocks noChangeAspect="1" noChangeArrowheads="1"/>
+          </p:cNvPicPr>
+          <p:nvPr/>
+        </p:nvPicPr>
+        <p:blipFill>
+          <a:blip r:embed="rId2">
+            <a:extLst>
+              <a:ext uri="{28A0092B-C50C-407E-A947-70E740481C1C}">
+                <a14:useLocalDpi xmlns:a14="http://schemas.microsoft.com/office/drawing/2010/main" val="0"/>
+              </a:ext>
+            </a:extLst>
+          </a:blip>
+          <a:srcRect/>
+          <a:stretch>
+            <a:fillRect/>
+          </a:stretch>
+        </p:blipFill>
+        <p:spPr bwMode="auto">
+          <a:xfrm>
+            <a:off x="-327789" y="-1000166"/>
+            <a:ext cx="14843525" cy="9953666"/>
+          </a:xfrm>
+          <a:prstGeom prst="rect">
+            <a:avLst/>
+          </a:prstGeom>
+          <a:noFill/>
+          <a:extLst>
+            <a:ext uri="{909E8E84-426E-40DD-AFC4-6F175D3DCCD1}">
+              <a14:hiddenFill xmlns:a14="http://schemas.microsoft.com/office/drawing/2010/main">
+                <a:solidFill>
+                  <a:srgbClr val="FFFFFF"/>
+                </a:solidFill>
+              </a14:hiddenFill>
+            </a:ext>
+          </a:extLst>
+        </p:spPr>
+      </p:pic>
     </p:spTree>
     <p:extLst>
       <p:ext uri="{BB962C8B-B14F-4D97-AF65-F5344CB8AC3E}">
@@ -17447,11 +18821,11 @@
   <p:clrMapOvr>
     <a:masterClrMapping/>
   </p:clrMapOvr>
-  <mc:AlternateContent xmlns:mc="http://schemas.openxmlformats.org/markup-compatibility/2006">
-    <mc:Choice xmlns:p14="http://schemas.microsoft.com/office/powerpoint/2010/main" Requires="p14">
+  <mc:AlternateContent xmlns:mc="http://schemas.openxmlformats.org/markup-compatibility/2006" xmlns:p14="http://schemas.microsoft.com/office/powerpoint/2010/main">
+    <mc:Choice Requires="p14">
       <p:transition spd="slow" p14:dur="2000" advClick="0" advTm="4000"/>
     </mc:Choice>
-    <mc:Fallback>
+    <mc:Fallback xmlns="">
       <p:transition spd="slow" advClick="0" advTm="4000"/>
     </mc:Fallback>
   </mc:AlternateContent>
@@ -17633,24 +19007,33 @@
                                   </p:childTnLst>
                                 </p:cTn>
                               </p:par>
+                            </p:childTnLst>
+                          </p:cTn>
+                        </p:par>
+                        <p:par>
+                          <p:cTn id="14" fill="hold">
+                            <p:stCondLst>
+                              <p:cond delay="1000"/>
+                            </p:stCondLst>
+                            <p:childTnLst>
                               <p:par>
-                                <p:cTn id="14" presetID="35" presetClass="path" presetSubtype="0" accel="62000" decel="36000" fill="hold" nodeType="withEffect">
+                                <p:cTn id="15" presetID="35" presetClass="path" presetSubtype="0" accel="100000" fill="hold" nodeType="afterEffect">
                                   <p:stCondLst>
                                     <p:cond delay="0"/>
                                   </p:stCondLst>
                                   <p:childTnLst>
-                                    <p:animMotion origin="layout" path="M 0.15807 -1.85185E-6 L -0.36927 -1.85185E-6 " pathEditMode="relative" rAng="0" ptsTypes="AA">
+                                    <p:animMotion origin="layout" path="M -1.04167E-6 -1.11111E-6 L -0.1776 -1.11111E-6 " pathEditMode="relative" rAng="0" ptsTypes="AA">
                                       <p:cBhvr>
-                                        <p:cTn id="15" dur="8000" fill="hold"/>
+                                        <p:cTn id="16" dur="5000" fill="hold"/>
                                         <p:tgtEl>
-                                          <p:spTgt spid="7"/>
+                                          <p:spTgt spid="1026"/>
                                         </p:tgtEl>
                                         <p:attrNameLst>
                                           <p:attrName>ppt_x</p:attrName>
                                           <p:attrName>ppt_y</p:attrName>
                                         </p:attrNameLst>
                                       </p:cBhvr>
-                                      <p:rCtr x="-26367" y="0"/>
+                                      <p:rCtr x="-8880" y="0"/>
                                     </p:animMotion>
                                   </p:childTnLst>
                                 </p:cTn>
@@ -17979,7 +19362,7 @@
   <a:extraClrSchemeLst/>
   <a:extLst>
     <a:ext uri="{05A4C25C-085E-4340-85A3-A5531E510DB2}">
-      <thm15:themeFamily xmlns:thm15="http://schemas.microsoft.com/office/thememl/2012/main" name="Office Theme" id="{62F939B6-93AF-4DB8-9C6B-D6C7DFDC589F}" vid="{4A3C46E8-61CC-4603-A589-7422A47A8E4A}"/>
+      <thm15:themeFamily xmlns:thm15="http://schemas.microsoft.com/office/thememl/2012/main" xmlns="" name="Office Theme" id="{62F939B6-93AF-4DB8-9C6B-D6C7DFDC589F}" vid="{4A3C46E8-61CC-4603-A589-7422A47A8E4A}"/>
     </a:ext>
   </a:extLst>
 </a:theme>

</xml_diff>